<commit_message>
Added description about ability of conditional description
Added further consideration about ability of conditional description which affected by prerequisite condition of SPDX file generation by distoributor
</commit_message>
<xml_diff>
--- a/License-Info-Exchange/UsageProfile/Proposal/Background_of_Proposal_of_UsageProfile_CC0.pptx
+++ b/License-Info-Exchange/UsageProfile/Proposal/Background_of_Proposal_of_UsageProfile_CC0.pptx
@@ -6,7 +6,7 @@
     <p:sldMasterId id="2147483677" r:id="rId2"/>
   </p:sldMasterIdLst>
   <p:notesMasterIdLst>
-    <p:notesMasterId r:id="rId21"/>
+    <p:notesMasterId r:id="rId23"/>
   </p:notesMasterIdLst>
   <p:sldIdLst>
     <p:sldId id="281" r:id="rId3"/>
@@ -23,10 +23,12 @@
     <p:sldId id="427" r:id="rId14"/>
     <p:sldId id="429" r:id="rId15"/>
     <p:sldId id="428" r:id="rId16"/>
-    <p:sldId id="425" r:id="rId17"/>
-    <p:sldId id="424" r:id="rId18"/>
-    <p:sldId id="422" r:id="rId19"/>
-    <p:sldId id="423" r:id="rId20"/>
+    <p:sldId id="434" r:id="rId17"/>
+    <p:sldId id="438" r:id="rId18"/>
+    <p:sldId id="425" r:id="rId19"/>
+    <p:sldId id="424" r:id="rId20"/>
+    <p:sldId id="422" r:id="rId21"/>
+    <p:sldId id="423" r:id="rId22"/>
   </p:sldIdLst>
   <p:sldSz cx="9144000" cy="6858000" type="screen4x3"/>
   <p:notesSz cx="6858000" cy="9144000"/>
@@ -144,541 +146,6 @@
 </p:presentation>
 </file>
 
-<file path=ppt/changesInfos/changesInfo1.xml><?xml version="1.0" encoding="utf-8"?>
-<pc:chgInfo xmlns:a="http://schemas.openxmlformats.org/drawingml/2006/main" xmlns:r="http://schemas.openxmlformats.org/officeDocument/2006/relationships" xmlns:ac="http://schemas.microsoft.com/office/drawing/2013/main/command" xmlns:pc="http://schemas.microsoft.com/office/powerpoint/2013/main/command">
-  <pc:docChgLst>
-    <pc:chgData name="Yoshiyuki Ito" userId="97dbe34d-c380-4a74-a0ac-6eaa014856ce" providerId="ADAL" clId="{34CFD547-28DA-4F58-B550-9B9C456DEFA4}"/>
-    <pc:docChg chg="undo custSel addSld delSld modSld addMainMaster delMainMaster modMainMaster">
-      <pc:chgData name="Yoshiyuki Ito" userId="97dbe34d-c380-4a74-a0ac-6eaa014856ce" providerId="ADAL" clId="{34CFD547-28DA-4F58-B550-9B9C456DEFA4}" dt="2021-12-21T08:38:08.385" v="4196" actId="20577"/>
-      <pc:docMkLst>
-        <pc:docMk/>
-      </pc:docMkLst>
-      <pc:sldChg chg="del">
-        <pc:chgData name="Yoshiyuki Ito" userId="97dbe34d-c380-4a74-a0ac-6eaa014856ce" providerId="ADAL" clId="{34CFD547-28DA-4F58-B550-9B9C456DEFA4}" dt="2021-12-21T06:43:58.656" v="0" actId="2696"/>
-        <pc:sldMkLst>
-          <pc:docMk/>
-          <pc:sldMk cId="2274470867" sldId="276"/>
-        </pc:sldMkLst>
-      </pc:sldChg>
-      <pc:sldChg chg="del">
-        <pc:chgData name="Yoshiyuki Ito" userId="97dbe34d-c380-4a74-a0ac-6eaa014856ce" providerId="ADAL" clId="{34CFD547-28DA-4F58-B550-9B9C456DEFA4}" dt="2021-12-21T06:44:08.035" v="1" actId="2696"/>
-        <pc:sldMkLst>
-          <pc:docMk/>
-          <pc:sldMk cId="2257718606" sldId="280"/>
-        </pc:sldMkLst>
-      </pc:sldChg>
-      <pc:sldChg chg="del">
-        <pc:chgData name="Yoshiyuki Ito" userId="97dbe34d-c380-4a74-a0ac-6eaa014856ce" providerId="ADAL" clId="{34CFD547-28DA-4F58-B550-9B9C456DEFA4}" dt="2021-12-21T06:44:08.035" v="1" actId="2696"/>
-        <pc:sldMkLst>
-          <pc:docMk/>
-          <pc:sldMk cId="3466230858" sldId="284"/>
-        </pc:sldMkLst>
-      </pc:sldChg>
-      <pc:sldChg chg="del">
-        <pc:chgData name="Yoshiyuki Ito" userId="97dbe34d-c380-4a74-a0ac-6eaa014856ce" providerId="ADAL" clId="{34CFD547-28DA-4F58-B550-9B9C456DEFA4}" dt="2021-12-21T06:44:08.035" v="1" actId="2696"/>
-        <pc:sldMkLst>
-          <pc:docMk/>
-          <pc:sldMk cId="339868180" sldId="285"/>
-        </pc:sldMkLst>
-      </pc:sldChg>
-      <pc:sldChg chg="del">
-        <pc:chgData name="Yoshiyuki Ito" userId="97dbe34d-c380-4a74-a0ac-6eaa014856ce" providerId="ADAL" clId="{34CFD547-28DA-4F58-B550-9B9C456DEFA4}" dt="2021-12-21T06:44:08.035" v="1" actId="2696"/>
-        <pc:sldMkLst>
-          <pc:docMk/>
-          <pc:sldMk cId="652903361" sldId="286"/>
-        </pc:sldMkLst>
-      </pc:sldChg>
-      <pc:sldChg chg="addSp delSp modSp mod modClrScheme chgLayout">
-        <pc:chgData name="Yoshiyuki Ito" userId="97dbe34d-c380-4a74-a0ac-6eaa014856ce" providerId="ADAL" clId="{34CFD547-28DA-4F58-B550-9B9C456DEFA4}" dt="2021-12-21T06:48:36.759" v="39" actId="21"/>
-        <pc:sldMkLst>
-          <pc:docMk/>
-          <pc:sldMk cId="2693602577" sldId="413"/>
-        </pc:sldMkLst>
-        <pc:spChg chg="mod ord">
-          <ac:chgData name="Yoshiyuki Ito" userId="97dbe34d-c380-4a74-a0ac-6eaa014856ce" providerId="ADAL" clId="{34CFD547-28DA-4F58-B550-9B9C456DEFA4}" dt="2021-12-21T06:48:33.428" v="38" actId="700"/>
-          <ac:spMkLst>
-            <pc:docMk/>
-            <pc:sldMk cId="2693602577" sldId="413"/>
-            <ac:spMk id="2" creationId="{FEAA1E87-8AA0-4AF7-B34A-ED831FA8524B}"/>
-          </ac:spMkLst>
-        </pc:spChg>
-        <pc:spChg chg="add del mod ord">
-          <ac:chgData name="Yoshiyuki Ito" userId="97dbe34d-c380-4a74-a0ac-6eaa014856ce" providerId="ADAL" clId="{34CFD547-28DA-4F58-B550-9B9C456DEFA4}" dt="2021-12-21T06:48:36.759" v="39" actId="21"/>
-          <ac:spMkLst>
-            <pc:docMk/>
-            <pc:sldMk cId="2693602577" sldId="413"/>
-            <ac:spMk id="4" creationId="{4A91C834-7616-4A6D-BB42-B8536E9A534A}"/>
-          </ac:spMkLst>
-        </pc:spChg>
-        <pc:spChg chg="mod">
-          <ac:chgData name="Yoshiyuki Ito" userId="97dbe34d-c380-4a74-a0ac-6eaa014856ce" providerId="ADAL" clId="{34CFD547-28DA-4F58-B550-9B9C456DEFA4}" dt="2021-12-21T06:44:41.648" v="9" actId="27636"/>
-          <ac:spMkLst>
-            <pc:docMk/>
-            <pc:sldMk cId="2693602577" sldId="413"/>
-            <ac:spMk id="14" creationId="{7D2805D1-5A47-413F-A7A5-E9057CEB3832}"/>
-          </ac:spMkLst>
-        </pc:spChg>
-        <pc:spChg chg="mod">
-          <ac:chgData name="Yoshiyuki Ito" userId="97dbe34d-c380-4a74-a0ac-6eaa014856ce" providerId="ADAL" clId="{34CFD547-28DA-4F58-B550-9B9C456DEFA4}" dt="2021-12-21T06:44:41.633" v="2" actId="27636"/>
-          <ac:spMkLst>
-            <pc:docMk/>
-            <pc:sldMk cId="2693602577" sldId="413"/>
-            <ac:spMk id="16" creationId="{74A1BBDD-8286-425C-8CB7-FEA933908349}"/>
-          </ac:spMkLst>
-        </pc:spChg>
-        <pc:spChg chg="mod">
-          <ac:chgData name="Yoshiyuki Ito" userId="97dbe34d-c380-4a74-a0ac-6eaa014856ce" providerId="ADAL" clId="{34CFD547-28DA-4F58-B550-9B9C456DEFA4}" dt="2021-12-21T06:44:41.633" v="7" actId="27636"/>
-          <ac:spMkLst>
-            <pc:docMk/>
-            <pc:sldMk cId="2693602577" sldId="413"/>
-            <ac:spMk id="17" creationId="{14B5F8EE-EFE2-41DE-BE70-7054ACE06D54}"/>
-          </ac:spMkLst>
-        </pc:spChg>
-        <pc:spChg chg="mod">
-          <ac:chgData name="Yoshiyuki Ito" userId="97dbe34d-c380-4a74-a0ac-6eaa014856ce" providerId="ADAL" clId="{34CFD547-28DA-4F58-B550-9B9C456DEFA4}" dt="2021-12-21T06:44:41.633" v="8" actId="27636"/>
-          <ac:spMkLst>
-            <pc:docMk/>
-            <pc:sldMk cId="2693602577" sldId="413"/>
-            <ac:spMk id="18" creationId="{72D41186-6733-4436-964F-DD5F550EBC8E}"/>
-          </ac:spMkLst>
-        </pc:spChg>
-        <pc:spChg chg="mod">
-          <ac:chgData name="Yoshiyuki Ito" userId="97dbe34d-c380-4a74-a0ac-6eaa014856ce" providerId="ADAL" clId="{34CFD547-28DA-4F58-B550-9B9C456DEFA4}" dt="2021-12-21T06:44:41.633" v="5" actId="27636"/>
-          <ac:spMkLst>
-            <pc:docMk/>
-            <pc:sldMk cId="2693602577" sldId="413"/>
-            <ac:spMk id="20" creationId="{D8B66389-9FC6-4964-B52A-34E03B31CD89}"/>
-          </ac:spMkLst>
-        </pc:spChg>
-        <pc:spChg chg="mod">
-          <ac:chgData name="Yoshiyuki Ito" userId="97dbe34d-c380-4a74-a0ac-6eaa014856ce" providerId="ADAL" clId="{34CFD547-28DA-4F58-B550-9B9C456DEFA4}" dt="2021-12-21T06:44:41.633" v="4" actId="27636"/>
-          <ac:spMkLst>
-            <pc:docMk/>
-            <pc:sldMk cId="2693602577" sldId="413"/>
-            <ac:spMk id="21" creationId="{EBBEE759-3188-4FDD-B30C-95CF2A24CBDF}"/>
-          </ac:spMkLst>
-        </pc:spChg>
-        <pc:spChg chg="mod">
-          <ac:chgData name="Yoshiyuki Ito" userId="97dbe34d-c380-4a74-a0ac-6eaa014856ce" providerId="ADAL" clId="{34CFD547-28DA-4F58-B550-9B9C456DEFA4}" dt="2021-12-21T06:44:41.633" v="3" actId="27636"/>
-          <ac:spMkLst>
-            <pc:docMk/>
-            <pc:sldMk cId="2693602577" sldId="413"/>
-            <ac:spMk id="25" creationId="{EBAFA38E-865C-4063-A021-9371649105E3}"/>
-          </ac:spMkLst>
-        </pc:spChg>
-        <pc:spChg chg="mod">
-          <ac:chgData name="Yoshiyuki Ito" userId="97dbe34d-c380-4a74-a0ac-6eaa014856ce" providerId="ADAL" clId="{34CFD547-28DA-4F58-B550-9B9C456DEFA4}" dt="2021-12-21T06:44:41.633" v="6" actId="27636"/>
-          <ac:spMkLst>
-            <pc:docMk/>
-            <pc:sldMk cId="2693602577" sldId="413"/>
-            <ac:spMk id="29" creationId="{F0B97629-D285-4475-AEEA-D9CB71B59FD2}"/>
-          </ac:spMkLst>
-        </pc:spChg>
-        <pc:spChg chg="mod">
-          <ac:chgData name="Yoshiyuki Ito" userId="97dbe34d-c380-4a74-a0ac-6eaa014856ce" providerId="ADAL" clId="{34CFD547-28DA-4F58-B550-9B9C456DEFA4}" dt="2021-12-21T06:44:41.648" v="10" actId="27636"/>
-          <ac:spMkLst>
-            <pc:docMk/>
-            <pc:sldMk cId="2693602577" sldId="413"/>
-            <ac:spMk id="43" creationId="{CD53F347-E196-499B-8E98-57227EF0C065}"/>
-          </ac:spMkLst>
-        </pc:spChg>
-      </pc:sldChg>
-      <pc:sldChg chg="addSp delSp modSp mod modClrScheme chgLayout">
-        <pc:chgData name="Yoshiyuki Ito" userId="97dbe34d-c380-4a74-a0ac-6eaa014856ce" providerId="ADAL" clId="{34CFD547-28DA-4F58-B550-9B9C456DEFA4}" dt="2021-12-21T06:49:00.787" v="40"/>
-        <pc:sldMkLst>
-          <pc:docMk/>
-          <pc:sldMk cId="2401845759" sldId="414"/>
-        </pc:sldMkLst>
-        <pc:spChg chg="mod ord">
-          <ac:chgData name="Yoshiyuki Ito" userId="97dbe34d-c380-4a74-a0ac-6eaa014856ce" providerId="ADAL" clId="{34CFD547-28DA-4F58-B550-9B9C456DEFA4}" dt="2021-12-21T06:49:00.787" v="40"/>
-          <ac:spMkLst>
-            <pc:docMk/>
-            <pc:sldMk cId="2401845759" sldId="414"/>
-            <ac:spMk id="2" creationId="{FEAA1E87-8AA0-4AF7-B34A-ED831FA8524B}"/>
-          </ac:spMkLst>
-        </pc:spChg>
-        <pc:spChg chg="mod">
-          <ac:chgData name="Yoshiyuki Ito" userId="97dbe34d-c380-4a74-a0ac-6eaa014856ce" providerId="ADAL" clId="{34CFD547-28DA-4F58-B550-9B9C456DEFA4}" dt="2021-12-21T06:48:18.803" v="36" actId="1076"/>
-          <ac:spMkLst>
-            <pc:docMk/>
-            <pc:sldMk cId="2401845759" sldId="414"/>
-            <ac:spMk id="3" creationId="{E4198220-0FEE-45CE-9238-E3260DE3F716}"/>
-          </ac:spMkLst>
-        </pc:spChg>
-        <pc:spChg chg="add del mod ord">
-          <ac:chgData name="Yoshiyuki Ito" userId="97dbe34d-c380-4a74-a0ac-6eaa014856ce" providerId="ADAL" clId="{34CFD547-28DA-4F58-B550-9B9C456DEFA4}" dt="2021-12-21T06:48:21.980" v="37" actId="21"/>
-          <ac:spMkLst>
-            <pc:docMk/>
-            <pc:sldMk cId="2401845759" sldId="414"/>
-            <ac:spMk id="4" creationId="{9DF269C1-281B-4E64-B81C-EFBE0393A123}"/>
-          </ac:spMkLst>
-        </pc:spChg>
-      </pc:sldChg>
-      <pc:sldChg chg="addSp delSp modSp add mod modClrScheme chgLayout">
-        <pc:chgData name="Yoshiyuki Ito" userId="97dbe34d-c380-4a74-a0ac-6eaa014856ce" providerId="ADAL" clId="{34CFD547-28DA-4F58-B550-9B9C456DEFA4}" dt="2021-12-21T08:11:50.559" v="2776"/>
-        <pc:sldMkLst>
-          <pc:docMk/>
-          <pc:sldMk cId="36804509" sldId="415"/>
-        </pc:sldMkLst>
-        <pc:spChg chg="del mod ord">
-          <ac:chgData name="Yoshiyuki Ito" userId="97dbe34d-c380-4a74-a0ac-6eaa014856ce" providerId="ADAL" clId="{34CFD547-28DA-4F58-B550-9B9C456DEFA4}" dt="2021-12-21T06:49:17.353" v="41" actId="700"/>
-          <ac:spMkLst>
-            <pc:docMk/>
-            <pc:sldMk cId="36804509" sldId="415"/>
-            <ac:spMk id="2" creationId="{EBC301A4-EEE1-43B0-8B7A-1AAF9FCC5DBD}"/>
-          </ac:spMkLst>
-        </pc:spChg>
-        <pc:spChg chg="del mod ord">
-          <ac:chgData name="Yoshiyuki Ito" userId="97dbe34d-c380-4a74-a0ac-6eaa014856ce" providerId="ADAL" clId="{34CFD547-28DA-4F58-B550-9B9C456DEFA4}" dt="2021-12-21T06:49:17.353" v="41" actId="700"/>
-          <ac:spMkLst>
-            <pc:docMk/>
-            <pc:sldMk cId="36804509" sldId="415"/>
-            <ac:spMk id="3" creationId="{6B17EEEA-F96C-489D-944B-47AD0C8BB559}"/>
-          </ac:spMkLst>
-        </pc:spChg>
-        <pc:spChg chg="add mod ord">
-          <ac:chgData name="Yoshiyuki Ito" userId="97dbe34d-c380-4a74-a0ac-6eaa014856ce" providerId="ADAL" clId="{34CFD547-28DA-4F58-B550-9B9C456DEFA4}" dt="2021-12-21T06:49:27.140" v="69"/>
-          <ac:spMkLst>
-            <pc:docMk/>
-            <pc:sldMk cId="36804509" sldId="415"/>
-            <ac:spMk id="4" creationId="{E75977C7-BAAA-47D4-8A00-BFD08DE8BBDA}"/>
-          </ac:spMkLst>
-        </pc:spChg>
-        <pc:spChg chg="add mod ord">
-          <ac:chgData name="Yoshiyuki Ito" userId="97dbe34d-c380-4a74-a0ac-6eaa014856ce" providerId="ADAL" clId="{34CFD547-28DA-4F58-B550-9B9C456DEFA4}" dt="2021-12-21T08:11:50.559" v="2776"/>
-          <ac:spMkLst>
-            <pc:docMk/>
-            <pc:sldMk cId="36804509" sldId="415"/>
-            <ac:spMk id="5" creationId="{85E5C308-2D2B-43EC-AABE-2C57E8C0113E}"/>
-          </ac:spMkLst>
-        </pc:spChg>
-      </pc:sldChg>
-      <pc:sldChg chg="addSp delSp modSp new del mod modClrScheme chgLayout">
-        <pc:chgData name="Yoshiyuki Ito" userId="97dbe34d-c380-4a74-a0ac-6eaa014856ce" providerId="ADAL" clId="{34CFD547-28DA-4F58-B550-9B9C456DEFA4}" dt="2021-12-21T06:48:03.965" v="34" actId="2696"/>
-        <pc:sldMkLst>
-          <pc:docMk/>
-          <pc:sldMk cId="1251838552" sldId="415"/>
-        </pc:sldMkLst>
-        <pc:spChg chg="del mod ord">
-          <ac:chgData name="Yoshiyuki Ito" userId="97dbe34d-c380-4a74-a0ac-6eaa014856ce" providerId="ADAL" clId="{34CFD547-28DA-4F58-B550-9B9C456DEFA4}" dt="2021-12-21T06:46:23.112" v="17" actId="700"/>
-          <ac:spMkLst>
-            <pc:docMk/>
-            <pc:sldMk cId="1251838552" sldId="415"/>
-            <ac:spMk id="2" creationId="{622B2E2F-4BDA-47E0-B8B6-552596D0EB40}"/>
-          </ac:spMkLst>
-        </pc:spChg>
-        <pc:spChg chg="del">
-          <ac:chgData name="Yoshiyuki Ito" userId="97dbe34d-c380-4a74-a0ac-6eaa014856ce" providerId="ADAL" clId="{34CFD547-28DA-4F58-B550-9B9C456DEFA4}" dt="2021-12-21T06:46:23.112" v="17" actId="700"/>
-          <ac:spMkLst>
-            <pc:docMk/>
-            <pc:sldMk cId="1251838552" sldId="415"/>
-            <ac:spMk id="3" creationId="{AA542173-FC12-4727-9DCD-FF8EBB460E0C}"/>
-          </ac:spMkLst>
-        </pc:spChg>
-        <pc:spChg chg="add mod ord">
-          <ac:chgData name="Yoshiyuki Ito" userId="97dbe34d-c380-4a74-a0ac-6eaa014856ce" providerId="ADAL" clId="{34CFD547-28DA-4F58-B550-9B9C456DEFA4}" dt="2021-12-21T06:46:23.112" v="17" actId="700"/>
-          <ac:spMkLst>
-            <pc:docMk/>
-            <pc:sldMk cId="1251838552" sldId="415"/>
-            <ac:spMk id="4" creationId="{67035CED-B21B-4708-BAED-D176FBDE4153}"/>
-          </ac:spMkLst>
-        </pc:spChg>
-      </pc:sldChg>
-      <pc:sldChg chg="addSp delSp modSp add mod modClrScheme chgLayout">
-        <pc:chgData name="Yoshiyuki Ito" userId="97dbe34d-c380-4a74-a0ac-6eaa014856ce" providerId="ADAL" clId="{34CFD547-28DA-4F58-B550-9B9C456DEFA4}" dt="2021-12-21T08:29:22.591" v="3760" actId="1035"/>
-        <pc:sldMkLst>
-          <pc:docMk/>
-          <pc:sldMk cId="127688631" sldId="416"/>
-        </pc:sldMkLst>
-        <pc:spChg chg="del mod ord">
-          <ac:chgData name="Yoshiyuki Ito" userId="97dbe34d-c380-4a74-a0ac-6eaa014856ce" providerId="ADAL" clId="{34CFD547-28DA-4F58-B550-9B9C456DEFA4}" dt="2021-12-21T06:53:53.068" v="902" actId="700"/>
-          <ac:spMkLst>
-            <pc:docMk/>
-            <pc:sldMk cId="127688631" sldId="416"/>
-            <ac:spMk id="2" creationId="{B07693C6-EF30-4F37-A610-00AA2F537CEF}"/>
-          </ac:spMkLst>
-        </pc:spChg>
-        <pc:spChg chg="del">
-          <ac:chgData name="Yoshiyuki Ito" userId="97dbe34d-c380-4a74-a0ac-6eaa014856ce" providerId="ADAL" clId="{34CFD547-28DA-4F58-B550-9B9C456DEFA4}" dt="2021-12-21T06:53:53.068" v="902" actId="700"/>
-          <ac:spMkLst>
-            <pc:docMk/>
-            <pc:sldMk cId="127688631" sldId="416"/>
-            <ac:spMk id="3" creationId="{EEF6DF2A-7CD8-4EA9-B423-5AAA2FCA4FA1}"/>
-          </ac:spMkLst>
-        </pc:spChg>
-        <pc:spChg chg="add del mod ord">
-          <ac:chgData name="Yoshiyuki Ito" userId="97dbe34d-c380-4a74-a0ac-6eaa014856ce" providerId="ADAL" clId="{34CFD547-28DA-4F58-B550-9B9C456DEFA4}" dt="2021-12-21T06:54:03.087" v="908" actId="700"/>
-          <ac:spMkLst>
-            <pc:docMk/>
-            <pc:sldMk cId="127688631" sldId="416"/>
-            <ac:spMk id="4" creationId="{1EAFF619-878D-4B29-86B7-F1271270C838}"/>
-          </ac:spMkLst>
-        </pc:spChg>
-        <pc:spChg chg="add mod ord">
-          <ac:chgData name="Yoshiyuki Ito" userId="97dbe34d-c380-4a74-a0ac-6eaa014856ce" providerId="ADAL" clId="{34CFD547-28DA-4F58-B550-9B9C456DEFA4}" dt="2021-12-21T06:54:13.108" v="951"/>
-          <ac:spMkLst>
-            <pc:docMk/>
-            <pc:sldMk cId="127688631" sldId="416"/>
-            <ac:spMk id="5" creationId="{918BFB88-1B36-495C-B046-2E9F1309FF1A}"/>
-          </ac:spMkLst>
-        </pc:spChg>
-        <pc:spChg chg="add mod ord">
-          <ac:chgData name="Yoshiyuki Ito" userId="97dbe34d-c380-4a74-a0ac-6eaa014856ce" providerId="ADAL" clId="{34CFD547-28DA-4F58-B550-9B9C456DEFA4}" dt="2021-12-21T08:29:22.591" v="3760" actId="1035"/>
-          <ac:spMkLst>
-            <pc:docMk/>
-            <pc:sldMk cId="127688631" sldId="416"/>
-            <ac:spMk id="6" creationId="{972C271C-978B-4660-80C7-6277CC9B4D61}"/>
-          </ac:spMkLst>
-        </pc:spChg>
-      </pc:sldChg>
-      <pc:sldChg chg="addSp delSp modSp new del mod modClrScheme chgLayout">
-        <pc:chgData name="Yoshiyuki Ito" userId="97dbe34d-c380-4a74-a0ac-6eaa014856ce" providerId="ADAL" clId="{34CFD547-28DA-4F58-B550-9B9C456DEFA4}" dt="2021-12-21T06:46:41.812" v="20" actId="2696"/>
-        <pc:sldMkLst>
-          <pc:docMk/>
-          <pc:sldMk cId="1533816683" sldId="416"/>
-        </pc:sldMkLst>
-        <pc:spChg chg="del mod ord">
-          <ac:chgData name="Yoshiyuki Ito" userId="97dbe34d-c380-4a74-a0ac-6eaa014856ce" providerId="ADAL" clId="{34CFD547-28DA-4F58-B550-9B9C456DEFA4}" dt="2021-12-21T06:46:38.405" v="19" actId="700"/>
-          <ac:spMkLst>
-            <pc:docMk/>
-            <pc:sldMk cId="1533816683" sldId="416"/>
-            <ac:spMk id="2" creationId="{10E29BD2-654B-4EF1-B00D-67D4449D1D27}"/>
-          </ac:spMkLst>
-        </pc:spChg>
-        <pc:spChg chg="del">
-          <ac:chgData name="Yoshiyuki Ito" userId="97dbe34d-c380-4a74-a0ac-6eaa014856ce" providerId="ADAL" clId="{34CFD547-28DA-4F58-B550-9B9C456DEFA4}" dt="2021-12-21T06:46:38.405" v="19" actId="700"/>
-          <ac:spMkLst>
-            <pc:docMk/>
-            <pc:sldMk cId="1533816683" sldId="416"/>
-            <ac:spMk id="3" creationId="{D5BDE456-6FE0-4DB2-9655-80DAD0076C0D}"/>
-          </ac:spMkLst>
-        </pc:spChg>
-        <pc:spChg chg="add mod ord">
-          <ac:chgData name="Yoshiyuki Ito" userId="97dbe34d-c380-4a74-a0ac-6eaa014856ce" providerId="ADAL" clId="{34CFD547-28DA-4F58-B550-9B9C456DEFA4}" dt="2021-12-21T06:46:38.405" v="19" actId="700"/>
-          <ac:spMkLst>
-            <pc:docMk/>
-            <pc:sldMk cId="1533816683" sldId="416"/>
-            <ac:spMk id="4" creationId="{13ABCEBE-D5D4-422D-BA5A-EC63D070D300}"/>
-          </ac:spMkLst>
-        </pc:spChg>
-      </pc:sldChg>
-      <pc:sldChg chg="addSp delSp modSp new mod modClrScheme chgLayout">
-        <pc:chgData name="Yoshiyuki Ito" userId="97dbe34d-c380-4a74-a0ac-6eaa014856ce" providerId="ADAL" clId="{34CFD547-28DA-4F58-B550-9B9C456DEFA4}" dt="2021-12-21T08:06:24.368" v="2665" actId="207"/>
-        <pc:sldMkLst>
-          <pc:docMk/>
-          <pc:sldMk cId="638445202" sldId="417"/>
-        </pc:sldMkLst>
-        <pc:spChg chg="del mod ord">
-          <ac:chgData name="Yoshiyuki Ito" userId="97dbe34d-c380-4a74-a0ac-6eaa014856ce" providerId="ADAL" clId="{34CFD547-28DA-4F58-B550-9B9C456DEFA4}" dt="2021-12-21T08:01:30.006" v="1914" actId="700"/>
-          <ac:spMkLst>
-            <pc:docMk/>
-            <pc:sldMk cId="638445202" sldId="417"/>
-            <ac:spMk id="2" creationId="{0C76DCB6-8168-4D12-ABA6-97E68939D589}"/>
-          </ac:spMkLst>
-        </pc:spChg>
-        <pc:spChg chg="del mod ord">
-          <ac:chgData name="Yoshiyuki Ito" userId="97dbe34d-c380-4a74-a0ac-6eaa014856ce" providerId="ADAL" clId="{34CFD547-28DA-4F58-B550-9B9C456DEFA4}" dt="2021-12-21T08:01:30.006" v="1914" actId="700"/>
-          <ac:spMkLst>
-            <pc:docMk/>
-            <pc:sldMk cId="638445202" sldId="417"/>
-            <ac:spMk id="3" creationId="{21DC3894-C89A-4F7F-B2FD-9716E584D0A6}"/>
-          </ac:spMkLst>
-        </pc:spChg>
-        <pc:spChg chg="add mod ord">
-          <ac:chgData name="Yoshiyuki Ito" userId="97dbe34d-c380-4a74-a0ac-6eaa014856ce" providerId="ADAL" clId="{34CFD547-28DA-4F58-B550-9B9C456DEFA4}" dt="2021-12-21T08:01:37.736" v="1938"/>
-          <ac:spMkLst>
-            <pc:docMk/>
-            <pc:sldMk cId="638445202" sldId="417"/>
-            <ac:spMk id="4" creationId="{75C6F2CE-480F-4B15-B248-D0A44545039D}"/>
-          </ac:spMkLst>
-        </pc:spChg>
-        <pc:spChg chg="add mod ord">
-          <ac:chgData name="Yoshiyuki Ito" userId="97dbe34d-c380-4a74-a0ac-6eaa014856ce" providerId="ADAL" clId="{34CFD547-28DA-4F58-B550-9B9C456DEFA4}" dt="2021-12-21T08:06:24.368" v="2665" actId="207"/>
-          <ac:spMkLst>
-            <pc:docMk/>
-            <pc:sldMk cId="638445202" sldId="417"/>
-            <ac:spMk id="5" creationId="{57093C2F-1C7C-49F2-9002-19E3551E7EBA}"/>
-          </ac:spMkLst>
-        </pc:spChg>
-      </pc:sldChg>
-      <pc:sldChg chg="addSp delSp modSp new mod modClrScheme chgLayout">
-        <pc:chgData name="Yoshiyuki Ito" userId="97dbe34d-c380-4a74-a0ac-6eaa014856ce" providerId="ADAL" clId="{34CFD547-28DA-4F58-B550-9B9C456DEFA4}" dt="2021-12-21T08:18:19.958" v="3500" actId="2711"/>
-        <pc:sldMkLst>
-          <pc:docMk/>
-          <pc:sldMk cId="3969533276" sldId="418"/>
-        </pc:sldMkLst>
-        <pc:spChg chg="del mod ord">
-          <ac:chgData name="Yoshiyuki Ito" userId="97dbe34d-c380-4a74-a0ac-6eaa014856ce" providerId="ADAL" clId="{34CFD547-28DA-4F58-B550-9B9C456DEFA4}" dt="2021-12-21T08:10:25.957" v="2667" actId="700"/>
-          <ac:spMkLst>
-            <pc:docMk/>
-            <pc:sldMk cId="3969533276" sldId="418"/>
-            <ac:spMk id="2" creationId="{C60D7E1D-7673-4761-B988-60BE9DADF651}"/>
-          </ac:spMkLst>
-        </pc:spChg>
-        <pc:spChg chg="del mod ord">
-          <ac:chgData name="Yoshiyuki Ito" userId="97dbe34d-c380-4a74-a0ac-6eaa014856ce" providerId="ADAL" clId="{34CFD547-28DA-4F58-B550-9B9C456DEFA4}" dt="2021-12-21T08:10:25.957" v="2667" actId="700"/>
-          <ac:spMkLst>
-            <pc:docMk/>
-            <pc:sldMk cId="3969533276" sldId="418"/>
-            <ac:spMk id="3" creationId="{E81CA797-2D88-49D3-BF52-D527C779EDFC}"/>
-          </ac:spMkLst>
-        </pc:spChg>
-        <pc:spChg chg="add mod ord">
-          <ac:chgData name="Yoshiyuki Ito" userId="97dbe34d-c380-4a74-a0ac-6eaa014856ce" providerId="ADAL" clId="{34CFD547-28DA-4F58-B550-9B9C456DEFA4}" dt="2021-12-21T08:12:50.697" v="2824"/>
-          <ac:spMkLst>
-            <pc:docMk/>
-            <pc:sldMk cId="3969533276" sldId="418"/>
-            <ac:spMk id="4" creationId="{48C18357-823A-43B6-A659-BD32EA5B8909}"/>
-          </ac:spMkLst>
-        </pc:spChg>
-        <pc:spChg chg="add mod ord">
-          <ac:chgData name="Yoshiyuki Ito" userId="97dbe34d-c380-4a74-a0ac-6eaa014856ce" providerId="ADAL" clId="{34CFD547-28DA-4F58-B550-9B9C456DEFA4}" dt="2021-12-21T08:18:19.958" v="3500" actId="2711"/>
-          <ac:spMkLst>
-            <pc:docMk/>
-            <pc:sldMk cId="3969533276" sldId="418"/>
-            <ac:spMk id="5" creationId="{462F7BC0-E82E-4225-AA40-DC4971EA9681}"/>
-          </ac:spMkLst>
-        </pc:spChg>
-      </pc:sldChg>
-      <pc:sldChg chg="addSp delSp modSp new mod modClrScheme chgLayout">
-        <pc:chgData name="Yoshiyuki Ito" userId="97dbe34d-c380-4a74-a0ac-6eaa014856ce" providerId="ADAL" clId="{34CFD547-28DA-4F58-B550-9B9C456DEFA4}" dt="2021-12-21T08:38:08.385" v="4196" actId="20577"/>
-        <pc:sldMkLst>
-          <pc:docMk/>
-          <pc:sldMk cId="2264645980" sldId="419"/>
-        </pc:sldMkLst>
-        <pc:spChg chg="del mod ord">
-          <ac:chgData name="Yoshiyuki Ito" userId="97dbe34d-c380-4a74-a0ac-6eaa014856ce" providerId="ADAL" clId="{34CFD547-28DA-4F58-B550-9B9C456DEFA4}" dt="2021-12-21T08:34:06.029" v="3762" actId="700"/>
-          <ac:spMkLst>
-            <pc:docMk/>
-            <pc:sldMk cId="2264645980" sldId="419"/>
-            <ac:spMk id="2" creationId="{619ADFFA-D53F-4B26-BA14-4D490FF46DE6}"/>
-          </ac:spMkLst>
-        </pc:spChg>
-        <pc:spChg chg="del mod ord">
-          <ac:chgData name="Yoshiyuki Ito" userId="97dbe34d-c380-4a74-a0ac-6eaa014856ce" providerId="ADAL" clId="{34CFD547-28DA-4F58-B550-9B9C456DEFA4}" dt="2021-12-21T08:34:06.029" v="3762" actId="700"/>
-          <ac:spMkLst>
-            <pc:docMk/>
-            <pc:sldMk cId="2264645980" sldId="419"/>
-            <ac:spMk id="3" creationId="{7B27E40A-0C50-42E5-89AC-3CD02F527DD9}"/>
-          </ac:spMkLst>
-        </pc:spChg>
-        <pc:spChg chg="add mod ord">
-          <ac:chgData name="Yoshiyuki Ito" userId="97dbe34d-c380-4a74-a0ac-6eaa014856ce" providerId="ADAL" clId="{34CFD547-28DA-4F58-B550-9B9C456DEFA4}" dt="2021-12-21T08:34:10.323" v="3777"/>
-          <ac:spMkLst>
-            <pc:docMk/>
-            <pc:sldMk cId="2264645980" sldId="419"/>
-            <ac:spMk id="4" creationId="{EA0A8728-8470-4FD0-8960-0C3A1DB295F5}"/>
-          </ac:spMkLst>
-        </pc:spChg>
-        <pc:spChg chg="add mod ord">
-          <ac:chgData name="Yoshiyuki Ito" userId="97dbe34d-c380-4a74-a0ac-6eaa014856ce" providerId="ADAL" clId="{34CFD547-28DA-4F58-B550-9B9C456DEFA4}" dt="2021-12-21T08:38:08.385" v="4196" actId="20577"/>
-          <ac:spMkLst>
-            <pc:docMk/>
-            <pc:sldMk cId="2264645980" sldId="419"/>
-            <ac:spMk id="5" creationId="{897EF1C2-41E1-4E7A-B2B6-9C6E1FC02620}"/>
-          </ac:spMkLst>
-        </pc:spChg>
-      </pc:sldChg>
-      <pc:sldMasterChg chg="new del mod addSldLayout delSldLayout">
-        <pc:chgData name="Yoshiyuki Ito" userId="97dbe34d-c380-4a74-a0ac-6eaa014856ce" providerId="ADAL" clId="{34CFD547-28DA-4F58-B550-9B9C456DEFA4}" dt="2021-12-21T06:47:05.406" v="33" actId="2696"/>
-        <pc:sldMasterMkLst>
-          <pc:docMk/>
-          <pc:sldMasterMk cId="759545378" sldId="2147483677"/>
-        </pc:sldMasterMkLst>
-        <pc:sldLayoutChg chg="new del replId">
-          <pc:chgData name="Yoshiyuki Ito" userId="97dbe34d-c380-4a74-a0ac-6eaa014856ce" providerId="ADAL" clId="{34CFD547-28DA-4F58-B550-9B9C456DEFA4}" dt="2021-12-21T06:47:05.375" v="22" actId="2696"/>
-          <pc:sldLayoutMkLst>
-            <pc:docMk/>
-            <pc:sldMasterMk cId="759545378" sldId="2147483677"/>
-            <pc:sldLayoutMk cId="3175093891" sldId="2147483678"/>
-          </pc:sldLayoutMkLst>
-        </pc:sldLayoutChg>
-        <pc:sldLayoutChg chg="new del replId">
-          <pc:chgData name="Yoshiyuki Ito" userId="97dbe34d-c380-4a74-a0ac-6eaa014856ce" providerId="ADAL" clId="{34CFD547-28DA-4F58-B550-9B9C456DEFA4}" dt="2021-12-21T06:47:05.390" v="23" actId="2696"/>
-          <pc:sldLayoutMkLst>
-            <pc:docMk/>
-            <pc:sldMasterMk cId="759545378" sldId="2147483677"/>
-            <pc:sldLayoutMk cId="87086218" sldId="2147483679"/>
-          </pc:sldLayoutMkLst>
-        </pc:sldLayoutChg>
-        <pc:sldLayoutChg chg="new del replId">
-          <pc:chgData name="Yoshiyuki Ito" userId="97dbe34d-c380-4a74-a0ac-6eaa014856ce" providerId="ADAL" clId="{34CFD547-28DA-4F58-B550-9B9C456DEFA4}" dt="2021-12-21T06:47:05.390" v="24" actId="2696"/>
-          <pc:sldLayoutMkLst>
-            <pc:docMk/>
-            <pc:sldMasterMk cId="759545378" sldId="2147483677"/>
-            <pc:sldLayoutMk cId="953462284" sldId="2147483680"/>
-          </pc:sldLayoutMkLst>
-        </pc:sldLayoutChg>
-        <pc:sldLayoutChg chg="new del replId">
-          <pc:chgData name="Yoshiyuki Ito" userId="97dbe34d-c380-4a74-a0ac-6eaa014856ce" providerId="ADAL" clId="{34CFD547-28DA-4F58-B550-9B9C456DEFA4}" dt="2021-12-21T06:47:05.390" v="25" actId="2696"/>
-          <pc:sldLayoutMkLst>
-            <pc:docMk/>
-            <pc:sldMasterMk cId="759545378" sldId="2147483677"/>
-            <pc:sldLayoutMk cId="3349604892" sldId="2147483681"/>
-          </pc:sldLayoutMkLst>
-        </pc:sldLayoutChg>
-        <pc:sldLayoutChg chg="new del replId">
-          <pc:chgData name="Yoshiyuki Ito" userId="97dbe34d-c380-4a74-a0ac-6eaa014856ce" providerId="ADAL" clId="{34CFD547-28DA-4F58-B550-9B9C456DEFA4}" dt="2021-12-21T06:47:05.390" v="26" actId="2696"/>
-          <pc:sldLayoutMkLst>
-            <pc:docMk/>
-            <pc:sldMasterMk cId="759545378" sldId="2147483677"/>
-            <pc:sldLayoutMk cId="3839972053" sldId="2147483682"/>
-          </pc:sldLayoutMkLst>
-        </pc:sldLayoutChg>
-        <pc:sldLayoutChg chg="new del replId">
-          <pc:chgData name="Yoshiyuki Ito" userId="97dbe34d-c380-4a74-a0ac-6eaa014856ce" providerId="ADAL" clId="{34CFD547-28DA-4F58-B550-9B9C456DEFA4}" dt="2021-12-21T06:47:05.390" v="27" actId="2696"/>
-          <pc:sldLayoutMkLst>
-            <pc:docMk/>
-            <pc:sldMasterMk cId="759545378" sldId="2147483677"/>
-            <pc:sldLayoutMk cId="2100431311" sldId="2147483683"/>
-          </pc:sldLayoutMkLst>
-        </pc:sldLayoutChg>
-        <pc:sldLayoutChg chg="new del replId">
-          <pc:chgData name="Yoshiyuki Ito" userId="97dbe34d-c380-4a74-a0ac-6eaa014856ce" providerId="ADAL" clId="{34CFD547-28DA-4F58-B550-9B9C456DEFA4}" dt="2021-12-21T06:47:05.406" v="28" actId="2696"/>
-          <pc:sldLayoutMkLst>
-            <pc:docMk/>
-            <pc:sldMasterMk cId="759545378" sldId="2147483677"/>
-            <pc:sldLayoutMk cId="3027792681" sldId="2147483684"/>
-          </pc:sldLayoutMkLst>
-        </pc:sldLayoutChg>
-        <pc:sldLayoutChg chg="new del replId">
-          <pc:chgData name="Yoshiyuki Ito" userId="97dbe34d-c380-4a74-a0ac-6eaa014856ce" providerId="ADAL" clId="{34CFD547-28DA-4F58-B550-9B9C456DEFA4}" dt="2021-12-21T06:47:05.406" v="29" actId="2696"/>
-          <pc:sldLayoutMkLst>
-            <pc:docMk/>
-            <pc:sldMasterMk cId="759545378" sldId="2147483677"/>
-            <pc:sldLayoutMk cId="1285358044" sldId="2147483685"/>
-          </pc:sldLayoutMkLst>
-        </pc:sldLayoutChg>
-        <pc:sldLayoutChg chg="new del replId">
-          <pc:chgData name="Yoshiyuki Ito" userId="97dbe34d-c380-4a74-a0ac-6eaa014856ce" providerId="ADAL" clId="{34CFD547-28DA-4F58-B550-9B9C456DEFA4}" dt="2021-12-21T06:47:05.406" v="30" actId="2696"/>
-          <pc:sldLayoutMkLst>
-            <pc:docMk/>
-            <pc:sldMasterMk cId="759545378" sldId="2147483677"/>
-            <pc:sldLayoutMk cId="2300452445" sldId="2147483686"/>
-          </pc:sldLayoutMkLst>
-        </pc:sldLayoutChg>
-        <pc:sldLayoutChg chg="new del replId">
-          <pc:chgData name="Yoshiyuki Ito" userId="97dbe34d-c380-4a74-a0ac-6eaa014856ce" providerId="ADAL" clId="{34CFD547-28DA-4F58-B550-9B9C456DEFA4}" dt="2021-12-21T06:47:05.406" v="31" actId="2696"/>
-          <pc:sldLayoutMkLst>
-            <pc:docMk/>
-            <pc:sldMasterMk cId="759545378" sldId="2147483677"/>
-            <pc:sldLayoutMk cId="3992766864" sldId="2147483687"/>
-          </pc:sldLayoutMkLst>
-        </pc:sldLayoutChg>
-        <pc:sldLayoutChg chg="new del replId">
-          <pc:chgData name="Yoshiyuki Ito" userId="97dbe34d-c380-4a74-a0ac-6eaa014856ce" providerId="ADAL" clId="{34CFD547-28DA-4F58-B550-9B9C456DEFA4}" dt="2021-12-21T06:47:05.406" v="32" actId="2696"/>
-          <pc:sldLayoutMkLst>
-            <pc:docMk/>
-            <pc:sldMasterMk cId="759545378" sldId="2147483677"/>
-            <pc:sldLayoutMk cId="163496034" sldId="2147483688"/>
-          </pc:sldLayoutMkLst>
-        </pc:sldLayoutChg>
-      </pc:sldMasterChg>
-    </pc:docChg>
-  </pc:docChgLst>
-</pc:chgInfo>
-</file>
-
 <file path=ppt/notesMasters/notesMaster1.xml><?xml version="1.0" encoding="utf-8"?>
 <p:notesMaster xmlns:a="http://schemas.openxmlformats.org/drawingml/2006/main" xmlns:r="http://schemas.openxmlformats.org/officeDocument/2006/relationships" xmlns:p="http://schemas.openxmlformats.org/presentationml/2006/main">
   <p:cSld>
@@ -761,7 +228,7 @@
           <a:p>
             <a:fld id="{E59D8E7C-99F8-4016-86B1-CC537E355A01}" type="datetimeFigureOut">
               <a:rPr kumimoji="1" lang="ja-JP" altLang="en-US" smtClean="0"/>
-              <a:t>2022/2/14</a:t>
+              <a:t>2022/2/15</a:t>
             </a:fld>
             <a:endParaRPr kumimoji="1" lang="ja-JP" altLang="en-US"/>
           </a:p>
@@ -12799,6 +12266,741 @@
       </p:grpSpPr>
       <p:sp>
         <p:nvSpPr>
+          <p:cNvPr id="4" name="タイトル 3">
+            <a:extLst>
+              <a:ext uri="{FF2B5EF4-FFF2-40B4-BE49-F238E27FC236}">
+                <a16:creationId xmlns:a16="http://schemas.microsoft.com/office/drawing/2014/main" id="{9DA87A08-1129-4D0B-B4B3-44C2C6F398D7}"/>
+              </a:ext>
+            </a:extLst>
+          </p:cNvPr>
+          <p:cNvSpPr>
+            <a:spLocks noGrp="1"/>
+          </p:cNvSpPr>
+          <p:nvPr>
+            <p:ph type="title"/>
+          </p:nvPr>
+        </p:nvSpPr>
+        <p:spPr/>
+        <p:txBody>
+          <a:bodyPr/>
+          <a:lstStyle/>
+          <a:p>
+            <a:r>
+              <a:rPr lang="en-US" altLang="ja-JP" dirty="0"/>
+              <a:t>Further consideration about Usage Profile</a:t>
+            </a:r>
+            <a:endParaRPr lang="ja-JP" altLang="en-US" dirty="0"/>
+          </a:p>
+        </p:txBody>
+      </p:sp>
+      <p:sp>
+        <p:nvSpPr>
+          <p:cNvPr id="3" name="テキスト プレースホルダー 2">
+            <a:extLst>
+              <a:ext uri="{FF2B5EF4-FFF2-40B4-BE49-F238E27FC236}">
+                <a16:creationId xmlns:a16="http://schemas.microsoft.com/office/drawing/2014/main" id="{2E447FA8-7335-4643-913E-D6B098597B99}"/>
+              </a:ext>
+            </a:extLst>
+          </p:cNvPr>
+          <p:cNvSpPr>
+            <a:spLocks noGrp="1"/>
+          </p:cNvSpPr>
+          <p:nvPr>
+            <p:ph type="body" idx="1"/>
+          </p:nvPr>
+        </p:nvSpPr>
+        <p:spPr/>
+        <p:txBody>
+          <a:bodyPr/>
+          <a:lstStyle/>
+          <a:p>
+            <a:r>
+              <a:rPr lang="en-US" altLang="ja-JP" dirty="0"/>
+              <a:t>When distributor describe “indication”, it might exist some prerequisite condition such as “target product”, etc.</a:t>
+            </a:r>
+          </a:p>
+          <a:p>
+            <a:pPr lvl="1">
+              <a:buFont typeface="Wingdings" panose="05000000000000000000" pitchFamily="2" charset="2"/>
+              <a:buChar char="à"/>
+            </a:pPr>
+            <a:r>
+              <a:rPr lang="en-US" altLang="ja-JP" dirty="0">
+                <a:sym typeface="Wingdings" panose="05000000000000000000" pitchFamily="2" charset="2"/>
+              </a:rPr>
+              <a:t>Initial idea of Usage Profile</a:t>
+            </a:r>
+          </a:p>
+          <a:p>
+            <a:pPr marL="345839" lvl="1" indent="0">
+              <a:buNone/>
+            </a:pPr>
+            <a:endParaRPr lang="en-US" altLang="ja-JP" dirty="0">
+              <a:sym typeface="Wingdings" panose="05000000000000000000" pitchFamily="2" charset="2"/>
+            </a:endParaRPr>
+          </a:p>
+          <a:p>
+            <a:pPr lvl="1"/>
+            <a:r>
+              <a:rPr lang="en-US" altLang="ja-JP" dirty="0">
+                <a:sym typeface="Wingdings" panose="05000000000000000000" pitchFamily="2" charset="2"/>
+              </a:rPr>
+              <a:t>But </a:t>
+            </a:r>
+            <a:r>
+              <a:rPr lang="en-US" altLang="ja-JP" dirty="0">
+                <a:solidFill>
+                  <a:srgbClr val="C00000"/>
+                </a:solidFill>
+                <a:sym typeface="Wingdings" panose="05000000000000000000" pitchFamily="2" charset="2"/>
+              </a:rPr>
+              <a:t>hard to describe “prerequisite condition</a:t>
+            </a:r>
+            <a:r>
+              <a:rPr lang="en-US" altLang="ja-JP" dirty="0">
+                <a:sym typeface="Wingdings" panose="05000000000000000000" pitchFamily="2" charset="2"/>
+              </a:rPr>
+              <a:t>” because </a:t>
+            </a:r>
+            <a:r>
+              <a:rPr lang="en-US" altLang="ja-JP" dirty="0">
+                <a:solidFill>
+                  <a:srgbClr val="C00000"/>
+                </a:solidFill>
+                <a:sym typeface="Wingdings" panose="05000000000000000000" pitchFamily="2" charset="2"/>
+              </a:rPr>
+              <a:t>it depend on external material than “Analyzable Source Code </a:t>
+            </a:r>
+            <a:r>
+              <a:rPr lang="en-US" altLang="ja-JP" dirty="0">
+                <a:sym typeface="Wingdings" panose="05000000000000000000" pitchFamily="2" charset="2"/>
+              </a:rPr>
+              <a:t>of the software package which mentioned in SPDX file”.</a:t>
+            </a:r>
+          </a:p>
+          <a:p>
+            <a:pPr lvl="2"/>
+            <a:r>
+              <a:rPr lang="en-US" altLang="ja-JP" dirty="0">
+                <a:sym typeface="Wingdings" panose="05000000000000000000" pitchFamily="2" charset="2"/>
+              </a:rPr>
+              <a:t>Example:</a:t>
+            </a:r>
+          </a:p>
+          <a:p>
+            <a:pPr marL="599064" lvl="2" indent="0">
+              <a:buNone/>
+            </a:pPr>
+            <a:r>
+              <a:rPr lang="en-US" altLang="ja-JP" dirty="0">
+                <a:sym typeface="Wingdings" panose="05000000000000000000" pitchFamily="2" charset="2"/>
+              </a:rPr>
+              <a:t>     No acceptable idea was made to describe “development contract concluded between closed party” with “unique identification”</a:t>
+            </a:r>
+          </a:p>
+        </p:txBody>
+      </p:sp>
+    </p:spTree>
+    <p:extLst>
+      <p:ext uri="{BB962C8B-B14F-4D97-AF65-F5344CB8AC3E}">
+        <p14:creationId xmlns:p14="http://schemas.microsoft.com/office/powerpoint/2010/main" val="4018128333"/>
+      </p:ext>
+    </p:extLst>
+  </p:cSld>
+  <p:clrMapOvr>
+    <a:masterClrMapping/>
+  </p:clrMapOvr>
+</p:sld>
+</file>
+
+<file path=ppt/slides/slide16.xml><?xml version="1.0" encoding="utf-8"?>
+<p:sld xmlns:a="http://schemas.openxmlformats.org/drawingml/2006/main" xmlns:r="http://schemas.openxmlformats.org/officeDocument/2006/relationships" xmlns:p="http://schemas.openxmlformats.org/presentationml/2006/main">
+  <p:cSld>
+    <p:spTree>
+      <p:nvGrpSpPr>
+        <p:cNvPr id="1" name=""/>
+        <p:cNvGrpSpPr/>
+        <p:nvPr/>
+      </p:nvGrpSpPr>
+      <p:grpSpPr>
+        <a:xfrm>
+          <a:off x="0" y="0"/>
+          <a:ext cx="0" cy="0"/>
+          <a:chOff x="0" y="0"/>
+          <a:chExt cx="0" cy="0"/>
+        </a:xfrm>
+      </p:grpSpPr>
+      <p:sp>
+        <p:nvSpPr>
+          <p:cNvPr id="2" name="タイトル 1">
+            <a:extLst>
+              <a:ext uri="{FF2B5EF4-FFF2-40B4-BE49-F238E27FC236}">
+                <a16:creationId xmlns:a16="http://schemas.microsoft.com/office/drawing/2014/main" id="{B960E828-DE52-44F7-B054-0649F0D59BC4}"/>
+              </a:ext>
+            </a:extLst>
+          </p:cNvPr>
+          <p:cNvSpPr>
+            <a:spLocks noGrp="1"/>
+          </p:cNvSpPr>
+          <p:nvPr>
+            <p:ph type="title"/>
+          </p:nvPr>
+        </p:nvSpPr>
+        <p:spPr/>
+        <p:txBody>
+          <a:bodyPr/>
+          <a:lstStyle/>
+          <a:p>
+            <a:pPr marL="92615" lvl="0" indent="0">
+              <a:buNone/>
+            </a:pPr>
+            <a:r>
+              <a:rPr lang="en-US" altLang="ja-JP" dirty="0">
+                <a:sym typeface="Wingdings" panose="05000000000000000000" pitchFamily="2" charset="2"/>
+              </a:rPr>
+              <a:t>  Current Proposal and </a:t>
+            </a:r>
+            <a:br>
+              <a:rPr lang="en-US" altLang="ja-JP" dirty="0">
+                <a:sym typeface="Wingdings" panose="05000000000000000000" pitchFamily="2" charset="2"/>
+              </a:rPr>
+            </a:br>
+            <a:r>
+              <a:rPr lang="en-US" altLang="ja-JP" dirty="0">
+                <a:sym typeface="Wingdings" panose="05000000000000000000" pitchFamily="2" charset="2"/>
+              </a:rPr>
+              <a:t>  Additional</a:t>
+            </a:r>
+            <a:r>
+              <a:rPr lang="en-US" altLang="ja-JP" baseline="0" dirty="0">
+                <a:sym typeface="Wingdings" panose="05000000000000000000" pitchFamily="2" charset="2"/>
+              </a:rPr>
+              <a:t> Point under consideration</a:t>
+            </a:r>
+            <a:endParaRPr kumimoji="1" lang="ja-JP" altLang="en-US" dirty="0"/>
+          </a:p>
+        </p:txBody>
+      </p:sp>
+      <p:sp>
+        <p:nvSpPr>
+          <p:cNvPr id="4" name="テキスト プレースホルダー 3">
+            <a:extLst>
+              <a:ext uri="{FF2B5EF4-FFF2-40B4-BE49-F238E27FC236}">
+                <a16:creationId xmlns:a16="http://schemas.microsoft.com/office/drawing/2014/main" id="{171F7195-BFBE-4FB5-98B9-906B47817396}"/>
+              </a:ext>
+            </a:extLst>
+          </p:cNvPr>
+          <p:cNvSpPr>
+            <a:spLocks noGrp="1"/>
+          </p:cNvSpPr>
+          <p:nvPr>
+            <p:ph type="body" idx="1"/>
+          </p:nvPr>
+        </p:nvSpPr>
+        <p:spPr/>
+        <p:txBody>
+          <a:bodyPr/>
+          <a:lstStyle/>
+          <a:p>
+            <a:r>
+              <a:rPr lang="en-US" altLang="ja-JP" dirty="0"/>
+              <a:t>Current Proposal:</a:t>
+            </a:r>
+          </a:p>
+          <a:p>
+            <a:pPr lvl="1"/>
+            <a:r>
+              <a:rPr lang="en-US" altLang="ja-JP" dirty="0"/>
+              <a:t>Slim down to “Declaration from distributor” (by</a:t>
+            </a:r>
+            <a:r>
+              <a:rPr lang="en-US" altLang="ja-JP" baseline="0" dirty="0"/>
+              <a:t> Fukuchi-</a:t>
+            </a:r>
+            <a:r>
+              <a:rPr lang="en-US" altLang="ja-JP" baseline="0" dirty="0" err="1"/>
+              <a:t>san</a:t>
+            </a:r>
+            <a:r>
+              <a:rPr lang="en-US" altLang="ja-JP" baseline="0" dirty="0"/>
+              <a:t>)</a:t>
+            </a:r>
+          </a:p>
+          <a:p>
+            <a:pPr lvl="0"/>
+            <a:r>
+              <a:rPr lang="en-US" altLang="ja-JP" dirty="0"/>
+              <a:t>Additional Point under consideration:</a:t>
+            </a:r>
+          </a:p>
+          <a:p>
+            <a:pPr lvl="1"/>
+            <a:r>
+              <a:rPr lang="en-US" altLang="ja-JP" dirty="0"/>
+              <a:t>Extend</a:t>
+            </a:r>
+            <a:r>
+              <a:rPr lang="en-US" altLang="ja-JP" baseline="0" dirty="0"/>
+              <a:t> &lt;Usage Profile&gt; to enable describe “Prerequisite Conditions”</a:t>
+            </a:r>
+          </a:p>
+          <a:p>
+            <a:pPr lvl="1"/>
+            <a:r>
+              <a:rPr lang="en-US" altLang="ja-JP" baseline="0" dirty="0"/>
+              <a:t>Not considered yet about consistency with whole other SPDX definitions </a:t>
+            </a:r>
+            <a:endParaRPr lang="ja-JP" altLang="en-US" dirty="0"/>
+          </a:p>
+        </p:txBody>
+      </p:sp>
+      <p:sp>
+        <p:nvSpPr>
+          <p:cNvPr id="5" name="テキスト プレースホルダー 4">
+            <a:extLst>
+              <a:ext uri="{FF2B5EF4-FFF2-40B4-BE49-F238E27FC236}">
+                <a16:creationId xmlns:a16="http://schemas.microsoft.com/office/drawing/2014/main" id="{6FA48D82-8F50-4440-9E8F-E1BBFA238FE5}"/>
+              </a:ext>
+            </a:extLst>
+          </p:cNvPr>
+          <p:cNvSpPr txBox="1">
+            <a:spLocks/>
+          </p:cNvSpPr>
+          <p:nvPr/>
+        </p:nvSpPr>
+        <p:spPr>
+          <a:xfrm>
+            <a:off x="228600" y="3414409"/>
+            <a:ext cx="8686799" cy="2866125"/>
+          </a:xfrm>
+          <a:prstGeom prst="rect">
+            <a:avLst/>
+          </a:prstGeom>
+          <a:noFill/>
+          <a:ln>
+            <a:noFill/>
+          </a:ln>
+        </p:spPr>
+        <p:txBody>
+          <a:bodyPr lIns="91425" tIns="91425" rIns="91425" bIns="91425" anchor="t" anchorCtr="0"/>
+          <a:lstStyle>
+            <a:defPPr marR="0" lvl="0" algn="l" rtl="0">
+              <a:lnSpc>
+                <a:spcPct val="100000"/>
+              </a:lnSpc>
+              <a:spcBef>
+                <a:spcPts val="0"/>
+              </a:spcBef>
+              <a:spcAft>
+                <a:spcPts val="0"/>
+              </a:spcAft>
+            </a:defPPr>
+            <a:lvl1pPr marL="168817" marR="0" lvl="0" indent="-49237" algn="l" rtl="0">
+              <a:lnSpc>
+                <a:spcPct val="100000"/>
+              </a:lnSpc>
+              <a:spcBef>
+                <a:spcPts val="443"/>
+              </a:spcBef>
+              <a:spcAft>
+                <a:spcPts val="0"/>
+              </a:spcAft>
+              <a:buClr>
+                <a:schemeClr val="accent1"/>
+              </a:buClr>
+              <a:buSzPct val="85000"/>
+              <a:buFont typeface="Arial"/>
+              <a:buChar char="•"/>
+              <a:defRPr sz="2215" b="0" i="0" u="none" strike="noStrike" cap="none">
+                <a:solidFill>
+                  <a:schemeClr val="dk1"/>
+                </a:solidFill>
+                <a:latin typeface="Roboto"/>
+                <a:ea typeface="Roboto"/>
+                <a:cs typeface="Roboto"/>
+                <a:sym typeface="Roboto"/>
+              </a:defRPr>
+            </a:lvl1pPr>
+            <a:lvl2pPr marL="422041" marR="0" lvl="1" indent="-76202" algn="l" rtl="0">
+              <a:lnSpc>
+                <a:spcPct val="100000"/>
+              </a:lnSpc>
+              <a:spcBef>
+                <a:spcPts val="369"/>
+              </a:spcBef>
+              <a:spcAft>
+                <a:spcPts val="0"/>
+              </a:spcAft>
+              <a:buClr>
+                <a:schemeClr val="accent1"/>
+              </a:buClr>
+              <a:buSzPct val="85000"/>
+              <a:buFont typeface="Arial"/>
+              <a:buChar char="•"/>
+              <a:defRPr sz="1846" b="0" i="0" u="none" strike="noStrike" cap="none">
+                <a:solidFill>
+                  <a:schemeClr val="dk1"/>
+                </a:solidFill>
+                <a:latin typeface="Roboto"/>
+                <a:ea typeface="Roboto"/>
+                <a:cs typeface="Roboto"/>
+                <a:sym typeface="Roboto"/>
+              </a:defRPr>
+            </a:lvl2pPr>
+            <a:lvl3pPr marL="675266" marR="0" lvl="2" indent="-76202" algn="l" rtl="0">
+              <a:lnSpc>
+                <a:spcPct val="100000"/>
+              </a:lnSpc>
+              <a:spcBef>
+                <a:spcPts val="332"/>
+              </a:spcBef>
+              <a:spcAft>
+                <a:spcPts val="0"/>
+              </a:spcAft>
+              <a:buClr>
+                <a:schemeClr val="accent1"/>
+              </a:buClr>
+              <a:buSzPct val="90000"/>
+              <a:buFont typeface="Arial"/>
+              <a:buChar char="•"/>
+              <a:defRPr sz="1662" b="0" i="0" u="none" strike="noStrike" cap="none">
+                <a:solidFill>
+                  <a:schemeClr val="dk1"/>
+                </a:solidFill>
+                <a:latin typeface="Roboto"/>
+                <a:ea typeface="Roboto"/>
+                <a:cs typeface="Roboto"/>
+                <a:sym typeface="Roboto"/>
+              </a:defRPr>
+            </a:lvl3pPr>
+            <a:lvl4pPr marL="928490" marR="0" lvl="3" indent="-84407" algn="l" rtl="0">
+              <a:lnSpc>
+                <a:spcPct val="100000"/>
+              </a:lnSpc>
+              <a:spcBef>
+                <a:spcPts val="295"/>
+              </a:spcBef>
+              <a:spcAft>
+                <a:spcPts val="0"/>
+              </a:spcAft>
+              <a:buClr>
+                <a:schemeClr val="accent1"/>
+              </a:buClr>
+              <a:buSzPct val="100000"/>
+              <a:buFont typeface="Arial"/>
+              <a:buChar char="•"/>
+              <a:defRPr sz="1477" b="0" i="0" u="none" strike="noStrike" cap="none">
+                <a:solidFill>
+                  <a:schemeClr val="dk1"/>
+                </a:solidFill>
+                <a:latin typeface="Roboto"/>
+                <a:ea typeface="Roboto"/>
+                <a:cs typeface="Roboto"/>
+                <a:sym typeface="Roboto"/>
+              </a:defRPr>
+            </a:lvl4pPr>
+            <a:lvl5pPr marL="1097307" marR="0" lvl="4" indent="-53927" algn="l" rtl="0">
+              <a:lnSpc>
+                <a:spcPct val="100000"/>
+              </a:lnSpc>
+              <a:spcBef>
+                <a:spcPts val="258"/>
+              </a:spcBef>
+              <a:spcAft>
+                <a:spcPts val="0"/>
+              </a:spcAft>
+              <a:buClr>
+                <a:schemeClr val="accent1"/>
+              </a:buClr>
+              <a:buSzPct val="100000"/>
+              <a:buFont typeface="Arial"/>
+              <a:buChar char="•"/>
+              <a:defRPr sz="1292" b="0" i="0" u="none" strike="noStrike" cap="none">
+                <a:solidFill>
+                  <a:schemeClr val="dk1"/>
+                </a:solidFill>
+                <a:latin typeface="Roboto"/>
+                <a:ea typeface="Roboto"/>
+                <a:cs typeface="Roboto"/>
+                <a:sym typeface="Roboto"/>
+              </a:defRPr>
+            </a:lvl5pPr>
+            <a:lvl6pPr marL="1266124" marR="0" lvl="5" indent="-99649" algn="l" rtl="0">
+              <a:lnSpc>
+                <a:spcPct val="100000"/>
+              </a:lnSpc>
+              <a:spcBef>
+                <a:spcPts val="240"/>
+              </a:spcBef>
+              <a:spcAft>
+                <a:spcPts val="0"/>
+              </a:spcAft>
+              <a:buClr>
+                <a:schemeClr val="accent1"/>
+              </a:buClr>
+              <a:buSzPct val="100000"/>
+              <a:buFont typeface="Arial"/>
+              <a:buChar char="•"/>
+              <a:defRPr sz="1200" b="0" i="0" u="none" strike="noStrike" cap="none">
+                <a:solidFill>
+                  <a:schemeClr val="dk1"/>
+                </a:solidFill>
+                <a:latin typeface="Arial"/>
+                <a:ea typeface="Arial"/>
+                <a:cs typeface="Arial"/>
+                <a:sym typeface="Arial"/>
+              </a:defRPr>
+            </a:lvl6pPr>
+            <a:lvl7pPr marL="1434940" marR="0" lvl="6" indent="-92615" algn="l" rtl="0">
+              <a:lnSpc>
+                <a:spcPct val="100000"/>
+              </a:lnSpc>
+              <a:spcBef>
+                <a:spcPts val="240"/>
+              </a:spcBef>
+              <a:spcAft>
+                <a:spcPts val="0"/>
+              </a:spcAft>
+              <a:buClr>
+                <a:schemeClr val="accent1"/>
+              </a:buClr>
+              <a:buSzPct val="100000"/>
+              <a:buFont typeface="Arial"/>
+              <a:buChar char="•"/>
+              <a:defRPr sz="1200" b="0" i="0" u="none" strike="noStrike" cap="none">
+                <a:solidFill>
+                  <a:schemeClr val="dk1"/>
+                </a:solidFill>
+                <a:latin typeface="Arial"/>
+                <a:ea typeface="Arial"/>
+                <a:cs typeface="Arial"/>
+                <a:sym typeface="Arial"/>
+              </a:defRPr>
+            </a:lvl7pPr>
+            <a:lvl8pPr marL="1603757" marR="0" lvl="7" indent="-97304" algn="l" rtl="0">
+              <a:lnSpc>
+                <a:spcPct val="100000"/>
+              </a:lnSpc>
+              <a:spcBef>
+                <a:spcPts val="240"/>
+              </a:spcBef>
+              <a:spcAft>
+                <a:spcPts val="0"/>
+              </a:spcAft>
+              <a:buClr>
+                <a:schemeClr val="accent1"/>
+              </a:buClr>
+              <a:buSzPct val="100000"/>
+              <a:buFont typeface="Arial"/>
+              <a:buChar char="•"/>
+              <a:defRPr sz="1200" b="0" i="0" u="none" strike="noStrike" cap="none">
+                <a:solidFill>
+                  <a:schemeClr val="dk1"/>
+                </a:solidFill>
+                <a:latin typeface="Arial"/>
+                <a:ea typeface="Arial"/>
+                <a:cs typeface="Arial"/>
+                <a:sym typeface="Arial"/>
+              </a:defRPr>
+            </a:lvl8pPr>
+            <a:lvl9pPr marL="1772574" marR="0" lvl="8" indent="-101992" algn="l" rtl="0">
+              <a:lnSpc>
+                <a:spcPct val="100000"/>
+              </a:lnSpc>
+              <a:spcBef>
+                <a:spcPts val="240"/>
+              </a:spcBef>
+              <a:spcAft>
+                <a:spcPts val="0"/>
+              </a:spcAft>
+              <a:buClr>
+                <a:schemeClr val="accent1"/>
+              </a:buClr>
+              <a:buSzPct val="100000"/>
+              <a:buFont typeface="Arial"/>
+              <a:buChar char="•"/>
+              <a:defRPr sz="1200" b="0" i="0" u="none" strike="noStrike" cap="none">
+                <a:solidFill>
+                  <a:schemeClr val="dk1"/>
+                </a:solidFill>
+                <a:latin typeface="Arial"/>
+                <a:ea typeface="Arial"/>
+                <a:cs typeface="Arial"/>
+                <a:sym typeface="Arial"/>
+              </a:defRPr>
+            </a:lvl9pPr>
+          </a:lstStyle>
+          <a:p>
+            <a:pPr marL="119580" indent="0" defTabSz="914400">
+              <a:buNone/>
+            </a:pPr>
+            <a:r>
+              <a:rPr lang="en-US" altLang="ja-JP" sz="1200" kern="0" dirty="0"/>
+              <a:t>Such as:</a:t>
+            </a:r>
+          </a:p>
+          <a:p>
+            <a:pPr defTabSz="914400"/>
+            <a:r>
+              <a:rPr lang="en-US" altLang="ja-JP" sz="1200" kern="0" dirty="0"/>
+              <a:t>Scope of &lt;this Usage Profile closure&gt; is “binary package portion of this software for Product A”</a:t>
+            </a:r>
+            <a:br>
+              <a:rPr lang="en-US" altLang="ja-JP" sz="1200" kern="0" dirty="0"/>
+            </a:br>
+            <a:r>
+              <a:rPr lang="en-US" altLang="ja-JP" sz="1200" kern="0" dirty="0"/>
+              <a:t>     </a:t>
+            </a:r>
+            <a:r>
+              <a:rPr lang="en-US" altLang="ja-JP" sz="1200" kern="0" dirty="0" err="1"/>
+              <a:t>Concluded_License</a:t>
+            </a:r>
+            <a:r>
+              <a:rPr lang="en-US" altLang="ja-JP" sz="1200" kern="0" dirty="0"/>
+              <a:t> is “MIT” (selected specific license term from dual license, i.e.)</a:t>
+            </a:r>
+            <a:br>
+              <a:rPr lang="en-US" altLang="ja-JP" sz="1200" kern="0" dirty="0"/>
+            </a:br>
+            <a:r>
+              <a:rPr lang="en-US" altLang="ja-JP" sz="1200" kern="0" dirty="0"/>
+              <a:t>     Security Profile closure such as “issues on CVE </a:t>
+            </a:r>
+            <a:r>
+              <a:rPr lang="en-US" altLang="ja-JP" sz="1200" kern="0" dirty="0" err="1"/>
+              <a:t>xxxx</a:t>
+            </a:r>
+            <a:r>
+              <a:rPr lang="en-US" altLang="ja-JP" sz="1200" kern="0" dirty="0"/>
+              <a:t> is not affects to this binary due to compile time definitions”</a:t>
+            </a:r>
+            <a:br>
+              <a:rPr lang="en-US" altLang="ja-JP" sz="1200" kern="0" dirty="0"/>
+            </a:br>
+            <a:r>
+              <a:rPr lang="en-US" altLang="ja-JP" sz="1200" kern="0" dirty="0"/>
+              <a:t>     </a:t>
+            </a:r>
+            <a:r>
+              <a:rPr lang="en-US" altLang="ja-JP" sz="1200" kern="0" dirty="0" err="1"/>
+              <a:t>RelationShip</a:t>
+            </a:r>
+            <a:r>
+              <a:rPr lang="en-US" altLang="ja-JP" sz="1200" kern="0" dirty="0"/>
+              <a:t> of “binary package portion of this software” with “Product A” is “Plug In”</a:t>
+            </a:r>
+            <a:br>
+              <a:rPr lang="en-US" altLang="ja-JP" sz="1200" kern="0" dirty="0"/>
+            </a:br>
+            <a:r>
+              <a:rPr lang="en-US" altLang="ja-JP" sz="1200" kern="0" dirty="0"/>
+              <a:t>     </a:t>
+            </a:r>
+            <a:r>
+              <a:rPr lang="en-US" altLang="ja-JP" sz="1200" kern="0" dirty="0" err="1"/>
+              <a:t>File_Analized</a:t>
+            </a:r>
+            <a:r>
+              <a:rPr lang="en-US" altLang="ja-JP" sz="1200" kern="0" dirty="0"/>
+              <a:t> tag of &lt;this Usage Profile closure&gt; is FALSE  (in the case of hand written SPDX desc. by distributor)</a:t>
+            </a:r>
+            <a:br>
+              <a:rPr lang="en-US" altLang="ja-JP" sz="1200" kern="0" dirty="0"/>
+            </a:br>
+            <a:r>
+              <a:rPr lang="en-US" altLang="ja-JP" sz="1200" kern="0" dirty="0"/>
+              <a:t>     </a:t>
+            </a:r>
+            <a:r>
+              <a:rPr lang="en-US" altLang="ja-JP" sz="1200" kern="0" dirty="0" err="1"/>
+              <a:t>Valid_Until</a:t>
+            </a:r>
+            <a:r>
+              <a:rPr lang="en-US" altLang="ja-JP" sz="1200" kern="0" dirty="0"/>
+              <a:t> &lt;date/timeframe&gt; “further CVE updates are issued”; or &lt;software package condition&gt; “unless rebuilt binary by consumer of this software package”; or &lt;person/organization who received this SPDX file&gt; “closed party who concluded agreement of Product A development” </a:t>
+            </a:r>
+          </a:p>
+          <a:p>
+            <a:pPr defTabSz="914400"/>
+            <a:r>
+              <a:rPr lang="en-US" altLang="ja-JP" sz="1200" kern="0" dirty="0"/>
+              <a:t>End of scope &lt;this Usage Profile closure&gt;</a:t>
+            </a:r>
+          </a:p>
+          <a:p>
+            <a:pPr defTabSz="914400"/>
+            <a:endParaRPr lang="en-US" altLang="ja-JP" sz="1200" kern="0" dirty="0"/>
+          </a:p>
+          <a:p>
+            <a:pPr defTabSz="914400"/>
+            <a:r>
+              <a:rPr lang="en-US" altLang="ja-JP" sz="1200" kern="0" dirty="0"/>
+              <a:t>Condition field of scope determination is would have following types</a:t>
+            </a:r>
+            <a:br>
+              <a:rPr lang="en-US" altLang="ja-JP" sz="1200" kern="0" dirty="0"/>
+            </a:br>
+            <a:r>
+              <a:rPr lang="en-US" altLang="ja-JP" sz="1200" kern="0" dirty="0"/>
+              <a:t>     Specific part of the software package which mentioned in SPDX file</a:t>
+            </a:r>
+            <a:br>
+              <a:rPr lang="en-US" altLang="ja-JP" sz="1200" kern="0" dirty="0"/>
+            </a:br>
+            <a:r>
+              <a:rPr lang="en-US" altLang="ja-JP" sz="1200" kern="0" dirty="0"/>
+              <a:t>     Compile Options to build binary for specific product</a:t>
+            </a:r>
+            <a:br>
+              <a:rPr lang="en-US" altLang="ja-JP" sz="1200" kern="0" dirty="0"/>
+            </a:br>
+            <a:r>
+              <a:rPr lang="en-US" altLang="ja-JP" sz="1200" kern="0" dirty="0"/>
+              <a:t>     Date or specific timeframe descriptions such as “development phase of the product” or “expected timeline of further security investigation”</a:t>
+            </a:r>
+            <a:br>
+              <a:rPr lang="en-US" altLang="ja-JP" sz="1200" kern="0" dirty="0"/>
+            </a:br>
+            <a:r>
+              <a:rPr lang="en-US" altLang="ja-JP" sz="1200" kern="0" dirty="0"/>
+              <a:t>     Target Product / Environment which assumed by author of Usage Profile closure as a distributor of the software</a:t>
+            </a:r>
+          </a:p>
+        </p:txBody>
+      </p:sp>
+    </p:spTree>
+    <p:extLst>
+      <p:ext uri="{BB962C8B-B14F-4D97-AF65-F5344CB8AC3E}">
+        <p14:creationId xmlns:p14="http://schemas.microsoft.com/office/powerpoint/2010/main" val="563971528"/>
+      </p:ext>
+    </p:extLst>
+  </p:cSld>
+  <p:clrMapOvr>
+    <a:masterClrMapping/>
+  </p:clrMapOvr>
+</p:sld>
+</file>
+
+<file path=ppt/slides/slide17.xml><?xml version="1.0" encoding="utf-8"?>
+<p:sld xmlns:a="http://schemas.openxmlformats.org/drawingml/2006/main" xmlns:r="http://schemas.openxmlformats.org/officeDocument/2006/relationships" xmlns:p="http://schemas.openxmlformats.org/presentationml/2006/main">
+  <p:cSld>
+    <p:spTree>
+      <p:nvGrpSpPr>
+        <p:cNvPr id="1" name=""/>
+        <p:cNvGrpSpPr/>
+        <p:nvPr/>
+      </p:nvGrpSpPr>
+      <p:grpSpPr>
+        <a:xfrm>
+          <a:off x="0" y="0"/>
+          <a:ext cx="0" cy="0"/>
+          <a:chOff x="0" y="0"/>
+          <a:chExt cx="0" cy="0"/>
+        </a:xfrm>
+      </p:grpSpPr>
+      <p:sp>
+        <p:nvSpPr>
           <p:cNvPr id="2" name="タイトル 1">
             <a:extLst>
               <a:ext uri="{FF2B5EF4-FFF2-40B4-BE49-F238E27FC236}">
@@ -12860,7 +13062,7 @@
 </p:sld>
 </file>
 
-<file path=ppt/slides/slide16.xml><?xml version="1.0" encoding="utf-8"?>
+<file path=ppt/slides/slide18.xml><?xml version="1.0" encoding="utf-8"?>
 <p:sld xmlns:a="http://schemas.openxmlformats.org/drawingml/2006/main" xmlns:r="http://schemas.openxmlformats.org/officeDocument/2006/relationships" xmlns:p="http://schemas.openxmlformats.org/presentationml/2006/main">
   <p:cSld>
     <p:spTree>
@@ -13257,7 +13459,7 @@
 </p:sld>
 </file>
 
-<file path=ppt/slides/slide17.xml><?xml version="1.0" encoding="utf-8"?>
+<file path=ppt/slides/slide19.xml><?xml version="1.0" encoding="utf-8"?>
 <p:sld xmlns:a="http://schemas.openxmlformats.org/drawingml/2006/main" xmlns:r="http://schemas.openxmlformats.org/officeDocument/2006/relationships" xmlns:p="http://schemas.openxmlformats.org/presentationml/2006/main">
   <p:cSld>
     <p:spTree>
@@ -14132,374 +14334,6 @@
 </p:sld>
 </file>
 
-<file path=ppt/slides/slide18.xml><?xml version="1.0" encoding="utf-8"?>
-<p:sld xmlns:a="http://schemas.openxmlformats.org/drawingml/2006/main" xmlns:r="http://schemas.openxmlformats.org/officeDocument/2006/relationships" xmlns:p="http://schemas.openxmlformats.org/presentationml/2006/main">
-  <p:cSld>
-    <p:spTree>
-      <p:nvGrpSpPr>
-        <p:cNvPr id="1" name=""/>
-        <p:cNvGrpSpPr/>
-        <p:nvPr/>
-      </p:nvGrpSpPr>
-      <p:grpSpPr>
-        <a:xfrm>
-          <a:off x="0" y="0"/>
-          <a:ext cx="0" cy="0"/>
-          <a:chOff x="0" y="0"/>
-          <a:chExt cx="0" cy="0"/>
-        </a:xfrm>
-      </p:grpSpPr>
-      <p:sp>
-        <p:nvSpPr>
-          <p:cNvPr id="4" name="タイトル 3">
-            <a:extLst>
-              <a:ext uri="{FF2B5EF4-FFF2-40B4-BE49-F238E27FC236}">
-                <a16:creationId xmlns:a16="http://schemas.microsoft.com/office/drawing/2014/main" id="{9DA87A08-1129-4D0B-B4B3-44C2C6F398D7}"/>
-              </a:ext>
-            </a:extLst>
-          </p:cNvPr>
-          <p:cNvSpPr>
-            <a:spLocks noGrp="1"/>
-          </p:cNvSpPr>
-          <p:nvPr>
-            <p:ph type="title"/>
-          </p:nvPr>
-        </p:nvSpPr>
-        <p:spPr/>
-        <p:txBody>
-          <a:bodyPr/>
-          <a:lstStyle/>
-          <a:p>
-            <a:r>
-              <a:rPr lang="en-US" altLang="ja-JP" dirty="0"/>
-              <a:t>Record by OEM for self use</a:t>
-            </a:r>
-            <a:endParaRPr lang="ja-JP" altLang="en-US" dirty="0"/>
-          </a:p>
-        </p:txBody>
-      </p:sp>
-      <p:sp>
-        <p:nvSpPr>
-          <p:cNvPr id="5" name="テキスト プレースホルダー 4">
-            <a:extLst>
-              <a:ext uri="{FF2B5EF4-FFF2-40B4-BE49-F238E27FC236}">
-                <a16:creationId xmlns:a16="http://schemas.microsoft.com/office/drawing/2014/main" id="{5A25B7D1-CC9C-4B5B-BE7C-2E90AC12818D}"/>
-              </a:ext>
-            </a:extLst>
-          </p:cNvPr>
-          <p:cNvSpPr>
-            <a:spLocks noGrp="1"/>
-          </p:cNvSpPr>
-          <p:nvPr>
-            <p:ph type="body" idx="1"/>
-          </p:nvPr>
-        </p:nvSpPr>
-        <p:spPr>
-          <a:xfrm>
-            <a:off x="1149531" y="2653154"/>
-            <a:ext cx="3532777" cy="3347051"/>
-          </a:xfrm>
-          <a:solidFill>
-            <a:schemeClr val="bg1"/>
-          </a:solidFill>
-          <a:ln>
-            <a:solidFill>
-              <a:schemeClr val="accent1">
-                <a:lumMod val="50000"/>
-              </a:schemeClr>
-            </a:solidFill>
-          </a:ln>
-        </p:spPr>
-        <p:txBody>
-          <a:bodyPr/>
-          <a:lstStyle/>
-          <a:p>
-            <a:r>
-              <a:rPr lang="en-US" altLang="ja-JP" sz="1000" dirty="0"/>
-              <a:t>Example #1</a:t>
-            </a:r>
-          </a:p>
-          <a:p>
-            <a:endParaRPr lang="en-US" altLang="ja-JP" sz="1000" dirty="0"/>
-          </a:p>
-          <a:p>
-            <a:r>
-              <a:rPr lang="en-US" altLang="ja-JP" sz="1000" dirty="0"/>
-              <a:t>#Product_Name:</a:t>
-            </a:r>
-            <a:r>
-              <a:rPr lang="ja-JP" altLang="en-US" sz="1000" dirty="0"/>
-              <a:t> </a:t>
-            </a:r>
-            <a:r>
-              <a:rPr lang="en-US" altLang="ja-JP" sz="1000" dirty="0"/>
-              <a:t>ABC</a:t>
-            </a:r>
-          </a:p>
-          <a:p>
-            <a:r>
-              <a:rPr lang="en-US" altLang="ja-JP" sz="1000" dirty="0"/>
-              <a:t>#Product_Version:</a:t>
-            </a:r>
-            <a:r>
-              <a:rPr lang="ja-JP" altLang="en-US" sz="1000" dirty="0"/>
-              <a:t> </a:t>
-            </a:r>
-            <a:r>
-              <a:rPr lang="en-US" altLang="ja-JP" sz="1000" dirty="0"/>
-              <a:t>1.1</a:t>
-            </a:r>
-          </a:p>
-          <a:p>
-            <a:r>
-              <a:rPr lang="en-US" altLang="ja-JP" sz="1000" dirty="0"/>
-              <a:t>#Usage_Level: </a:t>
-            </a:r>
-            <a:r>
-              <a:rPr lang="en-US" altLang="ja-JP" sz="1000" dirty="0" err="1"/>
-              <a:t>Usage_Level_Production</a:t>
-            </a:r>
-            <a:endParaRPr lang="en-US" altLang="ja-JP" sz="1000" dirty="0"/>
-          </a:p>
-          <a:p>
-            <a:endParaRPr lang="en-US" altLang="ja-JP" sz="1000" dirty="0"/>
-          </a:p>
-          <a:p>
-            <a:r>
-              <a:rPr lang="en-US" altLang="ja-JP" sz="1000" dirty="0"/>
-              <a:t>(#Usage_Level_License_Clearance: No</a:t>
-            </a:r>
-          </a:p>
-          <a:p>
-            <a:pPr lvl="1"/>
-            <a:r>
-              <a:rPr lang="en-US" altLang="ja-JP" sz="1000" dirty="0"/>
-              <a:t>#Comment:</a:t>
-            </a:r>
-            <a:r>
-              <a:rPr lang="ja-JP" altLang="en-US" sz="1000" dirty="0"/>
-              <a:t> </a:t>
-            </a:r>
-            <a:r>
-              <a:rPr lang="en-US" altLang="ja-JP" sz="1000" dirty="0"/>
-              <a:t>GPLv3</a:t>
-            </a:r>
-            <a:r>
-              <a:rPr lang="ja-JP" altLang="en-US" sz="1000" dirty="0"/>
-              <a:t> </a:t>
-            </a:r>
-            <a:r>
-              <a:rPr lang="en-US" altLang="ja-JP" sz="1000" dirty="0"/>
-              <a:t>Included</a:t>
-            </a:r>
-          </a:p>
-          <a:p>
-            <a:r>
-              <a:rPr lang="en-US" altLang="ja-JP" sz="1000" dirty="0"/>
-              <a:t>#Usage_Level_Verification_Test: Done</a:t>
-            </a:r>
-          </a:p>
-          <a:p>
-            <a:pPr lvl="2"/>
-            <a:r>
-              <a:rPr lang="en-US" altLang="ja-JP" sz="1000" dirty="0"/>
-              <a:t>#Test_Level:</a:t>
-            </a:r>
-            <a:r>
-              <a:rPr lang="ja-JP" altLang="en-US" sz="1000" dirty="0"/>
-              <a:t> </a:t>
-            </a:r>
-            <a:r>
-              <a:rPr lang="en-US" altLang="ja-JP" sz="1000" dirty="0"/>
-              <a:t>Minimum Test</a:t>
-            </a:r>
-          </a:p>
-          <a:p>
-            <a:r>
-              <a:rPr lang="en-US" altLang="ja-JP" sz="1000" dirty="0"/>
-              <a:t>#Usage_Level_Vulnerability: Done</a:t>
-            </a:r>
-          </a:p>
-          <a:p>
-            <a:pPr lvl="1"/>
-            <a:r>
-              <a:rPr lang="en-US" altLang="ja-JP" sz="1000" dirty="0"/>
-              <a:t>#Level: Latest</a:t>
-            </a:r>
-          </a:p>
-          <a:p>
-            <a:pPr lvl="2"/>
-            <a:r>
-              <a:rPr lang="en-US" altLang="ja-JP" sz="1000" dirty="0"/>
-              <a:t>#Comment: CVE_XXX </a:t>
-            </a:r>
-          </a:p>
-          <a:p>
-            <a:pPr lvl="1"/>
-            <a:r>
-              <a:rPr lang="en-US" altLang="ja-JP" sz="1000" dirty="0"/>
-              <a:t>#Plan_to_update</a:t>
-            </a:r>
-          </a:p>
-          <a:p>
-            <a:pPr lvl="2"/>
-            <a:r>
-              <a:rPr lang="en-US" altLang="ja-JP" sz="1000" dirty="0" err="1"/>
-              <a:t>Current_Date</a:t>
-            </a:r>
-            <a:endParaRPr lang="en-US" altLang="ja-JP" sz="1000" dirty="0"/>
-          </a:p>
-          <a:p>
-            <a:pPr lvl="2"/>
-            <a:r>
-              <a:rPr lang="en-US" altLang="ja-JP" sz="1000" dirty="0" err="1"/>
-              <a:t>Planned_Date</a:t>
-            </a:r>
-            <a:endParaRPr lang="en-US" altLang="ja-JP" sz="1000" dirty="0"/>
-          </a:p>
-          <a:p>
-            <a:pPr lvl="2"/>
-            <a:r>
-              <a:rPr lang="en-US" altLang="ja-JP" sz="1000" dirty="0"/>
-              <a:t>No)</a:t>
-            </a:r>
-          </a:p>
-        </p:txBody>
-      </p:sp>
-      <p:sp>
-        <p:nvSpPr>
-          <p:cNvPr id="2" name="テキスト ボックス 1">
-            <a:extLst>
-              <a:ext uri="{FF2B5EF4-FFF2-40B4-BE49-F238E27FC236}">
-                <a16:creationId xmlns:a16="http://schemas.microsoft.com/office/drawing/2014/main" id="{4F91B9DA-36B3-4EB4-83AF-5067E8DB740C}"/>
-              </a:ext>
-            </a:extLst>
-          </p:cNvPr>
-          <p:cNvSpPr txBox="1"/>
-          <p:nvPr/>
-        </p:nvSpPr>
-        <p:spPr>
-          <a:xfrm>
-            <a:off x="1149531" y="1828800"/>
-            <a:ext cx="1471749" cy="369332"/>
-          </a:xfrm>
-          <a:prstGeom prst="rect">
-            <a:avLst/>
-          </a:prstGeom>
-          <a:solidFill>
-            <a:schemeClr val="accent1">
-              <a:lumMod val="50000"/>
-            </a:schemeClr>
-          </a:solidFill>
-        </p:spPr>
-        <p:txBody>
-          <a:bodyPr wrap="square" rtlCol="0">
-            <a:spAutoFit/>
-          </a:bodyPr>
-          <a:lstStyle/>
-          <a:p>
-            <a:pPr algn="ctr"/>
-            <a:r>
-              <a:rPr kumimoji="1" lang="en-US" altLang="ja-JP" dirty="0">
-                <a:solidFill>
-                  <a:schemeClr val="bg1"/>
-                </a:solidFill>
-              </a:rPr>
-              <a:t>OEM</a:t>
-            </a:r>
-            <a:endParaRPr kumimoji="1" lang="ja-JP" altLang="en-US" dirty="0">
-              <a:solidFill>
-                <a:schemeClr val="bg1"/>
-              </a:solidFill>
-            </a:endParaRPr>
-          </a:p>
-        </p:txBody>
-      </p:sp>
-      <p:sp>
-        <p:nvSpPr>
-          <p:cNvPr id="7" name="テキスト ボックス 6">
-            <a:extLst>
-              <a:ext uri="{FF2B5EF4-FFF2-40B4-BE49-F238E27FC236}">
-                <a16:creationId xmlns:a16="http://schemas.microsoft.com/office/drawing/2014/main" id="{1313867C-EE53-4CE8-A3A1-B14F619F895B}"/>
-              </a:ext>
-            </a:extLst>
-          </p:cNvPr>
-          <p:cNvSpPr txBox="1"/>
-          <p:nvPr/>
-        </p:nvSpPr>
-        <p:spPr>
-          <a:xfrm>
-            <a:off x="566056" y="1415535"/>
-            <a:ext cx="1471749" cy="369332"/>
-          </a:xfrm>
-          <a:prstGeom prst="rect">
-            <a:avLst/>
-          </a:prstGeom>
-          <a:noFill/>
-        </p:spPr>
-        <p:txBody>
-          <a:bodyPr wrap="square" rtlCol="0">
-            <a:spAutoFit/>
-          </a:bodyPr>
-          <a:lstStyle/>
-          <a:p>
-            <a:r>
-              <a:rPr kumimoji="1" lang="en-US" altLang="ja-JP" dirty="0"/>
-              <a:t>Use case #2</a:t>
-            </a:r>
-            <a:endParaRPr kumimoji="1" lang="ja-JP" altLang="en-US" dirty="0"/>
-          </a:p>
-        </p:txBody>
-      </p:sp>
-      <p:sp>
-        <p:nvSpPr>
-          <p:cNvPr id="10" name="テキスト ボックス 9">
-            <a:extLst>
-              <a:ext uri="{FF2B5EF4-FFF2-40B4-BE49-F238E27FC236}">
-                <a16:creationId xmlns:a16="http://schemas.microsoft.com/office/drawing/2014/main" id="{827FC21B-4535-4A18-9B19-7DEEC10DAB50}"/>
-              </a:ext>
-            </a:extLst>
-          </p:cNvPr>
-          <p:cNvSpPr txBox="1"/>
-          <p:nvPr/>
-        </p:nvSpPr>
-        <p:spPr>
-          <a:xfrm>
-            <a:off x="2764971" y="1794357"/>
-            <a:ext cx="4837612" cy="369332"/>
-          </a:xfrm>
-          <a:prstGeom prst="rect">
-            <a:avLst/>
-          </a:prstGeom>
-          <a:noFill/>
-        </p:spPr>
-        <p:txBody>
-          <a:bodyPr wrap="square" rtlCol="0">
-            <a:spAutoFit/>
-          </a:bodyPr>
-          <a:lstStyle/>
-          <a:p>
-            <a:r>
-              <a:rPr kumimoji="1" lang="en-US" altLang="ja-JP" dirty="0"/>
-              <a:t>Record for self use, not for distribution</a:t>
-            </a:r>
-            <a:endParaRPr kumimoji="1" lang="ja-JP" altLang="en-US" dirty="0"/>
-          </a:p>
-        </p:txBody>
-      </p:sp>
-    </p:spTree>
-    <p:extLst>
-      <p:ext uri="{BB962C8B-B14F-4D97-AF65-F5344CB8AC3E}">
-        <p14:creationId xmlns:p14="http://schemas.microsoft.com/office/powerpoint/2010/main" val="680651535"/>
-      </p:ext>
-    </p:extLst>
-  </p:cSld>
-  <p:clrMapOvr>
-    <a:masterClrMapping/>
-  </p:clrMapOvr>
-</p:sld>
-</file>
-
 <file path=ppt/slides/slide2.xml><?xml version="1.0" encoding="utf-8"?>
 <p:sld xmlns:a="http://schemas.openxmlformats.org/drawingml/2006/main" xmlns:r="http://schemas.openxmlformats.org/officeDocument/2006/relationships" xmlns:p="http://schemas.openxmlformats.org/presentationml/2006/main">
   <p:cSld>
@@ -15530,6 +15364,374 @@
     <p:extLst>
       <p:ext uri="{BB962C8B-B14F-4D97-AF65-F5344CB8AC3E}">
         <p14:creationId xmlns:p14="http://schemas.microsoft.com/office/powerpoint/2010/main" val="2350897081"/>
+      </p:ext>
+    </p:extLst>
+  </p:cSld>
+  <p:clrMapOvr>
+    <a:masterClrMapping/>
+  </p:clrMapOvr>
+</p:sld>
+</file>
+
+<file path=ppt/slides/slide20.xml><?xml version="1.0" encoding="utf-8"?>
+<p:sld xmlns:a="http://schemas.openxmlformats.org/drawingml/2006/main" xmlns:r="http://schemas.openxmlformats.org/officeDocument/2006/relationships" xmlns:p="http://schemas.openxmlformats.org/presentationml/2006/main">
+  <p:cSld>
+    <p:spTree>
+      <p:nvGrpSpPr>
+        <p:cNvPr id="1" name=""/>
+        <p:cNvGrpSpPr/>
+        <p:nvPr/>
+      </p:nvGrpSpPr>
+      <p:grpSpPr>
+        <a:xfrm>
+          <a:off x="0" y="0"/>
+          <a:ext cx="0" cy="0"/>
+          <a:chOff x="0" y="0"/>
+          <a:chExt cx="0" cy="0"/>
+        </a:xfrm>
+      </p:grpSpPr>
+      <p:sp>
+        <p:nvSpPr>
+          <p:cNvPr id="4" name="タイトル 3">
+            <a:extLst>
+              <a:ext uri="{FF2B5EF4-FFF2-40B4-BE49-F238E27FC236}">
+                <a16:creationId xmlns:a16="http://schemas.microsoft.com/office/drawing/2014/main" id="{9DA87A08-1129-4D0B-B4B3-44C2C6F398D7}"/>
+              </a:ext>
+            </a:extLst>
+          </p:cNvPr>
+          <p:cNvSpPr>
+            <a:spLocks noGrp="1"/>
+          </p:cNvSpPr>
+          <p:nvPr>
+            <p:ph type="title"/>
+          </p:nvPr>
+        </p:nvSpPr>
+        <p:spPr/>
+        <p:txBody>
+          <a:bodyPr/>
+          <a:lstStyle/>
+          <a:p>
+            <a:r>
+              <a:rPr lang="en-US" altLang="ja-JP" dirty="0"/>
+              <a:t>Record by OEM for self use</a:t>
+            </a:r>
+            <a:endParaRPr lang="ja-JP" altLang="en-US" dirty="0"/>
+          </a:p>
+        </p:txBody>
+      </p:sp>
+      <p:sp>
+        <p:nvSpPr>
+          <p:cNvPr id="5" name="テキスト プレースホルダー 4">
+            <a:extLst>
+              <a:ext uri="{FF2B5EF4-FFF2-40B4-BE49-F238E27FC236}">
+                <a16:creationId xmlns:a16="http://schemas.microsoft.com/office/drawing/2014/main" id="{5A25B7D1-CC9C-4B5B-BE7C-2E90AC12818D}"/>
+              </a:ext>
+            </a:extLst>
+          </p:cNvPr>
+          <p:cNvSpPr>
+            <a:spLocks noGrp="1"/>
+          </p:cNvSpPr>
+          <p:nvPr>
+            <p:ph type="body" idx="1"/>
+          </p:nvPr>
+        </p:nvSpPr>
+        <p:spPr>
+          <a:xfrm>
+            <a:off x="1149531" y="2653154"/>
+            <a:ext cx="3532777" cy="3347051"/>
+          </a:xfrm>
+          <a:solidFill>
+            <a:schemeClr val="bg1"/>
+          </a:solidFill>
+          <a:ln>
+            <a:solidFill>
+              <a:schemeClr val="accent1">
+                <a:lumMod val="50000"/>
+              </a:schemeClr>
+            </a:solidFill>
+          </a:ln>
+        </p:spPr>
+        <p:txBody>
+          <a:bodyPr/>
+          <a:lstStyle/>
+          <a:p>
+            <a:r>
+              <a:rPr lang="en-US" altLang="ja-JP" sz="1000" dirty="0"/>
+              <a:t>Example #1</a:t>
+            </a:r>
+          </a:p>
+          <a:p>
+            <a:endParaRPr lang="en-US" altLang="ja-JP" sz="1000" dirty="0"/>
+          </a:p>
+          <a:p>
+            <a:r>
+              <a:rPr lang="en-US" altLang="ja-JP" sz="1000" dirty="0"/>
+              <a:t>#Product_Name:</a:t>
+            </a:r>
+            <a:r>
+              <a:rPr lang="ja-JP" altLang="en-US" sz="1000" dirty="0"/>
+              <a:t> </a:t>
+            </a:r>
+            <a:r>
+              <a:rPr lang="en-US" altLang="ja-JP" sz="1000" dirty="0"/>
+              <a:t>ABC</a:t>
+            </a:r>
+          </a:p>
+          <a:p>
+            <a:r>
+              <a:rPr lang="en-US" altLang="ja-JP" sz="1000" dirty="0"/>
+              <a:t>#Product_Version:</a:t>
+            </a:r>
+            <a:r>
+              <a:rPr lang="ja-JP" altLang="en-US" sz="1000" dirty="0"/>
+              <a:t> </a:t>
+            </a:r>
+            <a:r>
+              <a:rPr lang="en-US" altLang="ja-JP" sz="1000" dirty="0"/>
+              <a:t>1.1</a:t>
+            </a:r>
+          </a:p>
+          <a:p>
+            <a:r>
+              <a:rPr lang="en-US" altLang="ja-JP" sz="1000" dirty="0"/>
+              <a:t>#Usage_Level: </a:t>
+            </a:r>
+            <a:r>
+              <a:rPr lang="en-US" altLang="ja-JP" sz="1000" dirty="0" err="1"/>
+              <a:t>Usage_Level_Production</a:t>
+            </a:r>
+            <a:endParaRPr lang="en-US" altLang="ja-JP" sz="1000" dirty="0"/>
+          </a:p>
+          <a:p>
+            <a:endParaRPr lang="en-US" altLang="ja-JP" sz="1000" dirty="0"/>
+          </a:p>
+          <a:p>
+            <a:r>
+              <a:rPr lang="en-US" altLang="ja-JP" sz="1000" dirty="0"/>
+              <a:t>(#Usage_Level_License_Clearance: No</a:t>
+            </a:r>
+          </a:p>
+          <a:p>
+            <a:pPr lvl="1"/>
+            <a:r>
+              <a:rPr lang="en-US" altLang="ja-JP" sz="1000" dirty="0"/>
+              <a:t>#Comment:</a:t>
+            </a:r>
+            <a:r>
+              <a:rPr lang="ja-JP" altLang="en-US" sz="1000" dirty="0"/>
+              <a:t> </a:t>
+            </a:r>
+            <a:r>
+              <a:rPr lang="en-US" altLang="ja-JP" sz="1000" dirty="0"/>
+              <a:t>GPLv3</a:t>
+            </a:r>
+            <a:r>
+              <a:rPr lang="ja-JP" altLang="en-US" sz="1000" dirty="0"/>
+              <a:t> </a:t>
+            </a:r>
+            <a:r>
+              <a:rPr lang="en-US" altLang="ja-JP" sz="1000" dirty="0"/>
+              <a:t>Included</a:t>
+            </a:r>
+          </a:p>
+          <a:p>
+            <a:r>
+              <a:rPr lang="en-US" altLang="ja-JP" sz="1000" dirty="0"/>
+              <a:t>#Usage_Level_Verification_Test: Done</a:t>
+            </a:r>
+          </a:p>
+          <a:p>
+            <a:pPr lvl="2"/>
+            <a:r>
+              <a:rPr lang="en-US" altLang="ja-JP" sz="1000" dirty="0"/>
+              <a:t>#Test_Level:</a:t>
+            </a:r>
+            <a:r>
+              <a:rPr lang="ja-JP" altLang="en-US" sz="1000" dirty="0"/>
+              <a:t> </a:t>
+            </a:r>
+            <a:r>
+              <a:rPr lang="en-US" altLang="ja-JP" sz="1000" dirty="0"/>
+              <a:t>Minimum Test</a:t>
+            </a:r>
+          </a:p>
+          <a:p>
+            <a:r>
+              <a:rPr lang="en-US" altLang="ja-JP" sz="1000" dirty="0"/>
+              <a:t>#Usage_Level_Vulnerability: Done</a:t>
+            </a:r>
+          </a:p>
+          <a:p>
+            <a:pPr lvl="1"/>
+            <a:r>
+              <a:rPr lang="en-US" altLang="ja-JP" sz="1000" dirty="0"/>
+              <a:t>#Level: Latest</a:t>
+            </a:r>
+          </a:p>
+          <a:p>
+            <a:pPr lvl="2"/>
+            <a:r>
+              <a:rPr lang="en-US" altLang="ja-JP" sz="1000" dirty="0"/>
+              <a:t>#Comment: CVE_XXX </a:t>
+            </a:r>
+          </a:p>
+          <a:p>
+            <a:pPr lvl="1"/>
+            <a:r>
+              <a:rPr lang="en-US" altLang="ja-JP" sz="1000" dirty="0"/>
+              <a:t>#Plan_to_update</a:t>
+            </a:r>
+          </a:p>
+          <a:p>
+            <a:pPr lvl="2"/>
+            <a:r>
+              <a:rPr lang="en-US" altLang="ja-JP" sz="1000" dirty="0" err="1"/>
+              <a:t>Current_Date</a:t>
+            </a:r>
+            <a:endParaRPr lang="en-US" altLang="ja-JP" sz="1000" dirty="0"/>
+          </a:p>
+          <a:p>
+            <a:pPr lvl="2"/>
+            <a:r>
+              <a:rPr lang="en-US" altLang="ja-JP" sz="1000" dirty="0" err="1"/>
+              <a:t>Planned_Date</a:t>
+            </a:r>
+            <a:endParaRPr lang="en-US" altLang="ja-JP" sz="1000" dirty="0"/>
+          </a:p>
+          <a:p>
+            <a:pPr lvl="2"/>
+            <a:r>
+              <a:rPr lang="en-US" altLang="ja-JP" sz="1000" dirty="0"/>
+              <a:t>No)</a:t>
+            </a:r>
+          </a:p>
+        </p:txBody>
+      </p:sp>
+      <p:sp>
+        <p:nvSpPr>
+          <p:cNvPr id="2" name="テキスト ボックス 1">
+            <a:extLst>
+              <a:ext uri="{FF2B5EF4-FFF2-40B4-BE49-F238E27FC236}">
+                <a16:creationId xmlns:a16="http://schemas.microsoft.com/office/drawing/2014/main" id="{4F91B9DA-36B3-4EB4-83AF-5067E8DB740C}"/>
+              </a:ext>
+            </a:extLst>
+          </p:cNvPr>
+          <p:cNvSpPr txBox="1"/>
+          <p:nvPr/>
+        </p:nvSpPr>
+        <p:spPr>
+          <a:xfrm>
+            <a:off x="1149531" y="1828800"/>
+            <a:ext cx="1471749" cy="369332"/>
+          </a:xfrm>
+          <a:prstGeom prst="rect">
+            <a:avLst/>
+          </a:prstGeom>
+          <a:solidFill>
+            <a:schemeClr val="accent1">
+              <a:lumMod val="50000"/>
+            </a:schemeClr>
+          </a:solidFill>
+        </p:spPr>
+        <p:txBody>
+          <a:bodyPr wrap="square" rtlCol="0">
+            <a:spAutoFit/>
+          </a:bodyPr>
+          <a:lstStyle/>
+          <a:p>
+            <a:pPr algn="ctr"/>
+            <a:r>
+              <a:rPr kumimoji="1" lang="en-US" altLang="ja-JP" dirty="0">
+                <a:solidFill>
+                  <a:schemeClr val="bg1"/>
+                </a:solidFill>
+              </a:rPr>
+              <a:t>OEM</a:t>
+            </a:r>
+            <a:endParaRPr kumimoji="1" lang="ja-JP" altLang="en-US" dirty="0">
+              <a:solidFill>
+                <a:schemeClr val="bg1"/>
+              </a:solidFill>
+            </a:endParaRPr>
+          </a:p>
+        </p:txBody>
+      </p:sp>
+      <p:sp>
+        <p:nvSpPr>
+          <p:cNvPr id="7" name="テキスト ボックス 6">
+            <a:extLst>
+              <a:ext uri="{FF2B5EF4-FFF2-40B4-BE49-F238E27FC236}">
+                <a16:creationId xmlns:a16="http://schemas.microsoft.com/office/drawing/2014/main" id="{1313867C-EE53-4CE8-A3A1-B14F619F895B}"/>
+              </a:ext>
+            </a:extLst>
+          </p:cNvPr>
+          <p:cNvSpPr txBox="1"/>
+          <p:nvPr/>
+        </p:nvSpPr>
+        <p:spPr>
+          <a:xfrm>
+            <a:off x="566056" y="1415535"/>
+            <a:ext cx="1471749" cy="369332"/>
+          </a:xfrm>
+          <a:prstGeom prst="rect">
+            <a:avLst/>
+          </a:prstGeom>
+          <a:noFill/>
+        </p:spPr>
+        <p:txBody>
+          <a:bodyPr wrap="square" rtlCol="0">
+            <a:spAutoFit/>
+          </a:bodyPr>
+          <a:lstStyle/>
+          <a:p>
+            <a:r>
+              <a:rPr kumimoji="1" lang="en-US" altLang="ja-JP" dirty="0"/>
+              <a:t>Use case #2</a:t>
+            </a:r>
+            <a:endParaRPr kumimoji="1" lang="ja-JP" altLang="en-US" dirty="0"/>
+          </a:p>
+        </p:txBody>
+      </p:sp>
+      <p:sp>
+        <p:nvSpPr>
+          <p:cNvPr id="10" name="テキスト ボックス 9">
+            <a:extLst>
+              <a:ext uri="{FF2B5EF4-FFF2-40B4-BE49-F238E27FC236}">
+                <a16:creationId xmlns:a16="http://schemas.microsoft.com/office/drawing/2014/main" id="{827FC21B-4535-4A18-9B19-7DEEC10DAB50}"/>
+              </a:ext>
+            </a:extLst>
+          </p:cNvPr>
+          <p:cNvSpPr txBox="1"/>
+          <p:nvPr/>
+        </p:nvSpPr>
+        <p:spPr>
+          <a:xfrm>
+            <a:off x="2764971" y="1794357"/>
+            <a:ext cx="4837612" cy="369332"/>
+          </a:xfrm>
+          <a:prstGeom prst="rect">
+            <a:avLst/>
+          </a:prstGeom>
+          <a:noFill/>
+        </p:spPr>
+        <p:txBody>
+          <a:bodyPr wrap="square" rtlCol="0">
+            <a:spAutoFit/>
+          </a:bodyPr>
+          <a:lstStyle/>
+          <a:p>
+            <a:r>
+              <a:rPr kumimoji="1" lang="en-US" altLang="ja-JP" dirty="0"/>
+              <a:t>Record for self use, not for distribution</a:t>
+            </a:r>
+            <a:endParaRPr kumimoji="1" lang="ja-JP" altLang="en-US" dirty="0"/>
+          </a:p>
+        </p:txBody>
+      </p:sp>
+    </p:spTree>
+    <p:extLst>
+      <p:ext uri="{BB962C8B-B14F-4D97-AF65-F5344CB8AC3E}">
+        <p14:creationId xmlns:p14="http://schemas.microsoft.com/office/powerpoint/2010/main" val="680651535"/>
       </p:ext>
     </p:extLst>
   </p:cSld>

</xml_diff>

<commit_message>
Proposal doc updated to 4/12 version.
</commit_message>
<xml_diff>
--- a/License-Info-Exchange/UsageProfile/Proposal/Background_of_Proposal_of_UsageProfile_CC0.pptx
+++ b/License-Info-Exchange/UsageProfile/Proposal/Background_of_Proposal_of_UsageProfile_CC0.pptx
@@ -6,7 +6,7 @@
     <p:sldMasterId id="2147483677" r:id="rId2"/>
   </p:sldMasterIdLst>
   <p:notesMasterIdLst>
-    <p:notesMasterId r:id="rId23"/>
+    <p:notesMasterId r:id="rId25"/>
   </p:notesMasterIdLst>
   <p:sldIdLst>
     <p:sldId id="281" r:id="rId3"/>
@@ -19,16 +19,18 @@
     <p:sldId id="419" r:id="rId10"/>
     <p:sldId id="414" r:id="rId11"/>
     <p:sldId id="413" r:id="rId12"/>
-    <p:sldId id="420" r:id="rId13"/>
-    <p:sldId id="427" r:id="rId14"/>
-    <p:sldId id="429" r:id="rId15"/>
-    <p:sldId id="428" r:id="rId16"/>
-    <p:sldId id="434" r:id="rId17"/>
-    <p:sldId id="438" r:id="rId18"/>
-    <p:sldId id="425" r:id="rId19"/>
-    <p:sldId id="424" r:id="rId20"/>
-    <p:sldId id="422" r:id="rId21"/>
-    <p:sldId id="423" r:id="rId22"/>
+    <p:sldId id="440" r:id="rId13"/>
+    <p:sldId id="420" r:id="rId14"/>
+    <p:sldId id="439" r:id="rId15"/>
+    <p:sldId id="427" r:id="rId16"/>
+    <p:sldId id="429" r:id="rId17"/>
+    <p:sldId id="428" r:id="rId18"/>
+    <p:sldId id="434" r:id="rId19"/>
+    <p:sldId id="438" r:id="rId20"/>
+    <p:sldId id="425" r:id="rId21"/>
+    <p:sldId id="424" r:id="rId22"/>
+    <p:sldId id="422" r:id="rId23"/>
+    <p:sldId id="423" r:id="rId24"/>
   </p:sldIdLst>
   <p:sldSz cx="9144000" cy="6858000" type="screen4x3"/>
   <p:notesSz cx="6858000" cy="9144000"/>
@@ -228,7 +230,7 @@
           <a:p>
             <a:fld id="{E59D8E7C-99F8-4016-86B1-CC537E355A01}" type="datetimeFigureOut">
               <a:rPr kumimoji="1" lang="ja-JP" altLang="en-US" smtClean="0"/>
-              <a:t>2022/2/15</a:t>
+              <a:t>2022/4/12</a:t>
             </a:fld>
             <a:endParaRPr kumimoji="1" lang="ja-JP" altLang="en-US"/>
           </a:p>
@@ -7266,6 +7268,504 @@
           <a:p>
             <a:r>
               <a:rPr lang="en-US" altLang="ja-JP" dirty="0"/>
+              <a:t>Usage descriptions for “Package”</a:t>
+            </a:r>
+            <a:endParaRPr lang="ja-JP" altLang="en-US" dirty="0"/>
+          </a:p>
+        </p:txBody>
+      </p:sp>
+      <p:sp>
+        <p:nvSpPr>
+          <p:cNvPr id="3" name="テキスト プレースホルダー 2">
+            <a:extLst>
+              <a:ext uri="{FF2B5EF4-FFF2-40B4-BE49-F238E27FC236}">
+                <a16:creationId xmlns:a16="http://schemas.microsoft.com/office/drawing/2014/main" id="{FA4BE47F-36BA-43CC-9DD2-6098BBFC6941}"/>
+              </a:ext>
+            </a:extLst>
+          </p:cNvPr>
+          <p:cNvSpPr>
+            <a:spLocks noGrp="1"/>
+          </p:cNvSpPr>
+          <p:nvPr>
+            <p:ph type="body" idx="1"/>
+          </p:nvPr>
+        </p:nvSpPr>
+        <p:spPr/>
+        <p:txBody>
+          <a:bodyPr/>
+          <a:lstStyle/>
+          <a:p>
+            <a:r>
+              <a:rPr lang="en-US" altLang="ja-JP" dirty="0"/>
+              <a:t>Still under consideration about “Scope” descriptions for Usage Profile</a:t>
+            </a:r>
+          </a:p>
+          <a:p>
+            <a:pPr lvl="1"/>
+            <a:r>
+              <a:rPr lang="en-US" altLang="ja-JP" dirty="0"/>
+              <a:t>To describe SPDX elements for each “binaries / source code package for specific product” with made by “specific compile time options”</a:t>
+            </a:r>
+          </a:p>
+          <a:p>
+            <a:pPr lvl="2"/>
+            <a:r>
+              <a:rPr lang="en-US" altLang="ja-JP" dirty="0"/>
+              <a:t>It might be affects to security / relationship / expiration period descriptions</a:t>
+            </a:r>
+          </a:p>
+          <a:p>
+            <a:endParaRPr lang="en-US" altLang="ja-JP" dirty="0"/>
+          </a:p>
+          <a:p>
+            <a:r>
+              <a:rPr lang="en-US" altLang="ja-JP" dirty="0"/>
+              <a:t>Further discussions are needed to utilize specifications of “Package information section” to describe strict “Scope </a:t>
+            </a:r>
+            <a:r>
+              <a:rPr lang="en-US" altLang="ja-JP"/>
+              <a:t>of Usage”</a:t>
+            </a:r>
+            <a:endParaRPr lang="ja-JP" altLang="en-US" dirty="0"/>
+          </a:p>
+        </p:txBody>
+      </p:sp>
+    </p:spTree>
+    <p:extLst>
+      <p:ext uri="{BB962C8B-B14F-4D97-AF65-F5344CB8AC3E}">
+        <p14:creationId xmlns:p14="http://schemas.microsoft.com/office/powerpoint/2010/main" val="3065824136"/>
+      </p:ext>
+    </p:extLst>
+  </p:cSld>
+  <p:clrMapOvr>
+    <a:masterClrMapping/>
+  </p:clrMapOvr>
+</p:sld>
+</file>
+
+<file path=ppt/slides/slide12.xml><?xml version="1.0" encoding="utf-8"?>
+<p:sld xmlns:a="http://schemas.openxmlformats.org/drawingml/2006/main" xmlns:r="http://schemas.openxmlformats.org/officeDocument/2006/relationships" xmlns:p="http://schemas.openxmlformats.org/presentationml/2006/main">
+  <p:cSld>
+    <p:spTree>
+      <p:nvGrpSpPr>
+        <p:cNvPr id="1" name=""/>
+        <p:cNvGrpSpPr/>
+        <p:nvPr/>
+      </p:nvGrpSpPr>
+      <p:grpSpPr>
+        <a:xfrm>
+          <a:off x="0" y="0"/>
+          <a:ext cx="0" cy="0"/>
+          <a:chOff x="0" y="0"/>
+          <a:chExt cx="0" cy="0"/>
+        </a:xfrm>
+      </p:grpSpPr>
+      <p:sp>
+        <p:nvSpPr>
+          <p:cNvPr id="4" name="タイトル 3">
+            <a:extLst>
+              <a:ext uri="{FF2B5EF4-FFF2-40B4-BE49-F238E27FC236}">
+                <a16:creationId xmlns:a16="http://schemas.microsoft.com/office/drawing/2014/main" id="{9DA87A08-1129-4D0B-B4B3-44C2C6F398D7}"/>
+              </a:ext>
+            </a:extLst>
+          </p:cNvPr>
+          <p:cNvSpPr>
+            <a:spLocks noGrp="1"/>
+          </p:cNvSpPr>
+          <p:nvPr>
+            <p:ph type="title"/>
+          </p:nvPr>
+        </p:nvSpPr>
+        <p:spPr/>
+        <p:txBody>
+          <a:bodyPr/>
+          <a:lstStyle/>
+          <a:p>
+            <a:r>
+              <a:rPr lang="en-US" altLang="ja-JP" dirty="0"/>
+              <a:t>Intended Usage by a distributor</a:t>
+            </a:r>
+            <a:endParaRPr lang="ja-JP" altLang="en-US" dirty="0"/>
+          </a:p>
+        </p:txBody>
+      </p:sp>
+      <p:sp>
+        <p:nvSpPr>
+          <p:cNvPr id="3" name="テキスト プレースホルダー 2">
+            <a:extLst>
+              <a:ext uri="{FF2B5EF4-FFF2-40B4-BE49-F238E27FC236}">
+                <a16:creationId xmlns:a16="http://schemas.microsoft.com/office/drawing/2014/main" id="{FA4BE47F-36BA-43CC-9DD2-6098BBFC6941}"/>
+              </a:ext>
+            </a:extLst>
+          </p:cNvPr>
+          <p:cNvSpPr>
+            <a:spLocks noGrp="1"/>
+          </p:cNvSpPr>
+          <p:nvPr>
+            <p:ph type="body" idx="1"/>
+          </p:nvPr>
+        </p:nvSpPr>
+        <p:spPr/>
+        <p:txBody>
+          <a:bodyPr/>
+          <a:lstStyle/>
+          <a:p>
+            <a:endParaRPr lang="ja-JP" altLang="en-US"/>
+          </a:p>
+        </p:txBody>
+      </p:sp>
+      <p:graphicFrame>
+        <p:nvGraphicFramePr>
+          <p:cNvPr id="7" name="表 7">
+            <a:extLst>
+              <a:ext uri="{FF2B5EF4-FFF2-40B4-BE49-F238E27FC236}">
+                <a16:creationId xmlns:a16="http://schemas.microsoft.com/office/drawing/2014/main" id="{2BFB4E70-A1BC-4D03-8048-45FA838AF1CE}"/>
+              </a:ext>
+            </a:extLst>
+          </p:cNvPr>
+          <p:cNvGraphicFramePr>
+            <a:graphicFrameLocks noGrp="1"/>
+          </p:cNvGraphicFramePr>
+          <p:nvPr>
+            <p:extLst>
+              <p:ext uri="{D42A27DB-BD31-4B8C-83A1-F6EECF244321}">
+                <p14:modId xmlns:p14="http://schemas.microsoft.com/office/powerpoint/2010/main" val="4129611958"/>
+              </p:ext>
+            </p:extLst>
+          </p:nvPr>
+        </p:nvGraphicFramePr>
+        <p:xfrm>
+          <a:off x="457198" y="1396999"/>
+          <a:ext cx="8229600" cy="2746375"/>
+        </p:xfrm>
+        <a:graphic>
+          <a:graphicData uri="http://schemas.openxmlformats.org/drawingml/2006/table">
+            <a:tbl>
+              <a:tblPr firstRow="1" bandRow="1">
+                <a:tableStyleId>{5C22544A-7EE6-4342-B048-85BDC9FD1C3A}</a:tableStyleId>
+              </a:tblPr>
+              <a:tblGrid>
+                <a:gridCol w="1457327">
+                  <a:extLst>
+                    <a:ext uri="{9D8B030D-6E8A-4147-A177-3AD203B41FA5}">
+                      <a16:colId xmlns:a16="http://schemas.microsoft.com/office/drawing/2014/main" val="2830039596"/>
+                    </a:ext>
+                  </a:extLst>
+                </a:gridCol>
+                <a:gridCol w="1028700">
+                  <a:extLst>
+                    <a:ext uri="{9D8B030D-6E8A-4147-A177-3AD203B41FA5}">
+                      <a16:colId xmlns:a16="http://schemas.microsoft.com/office/drawing/2014/main" val="4104699848"/>
+                    </a:ext>
+                  </a:extLst>
+                </a:gridCol>
+                <a:gridCol w="1123950">
+                  <a:extLst>
+                    <a:ext uri="{9D8B030D-6E8A-4147-A177-3AD203B41FA5}">
+                      <a16:colId xmlns:a16="http://schemas.microsoft.com/office/drawing/2014/main" val="2792625239"/>
+                    </a:ext>
+                  </a:extLst>
+                </a:gridCol>
+                <a:gridCol w="4619623">
+                  <a:extLst>
+                    <a:ext uri="{9D8B030D-6E8A-4147-A177-3AD203B41FA5}">
+                      <a16:colId xmlns:a16="http://schemas.microsoft.com/office/drawing/2014/main" val="4110951862"/>
+                    </a:ext>
+                  </a:extLst>
+                </a:gridCol>
+              </a:tblGrid>
+              <a:tr h="662077">
+                <a:tc>
+                  <a:txBody>
+                    <a:bodyPr/>
+                    <a:lstStyle/>
+                    <a:p>
+                      <a:endParaRPr kumimoji="1" lang="ja-JP" altLang="en-US"/>
+                    </a:p>
+                  </a:txBody>
+                  <a:tcPr/>
+                </a:tc>
+                <a:tc>
+                  <a:txBody>
+                    <a:bodyPr/>
+                    <a:lstStyle/>
+                    <a:p>
+                      <a:r>
+                        <a:rPr kumimoji="1" lang="en-US" altLang="ja-JP" dirty="0"/>
+                        <a:t>Required</a:t>
+                      </a:r>
+                      <a:endParaRPr kumimoji="1" lang="ja-JP" altLang="en-US" dirty="0"/>
+                    </a:p>
+                  </a:txBody>
+                  <a:tcPr/>
+                </a:tc>
+                <a:tc>
+                  <a:txBody>
+                    <a:bodyPr/>
+                    <a:lstStyle/>
+                    <a:p>
+                      <a:r>
+                        <a:rPr kumimoji="1" lang="en-US" altLang="ja-JP" dirty="0"/>
+                        <a:t>Cardinality</a:t>
+                      </a:r>
+                      <a:endParaRPr kumimoji="1" lang="ja-JP" altLang="en-US" dirty="0"/>
+                    </a:p>
+                  </a:txBody>
+                  <a:tcPr/>
+                </a:tc>
+                <a:tc>
+                  <a:txBody>
+                    <a:bodyPr/>
+                    <a:lstStyle/>
+                    <a:p>
+                      <a:r>
+                        <a:rPr kumimoji="1" lang="en-US" altLang="ja-JP" dirty="0"/>
+                        <a:t>Format</a:t>
+                      </a:r>
+                    </a:p>
+                  </a:txBody>
+                  <a:tcPr/>
+                </a:tc>
+                <a:extLst>
+                  <a:ext uri="{0D108BD9-81ED-4DB2-BD59-A6C34878D82A}">
+                    <a16:rowId xmlns:a16="http://schemas.microsoft.com/office/drawing/2014/main" val="1599676236"/>
+                  </a:ext>
+                </a:extLst>
+              </a:tr>
+              <a:tr h="1217929">
+                <a:tc>
+                  <a:txBody>
+                    <a:bodyPr/>
+                    <a:lstStyle/>
+                    <a:p>
+                      <a:r>
+                        <a:rPr kumimoji="1" lang="en-US" altLang="ja-JP" dirty="0" err="1"/>
+                        <a:t>Usage_Scope</a:t>
+                      </a:r>
+                      <a:endParaRPr kumimoji="1" lang="ja-JP" altLang="en-US" dirty="0"/>
+                    </a:p>
+                  </a:txBody>
+                  <a:tcPr/>
+                </a:tc>
+                <a:tc>
+                  <a:txBody>
+                    <a:bodyPr/>
+                    <a:lstStyle/>
+                    <a:p>
+                      <a:r>
+                        <a:rPr kumimoji="1" lang="en-US" altLang="ja-JP" dirty="0"/>
+                        <a:t>Yes</a:t>
+                      </a:r>
+                      <a:endParaRPr kumimoji="1" lang="ja-JP" altLang="en-US" dirty="0"/>
+                    </a:p>
+                  </a:txBody>
+                  <a:tcPr/>
+                </a:tc>
+                <a:tc>
+                  <a:txBody>
+                    <a:bodyPr/>
+                    <a:lstStyle/>
+                    <a:p>
+                      <a:pPr marL="0" marR="0" lvl="0" indent="0" algn="l" defTabSz="914400" rtl="0" eaLnBrk="1" fontAlgn="auto" latinLnBrk="0" hangingPunct="1">
+                        <a:lnSpc>
+                          <a:spcPct val="100000"/>
+                        </a:lnSpc>
+                        <a:spcBef>
+                          <a:spcPts val="0"/>
+                        </a:spcBef>
+                        <a:spcAft>
+                          <a:spcPts val="0"/>
+                        </a:spcAft>
+                        <a:buClrTx/>
+                        <a:buSzTx/>
+                        <a:buFontTx/>
+                        <a:buNone/>
+                        <a:tabLst/>
+                        <a:defRPr/>
+                      </a:pPr>
+                      <a:r>
+                        <a:rPr lang="en-US" altLang="ja-JP" dirty="0">
+                          <a:effectLst/>
+                        </a:rPr>
+                        <a:t>1..1</a:t>
+                      </a:r>
+                    </a:p>
+                  </a:txBody>
+                  <a:tcPr/>
+                </a:tc>
+                <a:tc>
+                  <a:txBody>
+                    <a:bodyPr/>
+                    <a:lstStyle/>
+                    <a:p>
+                      <a:pPr fontAlgn="t"/>
+                      <a:r>
+                        <a:rPr lang="en-US" altLang="ja-JP" dirty="0">
+                          <a:effectLst/>
+                        </a:rPr>
+                        <a:t>Single line of text.</a:t>
+                      </a:r>
+                    </a:p>
+                    <a:p>
+                      <a:pPr fontAlgn="t"/>
+                      <a:r>
+                        <a:rPr lang="en-US" altLang="ja-JP" dirty="0">
+                          <a:effectLst/>
+                        </a:rPr>
+                        <a:t>For example: consumer product/ medical system /  automotive system/ only evaluation</a:t>
+                      </a:r>
+                    </a:p>
+                  </a:txBody>
+                  <a:tcPr/>
+                </a:tc>
+                <a:extLst>
+                  <a:ext uri="{0D108BD9-81ED-4DB2-BD59-A6C34878D82A}">
+                    <a16:rowId xmlns:a16="http://schemas.microsoft.com/office/drawing/2014/main" val="1194278545"/>
+                  </a:ext>
+                </a:extLst>
+              </a:tr>
+              <a:tr h="866369">
+                <a:tc>
+                  <a:txBody>
+                    <a:bodyPr/>
+                    <a:lstStyle/>
+                    <a:p>
+                      <a:r>
+                        <a:rPr kumimoji="1" lang="en-US" altLang="ja-JP" dirty="0" err="1"/>
+                        <a:t>Usage_Comment</a:t>
+                      </a:r>
+                      <a:endParaRPr kumimoji="1" lang="ja-JP" altLang="en-US" dirty="0"/>
+                    </a:p>
+                  </a:txBody>
+                  <a:tcPr/>
+                </a:tc>
+                <a:tc>
+                  <a:txBody>
+                    <a:bodyPr/>
+                    <a:lstStyle/>
+                    <a:p>
+                      <a:r>
+                        <a:rPr kumimoji="1" lang="en-US" altLang="ja-JP" dirty="0"/>
+                        <a:t>Yes</a:t>
+                      </a:r>
+                      <a:endParaRPr kumimoji="1" lang="ja-JP" altLang="en-US" dirty="0"/>
+                    </a:p>
+                  </a:txBody>
+                  <a:tcPr/>
+                </a:tc>
+                <a:tc>
+                  <a:txBody>
+                    <a:bodyPr/>
+                    <a:lstStyle/>
+                    <a:p>
+                      <a:pPr marL="0" marR="0" lvl="0" indent="0" algn="l" defTabSz="914400" rtl="0" eaLnBrk="1" fontAlgn="auto" latinLnBrk="0" hangingPunct="1">
+                        <a:lnSpc>
+                          <a:spcPct val="100000"/>
+                        </a:lnSpc>
+                        <a:spcBef>
+                          <a:spcPts val="0"/>
+                        </a:spcBef>
+                        <a:spcAft>
+                          <a:spcPts val="0"/>
+                        </a:spcAft>
+                        <a:buClrTx/>
+                        <a:buSzTx/>
+                        <a:buFontTx/>
+                        <a:buNone/>
+                        <a:tabLst/>
+                        <a:defRPr/>
+                      </a:pPr>
+                      <a:r>
+                        <a:rPr lang="en-US" altLang="ja-JP" dirty="0">
+                          <a:effectLst/>
+                        </a:rPr>
+                        <a:t>1..1</a:t>
+                      </a:r>
+                    </a:p>
+                  </a:txBody>
+                  <a:tcPr/>
+                </a:tc>
+                <a:tc>
+                  <a:txBody>
+                    <a:bodyPr/>
+                    <a:lstStyle/>
+                    <a:p>
+                      <a:r>
+                        <a:rPr lang="en-US" altLang="ja-JP" dirty="0">
+                          <a:effectLst/>
+                        </a:rPr>
+                        <a:t>Lines of text.</a:t>
+                      </a:r>
+                    </a:p>
+                    <a:p>
+                      <a:endParaRPr kumimoji="1" lang="ja-JP" altLang="en-US" dirty="0"/>
+                    </a:p>
+                  </a:txBody>
+                  <a:tcPr/>
+                </a:tc>
+                <a:extLst>
+                  <a:ext uri="{0D108BD9-81ED-4DB2-BD59-A6C34878D82A}">
+                    <a16:rowId xmlns:a16="http://schemas.microsoft.com/office/drawing/2014/main" val="2836077080"/>
+                  </a:ext>
+                </a:extLst>
+              </a:tr>
+            </a:tbl>
+          </a:graphicData>
+        </a:graphic>
+      </p:graphicFrame>
+    </p:spTree>
+    <p:extLst>
+      <p:ext uri="{BB962C8B-B14F-4D97-AF65-F5344CB8AC3E}">
+        <p14:creationId xmlns:p14="http://schemas.microsoft.com/office/powerpoint/2010/main" val="1037664040"/>
+      </p:ext>
+    </p:extLst>
+  </p:cSld>
+  <p:clrMapOvr>
+    <a:masterClrMapping/>
+  </p:clrMapOvr>
+</p:sld>
+</file>
+
+<file path=ppt/slides/slide13.xml><?xml version="1.0" encoding="utf-8"?>
+<p:sld xmlns:a="http://schemas.openxmlformats.org/drawingml/2006/main" xmlns:r="http://schemas.openxmlformats.org/officeDocument/2006/relationships" xmlns:p="http://schemas.openxmlformats.org/presentationml/2006/main">
+  <p:cSld>
+    <p:spTree>
+      <p:nvGrpSpPr>
+        <p:cNvPr id="1" name=""/>
+        <p:cNvGrpSpPr/>
+        <p:nvPr/>
+      </p:nvGrpSpPr>
+      <p:grpSpPr>
+        <a:xfrm>
+          <a:off x="0" y="0"/>
+          <a:ext cx="0" cy="0"/>
+          <a:chOff x="0" y="0"/>
+          <a:chExt cx="0" cy="0"/>
+        </a:xfrm>
+      </p:grpSpPr>
+      <p:sp>
+        <p:nvSpPr>
+          <p:cNvPr id="4" name="タイトル 3">
+            <a:extLst>
+              <a:ext uri="{FF2B5EF4-FFF2-40B4-BE49-F238E27FC236}">
+                <a16:creationId xmlns:a16="http://schemas.microsoft.com/office/drawing/2014/main" id="{9DA87A08-1129-4D0B-B4B3-44C2C6F398D7}"/>
+              </a:ext>
+            </a:extLst>
+          </p:cNvPr>
+          <p:cNvSpPr>
+            <a:spLocks noGrp="1"/>
+          </p:cNvSpPr>
+          <p:nvPr>
+            <p:ph type="title"/>
+          </p:nvPr>
+        </p:nvSpPr>
+        <p:spPr/>
+        <p:txBody>
+          <a:bodyPr/>
+          <a:lstStyle/>
+          <a:p>
+            <a:r>
+              <a:rPr lang="en-US" altLang="ja-JP" dirty="0"/>
               <a:t>Intended Usage by a distributor</a:t>
             </a:r>
             <a:endParaRPr lang="ja-JP" altLang="en-US" dirty="0"/>
@@ -7539,7 +8039,7 @@
     </p:spTree>
     <p:extLst>
       <p:ext uri="{BB962C8B-B14F-4D97-AF65-F5344CB8AC3E}">
-        <p14:creationId xmlns:p14="http://schemas.microsoft.com/office/powerpoint/2010/main" val="1037664040"/>
+        <p14:creationId xmlns:p14="http://schemas.microsoft.com/office/powerpoint/2010/main" val="3177357823"/>
       </p:ext>
     </p:extLst>
   </p:cSld>
@@ -7549,7 +8049,7 @@
 </p:sld>
 </file>
 
-<file path=ppt/slides/slide12.xml><?xml version="1.0" encoding="utf-8"?>
+<file path=ppt/slides/slide14.xml><?xml version="1.0" encoding="utf-8"?>
 <p:sld xmlns:a="http://schemas.openxmlformats.org/drawingml/2006/main" xmlns:r="http://schemas.openxmlformats.org/officeDocument/2006/relationships" xmlns:p="http://schemas.openxmlformats.org/presentationml/2006/main">
   <p:cSld>
     <p:spTree>
@@ -7821,7 +8321,7 @@
                     <a:p>
                       <a:pPr fontAlgn="t"/>
                       <a:r>
-                        <a:rPr lang="en-US" dirty="0">
+                        <a:rPr lang="en-US">
                           <a:effectLst/>
                         </a:rPr>
                         <a:t>Yes</a:t>
@@ -8777,7 +9277,7 @@
 </p:sld>
 </file>
 
-<file path=ppt/slides/slide13.xml><?xml version="1.0" encoding="utf-8"?>
+<file path=ppt/slides/slide15.xml><?xml version="1.0" encoding="utf-8"?>
 <p:sld xmlns:a="http://schemas.openxmlformats.org/drawingml/2006/main" xmlns:r="http://schemas.openxmlformats.org/officeDocument/2006/relationships" xmlns:p="http://schemas.openxmlformats.org/presentationml/2006/main">
   <p:cSld>
     <p:spTree>
@@ -10532,7 +11032,7 @@
 </p:sld>
 </file>
 
-<file path=ppt/slides/slide14.xml><?xml version="1.0" encoding="utf-8"?>
+<file path=ppt/slides/slide16.xml><?xml version="1.0" encoding="utf-8"?>
 <p:sld xmlns:a="http://schemas.openxmlformats.org/drawingml/2006/main" xmlns:r="http://schemas.openxmlformats.org/officeDocument/2006/relationships" xmlns:p="http://schemas.openxmlformats.org/presentationml/2006/main">
   <p:cSld>
     <p:spTree>
@@ -10580,10 +11080,10 @@
       </p:sp>
       <p:graphicFrame>
         <p:nvGraphicFramePr>
-          <p:cNvPr id="9" name="表 8">
+          <p:cNvPr id="7" name="表 6">
             <a:extLst>
               <a:ext uri="{FF2B5EF4-FFF2-40B4-BE49-F238E27FC236}">
-                <a16:creationId xmlns:a16="http://schemas.microsoft.com/office/drawing/2014/main" id="{CEB319EB-678A-40C9-95A1-CF06C6147757}"/>
+                <a16:creationId xmlns:a16="http://schemas.microsoft.com/office/drawing/2014/main" id="{C74FFBDB-240F-4515-B283-CA6CEFB41E51}"/>
               </a:ext>
             </a:extLst>
           </p:cNvPr>
@@ -10593,13 +11093,13 @@
           <p:nvPr>
             <p:extLst>
               <p:ext uri="{D42A27DB-BD31-4B8C-83A1-F6EECF244321}">
-                <p14:modId xmlns:p14="http://schemas.microsoft.com/office/powerpoint/2010/main" val="3884176229"/>
+                <p14:modId xmlns:p14="http://schemas.microsoft.com/office/powerpoint/2010/main" val="3423027573"/>
               </p:ext>
             </p:extLst>
           </p:nvPr>
         </p:nvGraphicFramePr>
         <p:xfrm>
-          <a:off x="457201" y="1635705"/>
+          <a:off x="457199" y="5178077"/>
           <a:ext cx="6675120" cy="1350329"/>
         </p:xfrm>
         <a:graphic>
@@ -10917,7 +11417,7 @@
                     <a:p>
                       <a:pPr fontAlgn="t"/>
                       <a:r>
-                        <a:rPr lang="en-US" altLang="ja-JP" dirty="0">
+                        <a:rPr lang="en-US" altLang="ja-JP">
                           <a:effectLst/>
                         </a:rPr>
                         <a:t>1..1</a:t>
@@ -11042,7 +11542,557 @@
                         <a:rPr lang="en-US" altLang="ja-JP" dirty="0">
                           <a:effectLst/>
                         </a:rPr>
-                        <a:t>For example:  </a:t>
+                        <a:t>For example: Clearance has not been done </a:t>
+                      </a:r>
+                    </a:p>
+                  </a:txBody>
+                  <a:tcPr>
+                    <a:lnL w="7620" cap="flat" cmpd="sng" algn="ctr">
+                      <a:solidFill>
+                        <a:srgbClr val="E1E4E5"/>
+                      </a:solidFill>
+                      <a:prstDash val="solid"/>
+                      <a:round/>
+                      <a:headEnd type="none" w="med" len="med"/>
+                      <a:tailEnd type="none" w="med" len="med"/>
+                    </a:lnL>
+                    <a:lnR w="7620" cap="flat" cmpd="sng" algn="ctr">
+                      <a:solidFill>
+                        <a:srgbClr val="E1E4E5"/>
+                      </a:solidFill>
+                      <a:prstDash val="solid"/>
+                      <a:round/>
+                      <a:headEnd type="none" w="med" len="med"/>
+                      <a:tailEnd type="none" w="med" len="med"/>
+                    </a:lnR>
+                    <a:lnT w="7620" cap="flat" cmpd="sng" algn="ctr">
+                      <a:solidFill>
+                        <a:srgbClr val="E1E4E5"/>
+                      </a:solidFill>
+                      <a:prstDash val="solid"/>
+                      <a:round/>
+                      <a:headEnd type="none" w="med" len="med"/>
+                      <a:tailEnd type="none" w="med" len="med"/>
+                    </a:lnT>
+                    <a:lnB w="7620" cap="flat" cmpd="sng" algn="ctr">
+                      <a:solidFill>
+                        <a:srgbClr val="E1E4E5"/>
+                      </a:solidFill>
+                      <a:prstDash val="solid"/>
+                      <a:round/>
+                      <a:headEnd type="none" w="med" len="med"/>
+                      <a:tailEnd type="none" w="med" len="med"/>
+                    </a:lnB>
+                  </a:tcPr>
+                </a:tc>
+                <a:extLst>
+                  <a:ext uri="{0D108BD9-81ED-4DB2-BD59-A6C34878D82A}">
+                    <a16:rowId xmlns:a16="http://schemas.microsoft.com/office/drawing/2014/main" val="3128238027"/>
+                  </a:ext>
+                </a:extLst>
+              </a:tr>
+            </a:tbl>
+          </a:graphicData>
+        </a:graphic>
+      </p:graphicFrame>
+      <p:sp>
+        <p:nvSpPr>
+          <p:cNvPr id="8" name="テキスト ボックス 7">
+            <a:extLst>
+              <a:ext uri="{FF2B5EF4-FFF2-40B4-BE49-F238E27FC236}">
+                <a16:creationId xmlns:a16="http://schemas.microsoft.com/office/drawing/2014/main" id="{DF298999-10F2-47FF-BA09-2938944090CD}"/>
+              </a:ext>
+            </a:extLst>
+          </p:cNvPr>
+          <p:cNvSpPr txBox="1"/>
+          <p:nvPr/>
+        </p:nvSpPr>
+        <p:spPr>
+          <a:xfrm>
+            <a:off x="457198" y="4805116"/>
+            <a:ext cx="3113313" cy="369332"/>
+          </a:xfrm>
+          <a:prstGeom prst="rect">
+            <a:avLst/>
+          </a:prstGeom>
+          <a:noFill/>
+        </p:spPr>
+        <p:txBody>
+          <a:bodyPr wrap="square" rtlCol="0">
+            <a:spAutoFit/>
+          </a:bodyPr>
+          <a:lstStyle/>
+          <a:p>
+            <a:r>
+              <a:rPr kumimoji="1" lang="en-US" altLang="ja-JP" dirty="0" err="1"/>
+              <a:t>License_Clearance</a:t>
+            </a:r>
+            <a:endParaRPr kumimoji="1" lang="ja-JP" altLang="en-US" dirty="0"/>
+          </a:p>
+        </p:txBody>
+      </p:sp>
+      <p:graphicFrame>
+        <p:nvGraphicFramePr>
+          <p:cNvPr id="9" name="表 8">
+            <a:extLst>
+              <a:ext uri="{FF2B5EF4-FFF2-40B4-BE49-F238E27FC236}">
+                <a16:creationId xmlns:a16="http://schemas.microsoft.com/office/drawing/2014/main" id="{CEB319EB-678A-40C9-95A1-CF06C6147757}"/>
+              </a:ext>
+            </a:extLst>
+          </p:cNvPr>
+          <p:cNvGraphicFramePr>
+            <a:graphicFrameLocks noGrp="1"/>
+          </p:cNvGraphicFramePr>
+          <p:nvPr>
+            <p:extLst>
+              <p:ext uri="{D42A27DB-BD31-4B8C-83A1-F6EECF244321}">
+                <p14:modId xmlns:p14="http://schemas.microsoft.com/office/powerpoint/2010/main" val="4123180364"/>
+              </p:ext>
+            </p:extLst>
+          </p:nvPr>
+        </p:nvGraphicFramePr>
+        <p:xfrm>
+          <a:off x="457201" y="1635705"/>
+          <a:ext cx="6675120" cy="1153416"/>
+        </p:xfrm>
+        <a:graphic>
+          <a:graphicData uri="http://schemas.openxmlformats.org/drawingml/2006/table">
+            <a:tbl>
+              <a:tblPr/>
+              <a:tblGrid>
+                <a:gridCol w="964184">
+                  <a:extLst>
+                    <a:ext uri="{9D8B030D-6E8A-4147-A177-3AD203B41FA5}">
+                      <a16:colId xmlns:a16="http://schemas.microsoft.com/office/drawing/2014/main" val="1560918820"/>
+                    </a:ext>
+                  </a:extLst>
+                </a:gridCol>
+                <a:gridCol w="5710936">
+                  <a:extLst>
+                    <a:ext uri="{9D8B030D-6E8A-4147-A177-3AD203B41FA5}">
+                      <a16:colId xmlns:a16="http://schemas.microsoft.com/office/drawing/2014/main" val="1443041443"/>
+                    </a:ext>
+                  </a:extLst>
+                </a:gridCol>
+              </a:tblGrid>
+              <a:tr h="0">
+                <a:tc>
+                  <a:txBody>
+                    <a:bodyPr/>
+                    <a:lstStyle/>
+                    <a:p>
+                      <a:r>
+                        <a:rPr lang="en-US" dirty="0">
+                          <a:effectLst/>
+                        </a:rPr>
+                        <a:t>Attribute</a:t>
+                      </a:r>
+                    </a:p>
+                  </a:txBody>
+                  <a:tcPr anchor="ctr">
+                    <a:lnL w="7620" cap="flat" cmpd="sng" algn="ctr">
+                      <a:solidFill>
+                        <a:srgbClr val="E1E4E5"/>
+                      </a:solidFill>
+                      <a:prstDash val="solid"/>
+                      <a:round/>
+                      <a:headEnd type="none" w="med" len="med"/>
+                      <a:tailEnd type="none" w="med" len="med"/>
+                    </a:lnL>
+                    <a:lnR w="7620" cap="flat" cmpd="sng" algn="ctr">
+                      <a:solidFill>
+                        <a:srgbClr val="E1E4E5"/>
+                      </a:solidFill>
+                      <a:prstDash val="solid"/>
+                      <a:round/>
+                      <a:headEnd type="none" w="med" len="med"/>
+                      <a:tailEnd type="none" w="med" len="med"/>
+                    </a:lnR>
+                    <a:lnT w="7620" cap="flat" cmpd="sng" algn="ctr">
+                      <a:solidFill>
+                        <a:srgbClr val="E1E4E5"/>
+                      </a:solidFill>
+                      <a:prstDash val="solid"/>
+                      <a:round/>
+                      <a:headEnd type="none" w="med" len="med"/>
+                      <a:tailEnd type="none" w="med" len="med"/>
+                    </a:lnT>
+                    <a:lnB w="7620" cap="flat" cmpd="sng" algn="ctr">
+                      <a:solidFill>
+                        <a:srgbClr val="E1E4E5"/>
+                      </a:solidFill>
+                      <a:prstDash val="solid"/>
+                      <a:round/>
+                      <a:headEnd type="none" w="med" len="med"/>
+                      <a:tailEnd type="none" w="med" len="med"/>
+                    </a:lnB>
+                    <a:solidFill>
+                      <a:schemeClr val="tx2">
+                        <a:lumMod val="50000"/>
+                      </a:schemeClr>
+                    </a:solidFill>
+                  </a:tcPr>
+                </a:tc>
+                <a:tc>
+                  <a:txBody>
+                    <a:bodyPr/>
+                    <a:lstStyle/>
+                    <a:p>
+                      <a:r>
+                        <a:rPr lang="en-US" dirty="0">
+                          <a:effectLst/>
+                        </a:rPr>
+                        <a:t>Value</a:t>
+                      </a:r>
+                    </a:p>
+                  </a:txBody>
+                  <a:tcPr anchor="ctr">
+                    <a:lnL w="7620" cap="flat" cmpd="sng" algn="ctr">
+                      <a:solidFill>
+                        <a:srgbClr val="E1E4E5"/>
+                      </a:solidFill>
+                      <a:prstDash val="solid"/>
+                      <a:round/>
+                      <a:headEnd type="none" w="med" len="med"/>
+                      <a:tailEnd type="none" w="med" len="med"/>
+                    </a:lnL>
+                    <a:lnR w="7620" cap="flat" cmpd="sng" algn="ctr">
+                      <a:solidFill>
+                        <a:srgbClr val="E1E4E5"/>
+                      </a:solidFill>
+                      <a:prstDash val="solid"/>
+                      <a:round/>
+                      <a:headEnd type="none" w="med" len="med"/>
+                      <a:tailEnd type="none" w="med" len="med"/>
+                    </a:lnR>
+                    <a:lnT w="7620" cap="flat" cmpd="sng" algn="ctr">
+                      <a:solidFill>
+                        <a:srgbClr val="E1E4E5"/>
+                      </a:solidFill>
+                      <a:prstDash val="solid"/>
+                      <a:round/>
+                      <a:headEnd type="none" w="med" len="med"/>
+                      <a:tailEnd type="none" w="med" len="med"/>
+                    </a:lnT>
+                    <a:lnB w="7620" cap="flat" cmpd="sng" algn="ctr">
+                      <a:solidFill>
+                        <a:srgbClr val="E1E4E5"/>
+                      </a:solidFill>
+                      <a:prstDash val="solid"/>
+                      <a:round/>
+                      <a:headEnd type="none" w="med" len="med"/>
+                      <a:tailEnd type="none" w="med" len="med"/>
+                    </a:lnB>
+                    <a:solidFill>
+                      <a:schemeClr val="tx2">
+                        <a:lumMod val="50000"/>
+                      </a:schemeClr>
+                    </a:solidFill>
+                  </a:tcPr>
+                </a:tc>
+                <a:extLst>
+                  <a:ext uri="{0D108BD9-81ED-4DB2-BD59-A6C34878D82A}">
+                    <a16:rowId xmlns:a16="http://schemas.microsoft.com/office/drawing/2014/main" val="1581694598"/>
+                  </a:ext>
+                </a:extLst>
+              </a:tr>
+              <a:tr h="0">
+                <a:tc>
+                  <a:txBody>
+                    <a:bodyPr/>
+                    <a:lstStyle/>
+                    <a:p>
+                      <a:pPr fontAlgn="t"/>
+                      <a:r>
+                        <a:rPr lang="en-US">
+                          <a:effectLst/>
+                        </a:rPr>
+                        <a:t>Required</a:t>
+                      </a:r>
+                    </a:p>
+                  </a:txBody>
+                  <a:tcPr>
+                    <a:lnL w="7620" cap="flat" cmpd="sng" algn="ctr">
+                      <a:solidFill>
+                        <a:srgbClr val="E1E4E5"/>
+                      </a:solidFill>
+                      <a:prstDash val="solid"/>
+                      <a:round/>
+                      <a:headEnd type="none" w="med" len="med"/>
+                      <a:tailEnd type="none" w="med" len="med"/>
+                    </a:lnL>
+                    <a:lnR w="7620" cap="flat" cmpd="sng" algn="ctr">
+                      <a:solidFill>
+                        <a:srgbClr val="E1E4E5"/>
+                      </a:solidFill>
+                      <a:prstDash val="solid"/>
+                      <a:round/>
+                      <a:headEnd type="none" w="med" len="med"/>
+                      <a:tailEnd type="none" w="med" len="med"/>
+                    </a:lnR>
+                    <a:lnT w="7620" cap="flat" cmpd="sng" algn="ctr">
+                      <a:solidFill>
+                        <a:srgbClr val="E1E4E5"/>
+                      </a:solidFill>
+                      <a:prstDash val="solid"/>
+                      <a:round/>
+                      <a:headEnd type="none" w="med" len="med"/>
+                      <a:tailEnd type="none" w="med" len="med"/>
+                    </a:lnT>
+                    <a:lnB w="7620" cap="flat" cmpd="sng" algn="ctr">
+                      <a:solidFill>
+                        <a:srgbClr val="E1E4E5"/>
+                      </a:solidFill>
+                      <a:prstDash val="solid"/>
+                      <a:round/>
+                      <a:headEnd type="none" w="med" len="med"/>
+                      <a:tailEnd type="none" w="med" len="med"/>
+                    </a:lnB>
+                  </a:tcPr>
+                </a:tc>
+                <a:tc>
+                  <a:txBody>
+                    <a:bodyPr/>
+                    <a:lstStyle/>
+                    <a:p>
+                      <a:pPr fontAlgn="t"/>
+                      <a:r>
+                        <a:rPr lang="en-US" dirty="0">
+                          <a:effectLst/>
+                        </a:rPr>
+                        <a:t>No</a:t>
+                      </a:r>
+                    </a:p>
+                  </a:txBody>
+                  <a:tcPr>
+                    <a:lnL w="7620" cap="flat" cmpd="sng" algn="ctr">
+                      <a:solidFill>
+                        <a:srgbClr val="E1E4E5"/>
+                      </a:solidFill>
+                      <a:prstDash val="solid"/>
+                      <a:round/>
+                      <a:headEnd type="none" w="med" len="med"/>
+                      <a:tailEnd type="none" w="med" len="med"/>
+                    </a:lnL>
+                    <a:lnR w="7620" cap="flat" cmpd="sng" algn="ctr">
+                      <a:solidFill>
+                        <a:srgbClr val="E1E4E5"/>
+                      </a:solidFill>
+                      <a:prstDash val="solid"/>
+                      <a:round/>
+                      <a:headEnd type="none" w="med" len="med"/>
+                      <a:tailEnd type="none" w="med" len="med"/>
+                    </a:lnR>
+                    <a:lnT w="7620" cap="flat" cmpd="sng" algn="ctr">
+                      <a:solidFill>
+                        <a:srgbClr val="E1E4E5"/>
+                      </a:solidFill>
+                      <a:prstDash val="solid"/>
+                      <a:round/>
+                      <a:headEnd type="none" w="med" len="med"/>
+                      <a:tailEnd type="none" w="med" len="med"/>
+                    </a:lnT>
+                    <a:lnB w="7620" cap="flat" cmpd="sng" algn="ctr">
+                      <a:solidFill>
+                        <a:srgbClr val="E1E4E5"/>
+                      </a:solidFill>
+                      <a:prstDash val="solid"/>
+                      <a:round/>
+                      <a:headEnd type="none" w="med" len="med"/>
+                      <a:tailEnd type="none" w="med" len="med"/>
+                    </a:lnB>
+                  </a:tcPr>
+                </a:tc>
+                <a:extLst>
+                  <a:ext uri="{0D108BD9-81ED-4DB2-BD59-A6C34878D82A}">
+                    <a16:rowId xmlns:a16="http://schemas.microsoft.com/office/drawing/2014/main" val="4183288258"/>
+                  </a:ext>
+                </a:extLst>
+              </a:tr>
+              <a:tr h="0">
+                <a:tc>
+                  <a:txBody>
+                    <a:bodyPr/>
+                    <a:lstStyle/>
+                    <a:p>
+                      <a:pPr fontAlgn="t"/>
+                      <a:r>
+                        <a:rPr lang="en-US">
+                          <a:effectLst/>
+                        </a:rPr>
+                        <a:t>Cardinality</a:t>
+                      </a:r>
+                    </a:p>
+                  </a:txBody>
+                  <a:tcPr>
+                    <a:lnL w="7620" cap="flat" cmpd="sng" algn="ctr">
+                      <a:solidFill>
+                        <a:srgbClr val="E1E4E5"/>
+                      </a:solidFill>
+                      <a:prstDash val="solid"/>
+                      <a:round/>
+                      <a:headEnd type="none" w="med" len="med"/>
+                      <a:tailEnd type="none" w="med" len="med"/>
+                    </a:lnL>
+                    <a:lnR w="7620" cap="flat" cmpd="sng" algn="ctr">
+                      <a:solidFill>
+                        <a:srgbClr val="E1E4E5"/>
+                      </a:solidFill>
+                      <a:prstDash val="solid"/>
+                      <a:round/>
+                      <a:headEnd type="none" w="med" len="med"/>
+                      <a:tailEnd type="none" w="med" len="med"/>
+                    </a:lnR>
+                    <a:lnT w="7620" cap="flat" cmpd="sng" algn="ctr">
+                      <a:solidFill>
+                        <a:srgbClr val="E1E4E5"/>
+                      </a:solidFill>
+                      <a:prstDash val="solid"/>
+                      <a:round/>
+                      <a:headEnd type="none" w="med" len="med"/>
+                      <a:tailEnd type="none" w="med" len="med"/>
+                    </a:lnT>
+                    <a:lnB w="7620" cap="flat" cmpd="sng" algn="ctr">
+                      <a:solidFill>
+                        <a:srgbClr val="E1E4E5"/>
+                      </a:solidFill>
+                      <a:prstDash val="solid"/>
+                      <a:round/>
+                      <a:headEnd type="none" w="med" len="med"/>
+                      <a:tailEnd type="none" w="med" len="med"/>
+                    </a:lnB>
+                  </a:tcPr>
+                </a:tc>
+                <a:tc>
+                  <a:txBody>
+                    <a:bodyPr/>
+                    <a:lstStyle/>
+                    <a:p>
+                      <a:pPr fontAlgn="t"/>
+                      <a:r>
+                        <a:rPr lang="en-US" altLang="ja-JP" dirty="0">
+                          <a:effectLst/>
+                        </a:rPr>
+                        <a:t>1..1</a:t>
+                      </a:r>
+                    </a:p>
+                  </a:txBody>
+                  <a:tcPr>
+                    <a:lnL w="7620" cap="flat" cmpd="sng" algn="ctr">
+                      <a:solidFill>
+                        <a:srgbClr val="E1E4E5"/>
+                      </a:solidFill>
+                      <a:prstDash val="solid"/>
+                      <a:round/>
+                      <a:headEnd type="none" w="med" len="med"/>
+                      <a:tailEnd type="none" w="med" len="med"/>
+                    </a:lnL>
+                    <a:lnR w="7620" cap="flat" cmpd="sng" algn="ctr">
+                      <a:solidFill>
+                        <a:srgbClr val="E1E4E5"/>
+                      </a:solidFill>
+                      <a:prstDash val="solid"/>
+                      <a:round/>
+                      <a:headEnd type="none" w="med" len="med"/>
+                      <a:tailEnd type="none" w="med" len="med"/>
+                    </a:lnR>
+                    <a:lnT w="7620" cap="flat" cmpd="sng" algn="ctr">
+                      <a:solidFill>
+                        <a:srgbClr val="E1E4E5"/>
+                      </a:solidFill>
+                      <a:prstDash val="solid"/>
+                      <a:round/>
+                      <a:headEnd type="none" w="med" len="med"/>
+                      <a:tailEnd type="none" w="med" len="med"/>
+                    </a:lnT>
+                    <a:lnB w="7620" cap="flat" cmpd="sng" algn="ctr">
+                      <a:solidFill>
+                        <a:srgbClr val="E1E4E5"/>
+                      </a:solidFill>
+                      <a:prstDash val="solid"/>
+                      <a:round/>
+                      <a:headEnd type="none" w="med" len="med"/>
+                      <a:tailEnd type="none" w="med" len="med"/>
+                    </a:lnB>
+                  </a:tcPr>
+                </a:tc>
+                <a:extLst>
+                  <a:ext uri="{0D108BD9-81ED-4DB2-BD59-A6C34878D82A}">
+                    <a16:rowId xmlns:a16="http://schemas.microsoft.com/office/drawing/2014/main" val="423220367"/>
+                  </a:ext>
+                </a:extLst>
+              </a:tr>
+              <a:tr h="0">
+                <a:tc>
+                  <a:txBody>
+                    <a:bodyPr/>
+                    <a:lstStyle/>
+                    <a:p>
+                      <a:pPr fontAlgn="t"/>
+                      <a:r>
+                        <a:rPr lang="en-US" dirty="0">
+                          <a:effectLst/>
+                        </a:rPr>
+                        <a:t>Format</a:t>
+                      </a:r>
+                    </a:p>
+                  </a:txBody>
+                  <a:tcPr>
+                    <a:lnL w="7620" cap="flat" cmpd="sng" algn="ctr">
+                      <a:solidFill>
+                        <a:srgbClr val="E1E4E5"/>
+                      </a:solidFill>
+                      <a:prstDash val="solid"/>
+                      <a:round/>
+                      <a:headEnd type="none" w="med" len="med"/>
+                      <a:tailEnd type="none" w="med" len="med"/>
+                    </a:lnL>
+                    <a:lnR w="7620" cap="flat" cmpd="sng" algn="ctr">
+                      <a:solidFill>
+                        <a:srgbClr val="E1E4E5"/>
+                      </a:solidFill>
+                      <a:prstDash val="solid"/>
+                      <a:round/>
+                      <a:headEnd type="none" w="med" len="med"/>
+                      <a:tailEnd type="none" w="med" len="med"/>
+                    </a:lnR>
+                    <a:lnT w="7620" cap="flat" cmpd="sng" algn="ctr">
+                      <a:solidFill>
+                        <a:srgbClr val="E1E4E5"/>
+                      </a:solidFill>
+                      <a:prstDash val="solid"/>
+                      <a:round/>
+                      <a:headEnd type="none" w="med" len="med"/>
+                      <a:tailEnd type="none" w="med" len="med"/>
+                    </a:lnT>
+                    <a:lnB w="7620" cap="flat" cmpd="sng" algn="ctr">
+                      <a:solidFill>
+                        <a:srgbClr val="E1E4E5"/>
+                      </a:solidFill>
+                      <a:prstDash val="solid"/>
+                      <a:round/>
+                      <a:headEnd type="none" w="med" len="med"/>
+                      <a:tailEnd type="none" w="med" len="med"/>
+                    </a:lnB>
+                  </a:tcPr>
+                </a:tc>
+                <a:tc>
+                  <a:txBody>
+                    <a:bodyPr/>
+                    <a:lstStyle/>
+                    <a:p>
+                      <a:r>
+                        <a:rPr lang="en-US" altLang="ja-JP" sz="1292" b="0" i="0" u="none" strike="noStrike" cap="none" dirty="0">
+                          <a:solidFill>
+                            <a:schemeClr val="tx1"/>
+                          </a:solidFill>
+                          <a:effectLst/>
+                          <a:latin typeface="+mn-lt"/>
+                          <a:ea typeface="+mn-ea"/>
+                          <a:cs typeface="+mn-cs"/>
+                          <a:sym typeface="Arial"/>
+                        </a:rPr>
+                        <a:t>Single line of text </a:t>
                       </a:r>
                     </a:p>
                   </a:txBody>
@@ -11697,7 +12747,7 @@
 </p:sld>
 </file>
 
-<file path=ppt/slides/slide15.xml><?xml version="1.0" encoding="utf-8"?>
+<file path=ppt/slides/slide17.xml><?xml version="1.0" encoding="utf-8"?>
 <p:sld xmlns:a="http://schemas.openxmlformats.org/drawingml/2006/main" xmlns:r="http://schemas.openxmlformats.org/officeDocument/2006/relationships" xmlns:p="http://schemas.openxmlformats.org/presentationml/2006/main">
   <p:cSld>
     <p:spTree>
@@ -11863,7 +12913,7 @@
 </p:sld>
 </file>
 
-<file path=ppt/slides/slide16.xml><?xml version="1.0" encoding="utf-8"?>
+<file path=ppt/slides/slide18.xml><?xml version="1.0" encoding="utf-8"?>
 <p:sld xmlns:a="http://schemas.openxmlformats.org/drawingml/2006/main" xmlns:r="http://schemas.openxmlformats.org/officeDocument/2006/relationships" xmlns:p="http://schemas.openxmlformats.org/presentationml/2006/main">
   <p:cSld>
     <p:spTree>
@@ -12349,7 +13399,7 @@
             </a:r>
             <a:r>
               <a:rPr lang="en-US" altLang="ja-JP" sz="1200" kern="0" dirty="0" err="1"/>
-              <a:t>File_Analyzed</a:t>
+              <a:t>File_Analized</a:t>
             </a:r>
             <a:r>
               <a:rPr lang="en-US" altLang="ja-JP" sz="1200" kern="0" dirty="0"/>
@@ -12432,7 +13482,7 @@
 </p:sld>
 </file>
 
-<file path=ppt/slides/slide17.xml><?xml version="1.0" encoding="utf-8"?>
+<file path=ppt/slides/slide19.xml><?xml version="1.0" encoding="utf-8"?>
 <p:sld xmlns:a="http://schemas.openxmlformats.org/drawingml/2006/main" xmlns:r="http://schemas.openxmlformats.org/officeDocument/2006/relationships" xmlns:p="http://schemas.openxmlformats.org/presentationml/2006/main">
   <p:cSld>
     <p:spTree>
@@ -12512,7 +13562,1046 @@
 </p:sld>
 </file>
 
-<file path=ppt/slides/slide18.xml><?xml version="1.0" encoding="utf-8"?>
+<file path=ppt/slides/slide2.xml><?xml version="1.0" encoding="utf-8"?>
+<p:sld xmlns:a="http://schemas.openxmlformats.org/drawingml/2006/main" xmlns:r="http://schemas.openxmlformats.org/officeDocument/2006/relationships" xmlns:p="http://schemas.openxmlformats.org/presentationml/2006/main">
+  <p:cSld>
+    <p:spTree>
+      <p:nvGrpSpPr>
+        <p:cNvPr id="1" name=""/>
+        <p:cNvGrpSpPr/>
+        <p:nvPr/>
+      </p:nvGrpSpPr>
+      <p:grpSpPr>
+        <a:xfrm>
+          <a:off x="0" y="0"/>
+          <a:ext cx="0" cy="0"/>
+          <a:chOff x="0" y="0"/>
+          <a:chExt cx="0" cy="0"/>
+        </a:xfrm>
+      </p:grpSpPr>
+      <p:sp>
+        <p:nvSpPr>
+          <p:cNvPr id="2" name="タイトル 1"/>
+          <p:cNvSpPr>
+            <a:spLocks noGrp="1"/>
+          </p:cNvSpPr>
+          <p:nvPr>
+            <p:ph type="title"/>
+          </p:nvPr>
+        </p:nvSpPr>
+        <p:spPr/>
+        <p:txBody>
+          <a:bodyPr/>
+          <a:lstStyle/>
+          <a:p>
+            <a:r>
+              <a:rPr lang="en-US" altLang="ja-JP" sz="3600" dirty="0">
+                <a:latin typeface="メイリオ" panose="020B0604030504040204" pitchFamily="50" charset="-128"/>
+                <a:ea typeface="メイリオ" panose="020B0604030504040204" pitchFamily="50" charset="-128"/>
+              </a:rPr>
+              <a:t>What is needed in “supply chain”</a:t>
+            </a:r>
+            <a:endParaRPr kumimoji="1" lang="ja-JP" altLang="en-US" sz="2585" dirty="0">
+              <a:latin typeface="メイリオ" panose="020B0604030504040204" pitchFamily="50" charset="-128"/>
+              <a:ea typeface="メイリオ" panose="020B0604030504040204" pitchFamily="50" charset="-128"/>
+              <a:cs typeface="メイリオ" panose="020B0604030504040204" pitchFamily="50" charset="-128"/>
+            </a:endParaRPr>
+          </a:p>
+        </p:txBody>
+      </p:sp>
+      <p:sp>
+        <p:nvSpPr>
+          <p:cNvPr id="5" name="テキスト プレースホルダー 4">
+            <a:extLst>
+              <a:ext uri="{FF2B5EF4-FFF2-40B4-BE49-F238E27FC236}">
+                <a16:creationId xmlns:a16="http://schemas.microsoft.com/office/drawing/2014/main" id="{9A091B9E-9B88-4373-A3FD-07E75549F7F8}"/>
+              </a:ext>
+            </a:extLst>
+          </p:cNvPr>
+          <p:cNvSpPr>
+            <a:spLocks noGrp="1"/>
+          </p:cNvSpPr>
+          <p:nvPr>
+            <p:ph type="body" idx="1"/>
+          </p:nvPr>
+        </p:nvSpPr>
+        <p:spPr>
+          <a:xfrm>
+            <a:off x="453763" y="1468518"/>
+            <a:ext cx="8229599" cy="1451411"/>
+          </a:xfrm>
+        </p:spPr>
+        <p:txBody>
+          <a:bodyPr/>
+          <a:lstStyle/>
+          <a:p>
+            <a:pPr marL="342900" indent="-342900">
+              <a:spcBef>
+                <a:spcPts val="1108"/>
+              </a:spcBef>
+            </a:pPr>
+            <a:r>
+              <a:rPr lang="en-US" altLang="ja-JP" dirty="0"/>
+              <a:t>Challenges for exchanging license information between organizations.</a:t>
+            </a:r>
+          </a:p>
+          <a:p>
+            <a:pPr lvl="1"/>
+            <a:r>
+              <a:rPr lang="en-US" altLang="ja-JP" dirty="0"/>
+              <a:t>Many items required in license information</a:t>
+            </a:r>
+          </a:p>
+          <a:p>
+            <a:pPr lvl="2"/>
+            <a:r>
+              <a:rPr lang="en-US" altLang="ja-JP" dirty="0"/>
+              <a:t>such as the name of OSS, the version of OSS, the origin of the source code etc.</a:t>
+            </a:r>
+          </a:p>
+          <a:p>
+            <a:pPr marL="599064" lvl="2" indent="0">
+              <a:buNone/>
+            </a:pPr>
+            <a:r>
+              <a:rPr lang="en-US" altLang="ja-JP" dirty="0">
+                <a:sym typeface="Wingdings" panose="05000000000000000000" pitchFamily="2" charset="2"/>
+              </a:rPr>
+              <a:t> </a:t>
+            </a:r>
+            <a:r>
+              <a:rPr lang="en-US" altLang="ja-JP" dirty="0"/>
+              <a:t>May cause the difficulty for the staff to understand all the license information.</a:t>
+            </a:r>
+          </a:p>
+          <a:p>
+            <a:pPr lvl="1"/>
+            <a:r>
+              <a:rPr lang="en-US" altLang="ja-JP" dirty="0"/>
+              <a:t>The license information format</a:t>
+            </a:r>
+          </a:p>
+          <a:p>
+            <a:pPr lvl="2"/>
+            <a:r>
+              <a:rPr lang="en-US" altLang="ja-JP" dirty="0"/>
+              <a:t>Sometimes it’s written in “Contract paper”, “Letter concluded in SW Package” or any other way in various format.</a:t>
+            </a:r>
+          </a:p>
+          <a:p>
+            <a:pPr marL="599064" lvl="2" indent="0">
+              <a:buNone/>
+            </a:pPr>
+            <a:r>
+              <a:rPr lang="en-US" altLang="ja-JP" dirty="0">
+                <a:sym typeface="Wingdings" panose="05000000000000000000" pitchFamily="2" charset="2"/>
+              </a:rPr>
+              <a:t> </a:t>
+            </a:r>
+            <a:r>
+              <a:rPr lang="en-US" altLang="ja-JP" dirty="0"/>
+              <a:t>These differences may cause the difficulty for providers to create and manage them.</a:t>
+            </a:r>
+          </a:p>
+          <a:p>
+            <a:pPr marL="316531" indent="-316531">
+              <a:spcBef>
+                <a:spcPts val="1108"/>
+              </a:spcBef>
+              <a:buFont typeface="Wingdings" panose="05000000000000000000" pitchFamily="2" charset="2"/>
+              <a:buChar char="l"/>
+            </a:pPr>
+            <a:endParaRPr lang="en-US" altLang="ja-JP" dirty="0">
+              <a:latin typeface="メイリオ" panose="020B0604030504040204" pitchFamily="50" charset="-128"/>
+              <a:ea typeface="メイリオ" panose="020B0604030504040204" pitchFamily="50" charset="-128"/>
+            </a:endParaRPr>
+          </a:p>
+          <a:p>
+            <a:pPr marL="569755" lvl="1" indent="-316531">
+              <a:spcBef>
+                <a:spcPts val="1108"/>
+              </a:spcBef>
+              <a:buFont typeface="Wingdings" panose="05000000000000000000" pitchFamily="2" charset="2"/>
+              <a:buChar char="l"/>
+            </a:pPr>
+            <a:endParaRPr lang="ja-JP" altLang="en-US" sz="1431" dirty="0">
+              <a:latin typeface="メイリオ" panose="020B0604030504040204" pitchFamily="50" charset="-128"/>
+              <a:ea typeface="メイリオ" panose="020B0604030504040204" pitchFamily="50" charset="-128"/>
+            </a:endParaRPr>
+          </a:p>
+        </p:txBody>
+      </p:sp>
+      <p:sp>
+        <p:nvSpPr>
+          <p:cNvPr id="6" name="テキスト ボックス 5">
+            <a:extLst>
+              <a:ext uri="{FF2B5EF4-FFF2-40B4-BE49-F238E27FC236}">
+                <a16:creationId xmlns:a16="http://schemas.microsoft.com/office/drawing/2014/main" id="{BA2C03EE-2E9E-4462-BDC7-EDAA080A65B8}"/>
+              </a:ext>
+            </a:extLst>
+          </p:cNvPr>
+          <p:cNvSpPr txBox="1"/>
+          <p:nvPr/>
+        </p:nvSpPr>
+        <p:spPr>
+          <a:xfrm>
+            <a:off x="4223384" y="6353633"/>
+            <a:ext cx="697937" cy="248530"/>
+          </a:xfrm>
+          <a:prstGeom prst="rect">
+            <a:avLst/>
+          </a:prstGeom>
+          <a:noFill/>
+        </p:spPr>
+        <p:txBody>
+          <a:bodyPr wrap="square" rtlCol="0">
+            <a:spAutoFit/>
+          </a:bodyPr>
+          <a:lstStyle/>
+          <a:p>
+            <a:pPr algn="ctr" defTabSz="844083"/>
+            <a:r>
+              <a:rPr kumimoji="1" lang="en-US" altLang="ja-JP" sz="1015" kern="0" dirty="0">
+                <a:solidFill>
+                  <a:srgbClr val="000000"/>
+                </a:solidFill>
+                <a:latin typeface="Arial"/>
+                <a:cs typeface="Arial"/>
+                <a:sym typeface="Arial"/>
+              </a:rPr>
+              <a:t>CC0-1.0</a:t>
+            </a:r>
+            <a:endParaRPr kumimoji="1" lang="ja-JP" altLang="en-US" sz="1108" kern="0" dirty="0">
+              <a:solidFill>
+                <a:srgbClr val="000000"/>
+              </a:solidFill>
+              <a:latin typeface="Arial"/>
+              <a:cs typeface="Arial"/>
+              <a:sym typeface="Arial"/>
+            </a:endParaRPr>
+          </a:p>
+        </p:txBody>
+      </p:sp>
+      <p:sp>
+        <p:nvSpPr>
+          <p:cNvPr id="14" name="四角形: 角を丸くする 13">
+            <a:extLst>
+              <a:ext uri="{FF2B5EF4-FFF2-40B4-BE49-F238E27FC236}">
+                <a16:creationId xmlns:a16="http://schemas.microsoft.com/office/drawing/2014/main" id="{E948B54A-1932-4E96-8FA0-4817ECE14174}"/>
+              </a:ext>
+            </a:extLst>
+          </p:cNvPr>
+          <p:cNvSpPr/>
+          <p:nvPr/>
+        </p:nvSpPr>
+        <p:spPr>
+          <a:xfrm>
+            <a:off x="1959430" y="5404735"/>
+            <a:ext cx="1018902" cy="557348"/>
+          </a:xfrm>
+          <a:prstGeom prst="roundRect">
+            <a:avLst/>
+          </a:prstGeom>
+          <a:solidFill>
+            <a:srgbClr val="00B0F0"/>
+          </a:solidFill>
+          <a:ln>
+            <a:solidFill>
+              <a:srgbClr val="00B0F0"/>
+            </a:solidFill>
+          </a:ln>
+        </p:spPr>
+        <p:style>
+          <a:lnRef idx="2">
+            <a:schemeClr val="accent1">
+              <a:shade val="50000"/>
+            </a:schemeClr>
+          </a:lnRef>
+          <a:fillRef idx="1">
+            <a:schemeClr val="accent1"/>
+          </a:fillRef>
+          <a:effectRef idx="0">
+            <a:schemeClr val="accent1"/>
+          </a:effectRef>
+          <a:fontRef idx="minor">
+            <a:schemeClr val="lt1"/>
+          </a:fontRef>
+        </p:style>
+        <p:txBody>
+          <a:bodyPr rtlCol="0" anchor="ctr"/>
+          <a:lstStyle/>
+          <a:p>
+            <a:pPr algn="ctr"/>
+            <a:r>
+              <a:rPr kumimoji="1" lang="en-US" altLang="ja-JP" dirty="0">
+                <a:solidFill>
+                  <a:schemeClr val="tx1"/>
+                </a:solidFill>
+              </a:rPr>
+              <a:t>Tier 2</a:t>
+            </a:r>
+            <a:endParaRPr kumimoji="1" lang="ja-JP" altLang="en-US" dirty="0">
+              <a:solidFill>
+                <a:schemeClr val="tx1"/>
+              </a:solidFill>
+            </a:endParaRPr>
+          </a:p>
+        </p:txBody>
+      </p:sp>
+      <p:sp>
+        <p:nvSpPr>
+          <p:cNvPr id="16" name="四角形: 角を丸くする 15">
+            <a:extLst>
+              <a:ext uri="{FF2B5EF4-FFF2-40B4-BE49-F238E27FC236}">
+                <a16:creationId xmlns:a16="http://schemas.microsoft.com/office/drawing/2014/main" id="{CF5315EB-AC76-4FDF-BAC6-2080AC856F62}"/>
+              </a:ext>
+            </a:extLst>
+          </p:cNvPr>
+          <p:cNvSpPr/>
+          <p:nvPr/>
+        </p:nvSpPr>
+        <p:spPr>
+          <a:xfrm>
+            <a:off x="4894218" y="5404735"/>
+            <a:ext cx="1018902" cy="557348"/>
+          </a:xfrm>
+          <a:prstGeom prst="roundRect">
+            <a:avLst/>
+          </a:prstGeom>
+          <a:solidFill>
+            <a:srgbClr val="FFC000"/>
+          </a:solidFill>
+          <a:ln>
+            <a:solidFill>
+              <a:srgbClr val="FFC000"/>
+            </a:solidFill>
+          </a:ln>
+        </p:spPr>
+        <p:style>
+          <a:lnRef idx="2">
+            <a:schemeClr val="accent1">
+              <a:shade val="50000"/>
+            </a:schemeClr>
+          </a:lnRef>
+          <a:fillRef idx="1">
+            <a:schemeClr val="accent1"/>
+          </a:fillRef>
+          <a:effectRef idx="0">
+            <a:schemeClr val="accent1"/>
+          </a:effectRef>
+          <a:fontRef idx="minor">
+            <a:schemeClr val="lt1"/>
+          </a:fontRef>
+        </p:style>
+        <p:txBody>
+          <a:bodyPr rtlCol="0" anchor="ctr"/>
+          <a:lstStyle/>
+          <a:p>
+            <a:pPr algn="ctr"/>
+            <a:r>
+              <a:rPr kumimoji="1" lang="en-US" altLang="ja-JP" dirty="0">
+                <a:solidFill>
+                  <a:schemeClr val="tx1"/>
+                </a:solidFill>
+              </a:rPr>
+              <a:t>OEM</a:t>
+            </a:r>
+          </a:p>
+          <a:p>
+            <a:pPr algn="ctr"/>
+            <a:r>
+              <a:rPr kumimoji="1" lang="en-US" altLang="ja-JP" sz="900" dirty="0">
+                <a:solidFill>
+                  <a:schemeClr val="tx1"/>
+                </a:solidFill>
+              </a:rPr>
+              <a:t>E.G..: Car Manufacturer</a:t>
+            </a:r>
+            <a:endParaRPr kumimoji="1" lang="ja-JP" altLang="en-US" sz="900" dirty="0">
+              <a:solidFill>
+                <a:schemeClr val="tx1"/>
+              </a:solidFill>
+            </a:endParaRPr>
+          </a:p>
+        </p:txBody>
+      </p:sp>
+      <p:sp>
+        <p:nvSpPr>
+          <p:cNvPr id="17" name="四角形: 角を丸くする 16">
+            <a:extLst>
+              <a:ext uri="{FF2B5EF4-FFF2-40B4-BE49-F238E27FC236}">
+                <a16:creationId xmlns:a16="http://schemas.microsoft.com/office/drawing/2014/main" id="{F02613B0-F94C-4584-BC92-B11B20CC7015}"/>
+              </a:ext>
+            </a:extLst>
+          </p:cNvPr>
+          <p:cNvSpPr/>
+          <p:nvPr/>
+        </p:nvSpPr>
+        <p:spPr>
+          <a:xfrm>
+            <a:off x="3426824" y="5404735"/>
+            <a:ext cx="1018902" cy="557348"/>
+          </a:xfrm>
+          <a:prstGeom prst="roundRect">
+            <a:avLst/>
+          </a:prstGeom>
+          <a:solidFill>
+            <a:srgbClr val="92D050"/>
+          </a:solidFill>
+          <a:ln>
+            <a:solidFill>
+              <a:srgbClr val="92D050"/>
+            </a:solidFill>
+          </a:ln>
+        </p:spPr>
+        <p:style>
+          <a:lnRef idx="2">
+            <a:schemeClr val="accent1">
+              <a:shade val="50000"/>
+            </a:schemeClr>
+          </a:lnRef>
+          <a:fillRef idx="1">
+            <a:schemeClr val="accent1"/>
+          </a:fillRef>
+          <a:effectRef idx="0">
+            <a:schemeClr val="accent1"/>
+          </a:effectRef>
+          <a:fontRef idx="minor">
+            <a:schemeClr val="lt1"/>
+          </a:fontRef>
+        </p:style>
+        <p:txBody>
+          <a:bodyPr rtlCol="0" anchor="ctr"/>
+          <a:lstStyle/>
+          <a:p>
+            <a:pPr algn="ctr"/>
+            <a:r>
+              <a:rPr kumimoji="1" lang="en-US" altLang="ja-JP" dirty="0">
+                <a:solidFill>
+                  <a:schemeClr val="tx1"/>
+                </a:solidFill>
+              </a:rPr>
+              <a:t>Tier 1</a:t>
+            </a:r>
+            <a:endParaRPr kumimoji="1" lang="ja-JP" altLang="en-US" dirty="0">
+              <a:solidFill>
+                <a:schemeClr val="tx1"/>
+              </a:solidFill>
+            </a:endParaRPr>
+          </a:p>
+        </p:txBody>
+      </p:sp>
+      <p:sp>
+        <p:nvSpPr>
+          <p:cNvPr id="20" name="四角形: 角を丸くする 19">
+            <a:extLst>
+              <a:ext uri="{FF2B5EF4-FFF2-40B4-BE49-F238E27FC236}">
+                <a16:creationId xmlns:a16="http://schemas.microsoft.com/office/drawing/2014/main" id="{22467B11-690D-4530-9FCE-10DA0C1FEC9C}"/>
+              </a:ext>
+            </a:extLst>
+          </p:cNvPr>
+          <p:cNvSpPr/>
+          <p:nvPr/>
+        </p:nvSpPr>
+        <p:spPr>
+          <a:xfrm>
+            <a:off x="6361612" y="5404735"/>
+            <a:ext cx="1018902" cy="557348"/>
+          </a:xfrm>
+          <a:prstGeom prst="roundRect">
+            <a:avLst/>
+          </a:prstGeom>
+          <a:solidFill>
+            <a:srgbClr val="FA6306"/>
+          </a:solidFill>
+          <a:ln>
+            <a:solidFill>
+              <a:srgbClr val="FA6306"/>
+            </a:solidFill>
+          </a:ln>
+        </p:spPr>
+        <p:style>
+          <a:lnRef idx="2">
+            <a:schemeClr val="accent1">
+              <a:shade val="50000"/>
+            </a:schemeClr>
+          </a:lnRef>
+          <a:fillRef idx="1">
+            <a:schemeClr val="accent1"/>
+          </a:fillRef>
+          <a:effectRef idx="0">
+            <a:schemeClr val="accent1"/>
+          </a:effectRef>
+          <a:fontRef idx="minor">
+            <a:schemeClr val="lt1"/>
+          </a:fontRef>
+        </p:style>
+        <p:txBody>
+          <a:bodyPr rtlCol="0" anchor="ctr"/>
+          <a:lstStyle/>
+          <a:p>
+            <a:pPr algn="ctr"/>
+            <a:r>
+              <a:rPr kumimoji="1" lang="en-US" altLang="ja-JP" dirty="0">
+                <a:solidFill>
+                  <a:schemeClr val="tx1"/>
+                </a:solidFill>
+              </a:rPr>
+              <a:t>User</a:t>
+            </a:r>
+            <a:endParaRPr kumimoji="1" lang="ja-JP" altLang="en-US" dirty="0">
+              <a:solidFill>
+                <a:schemeClr val="tx1"/>
+              </a:solidFill>
+            </a:endParaRPr>
+          </a:p>
+        </p:txBody>
+      </p:sp>
+      <p:cxnSp>
+        <p:nvCxnSpPr>
+          <p:cNvPr id="21" name="直線矢印コネクタ 20">
+            <a:extLst>
+              <a:ext uri="{FF2B5EF4-FFF2-40B4-BE49-F238E27FC236}">
+                <a16:creationId xmlns:a16="http://schemas.microsoft.com/office/drawing/2014/main" id="{8C9B6A39-595E-4E84-924C-EC21DF6ACA21}"/>
+              </a:ext>
+            </a:extLst>
+          </p:cNvPr>
+          <p:cNvCxnSpPr>
+            <a:stCxn id="14" idx="3"/>
+            <a:endCxn id="17" idx="1"/>
+          </p:cNvCxnSpPr>
+          <p:nvPr/>
+        </p:nvCxnSpPr>
+        <p:spPr>
+          <a:xfrm>
+            <a:off x="2978332" y="5683409"/>
+            <a:ext cx="448492" cy="0"/>
+          </a:xfrm>
+          <a:prstGeom prst="straightConnector1">
+            <a:avLst/>
+          </a:prstGeom>
+          <a:ln w="19050">
+            <a:solidFill>
+              <a:schemeClr val="tx1"/>
+            </a:solidFill>
+            <a:tailEnd type="triangle"/>
+          </a:ln>
+        </p:spPr>
+        <p:style>
+          <a:lnRef idx="1">
+            <a:schemeClr val="accent1"/>
+          </a:lnRef>
+          <a:fillRef idx="0">
+            <a:schemeClr val="accent1"/>
+          </a:fillRef>
+          <a:effectRef idx="0">
+            <a:schemeClr val="accent1"/>
+          </a:effectRef>
+          <a:fontRef idx="minor">
+            <a:schemeClr val="tx1"/>
+          </a:fontRef>
+        </p:style>
+      </p:cxnSp>
+      <p:cxnSp>
+        <p:nvCxnSpPr>
+          <p:cNvPr id="22" name="直線矢印コネクタ 21">
+            <a:extLst>
+              <a:ext uri="{FF2B5EF4-FFF2-40B4-BE49-F238E27FC236}">
+                <a16:creationId xmlns:a16="http://schemas.microsoft.com/office/drawing/2014/main" id="{3770FB73-AF8F-467E-9E54-542DE1CDCED6}"/>
+              </a:ext>
+            </a:extLst>
+          </p:cNvPr>
+          <p:cNvCxnSpPr>
+            <a:cxnSpLocks/>
+            <a:stCxn id="17" idx="3"/>
+            <a:endCxn id="16" idx="1"/>
+          </p:cNvCxnSpPr>
+          <p:nvPr/>
+        </p:nvCxnSpPr>
+        <p:spPr>
+          <a:xfrm>
+            <a:off x="4445726" y="5683409"/>
+            <a:ext cx="448492" cy="0"/>
+          </a:xfrm>
+          <a:prstGeom prst="straightConnector1">
+            <a:avLst/>
+          </a:prstGeom>
+          <a:ln w="19050">
+            <a:solidFill>
+              <a:schemeClr val="tx1"/>
+            </a:solidFill>
+            <a:tailEnd type="triangle"/>
+          </a:ln>
+        </p:spPr>
+        <p:style>
+          <a:lnRef idx="1">
+            <a:schemeClr val="accent1"/>
+          </a:lnRef>
+          <a:fillRef idx="0">
+            <a:schemeClr val="accent1"/>
+          </a:fillRef>
+          <a:effectRef idx="0">
+            <a:schemeClr val="accent1"/>
+          </a:effectRef>
+          <a:fontRef idx="minor">
+            <a:schemeClr val="tx1"/>
+          </a:fontRef>
+        </p:style>
+      </p:cxnSp>
+      <p:cxnSp>
+        <p:nvCxnSpPr>
+          <p:cNvPr id="23" name="直線矢印コネクタ 22">
+            <a:extLst>
+              <a:ext uri="{FF2B5EF4-FFF2-40B4-BE49-F238E27FC236}">
+                <a16:creationId xmlns:a16="http://schemas.microsoft.com/office/drawing/2014/main" id="{8803DA75-BCD4-429B-AAC9-B877FE5807DC}"/>
+              </a:ext>
+            </a:extLst>
+          </p:cNvPr>
+          <p:cNvCxnSpPr>
+            <a:cxnSpLocks/>
+            <a:stCxn id="16" idx="3"/>
+            <a:endCxn id="20" idx="1"/>
+          </p:cNvCxnSpPr>
+          <p:nvPr/>
+        </p:nvCxnSpPr>
+        <p:spPr>
+          <a:xfrm>
+            <a:off x="5913120" y="5683409"/>
+            <a:ext cx="448492" cy="0"/>
+          </a:xfrm>
+          <a:prstGeom prst="straightConnector1">
+            <a:avLst/>
+          </a:prstGeom>
+          <a:ln w="19050">
+            <a:solidFill>
+              <a:schemeClr val="tx1"/>
+            </a:solidFill>
+            <a:tailEnd type="triangle"/>
+          </a:ln>
+        </p:spPr>
+        <p:style>
+          <a:lnRef idx="1">
+            <a:schemeClr val="accent1"/>
+          </a:lnRef>
+          <a:fillRef idx="0">
+            <a:schemeClr val="accent1"/>
+          </a:fillRef>
+          <a:effectRef idx="0">
+            <a:schemeClr val="accent1"/>
+          </a:effectRef>
+          <a:fontRef idx="minor">
+            <a:schemeClr val="tx1"/>
+          </a:fontRef>
+        </p:style>
+      </p:cxnSp>
+      <p:sp>
+        <p:nvSpPr>
+          <p:cNvPr id="24" name="四角形: 角を丸くする 23">
+            <a:extLst>
+              <a:ext uri="{FF2B5EF4-FFF2-40B4-BE49-F238E27FC236}">
+                <a16:creationId xmlns:a16="http://schemas.microsoft.com/office/drawing/2014/main" id="{51EE46D1-CDFB-467D-BA95-EAD7B6506862}"/>
+              </a:ext>
+            </a:extLst>
+          </p:cNvPr>
+          <p:cNvSpPr/>
+          <p:nvPr/>
+        </p:nvSpPr>
+        <p:spPr>
+          <a:xfrm>
+            <a:off x="1959430" y="6044815"/>
+            <a:ext cx="1018902" cy="557348"/>
+          </a:xfrm>
+          <a:prstGeom prst="roundRect">
+            <a:avLst/>
+          </a:prstGeom>
+          <a:solidFill>
+            <a:srgbClr val="00B0F0"/>
+          </a:solidFill>
+          <a:ln>
+            <a:solidFill>
+              <a:srgbClr val="00B0F0"/>
+            </a:solidFill>
+          </a:ln>
+        </p:spPr>
+        <p:style>
+          <a:lnRef idx="2">
+            <a:schemeClr val="accent1">
+              <a:shade val="50000"/>
+            </a:schemeClr>
+          </a:lnRef>
+          <a:fillRef idx="1">
+            <a:schemeClr val="accent1"/>
+          </a:fillRef>
+          <a:effectRef idx="0">
+            <a:schemeClr val="accent1"/>
+          </a:effectRef>
+          <a:fontRef idx="minor">
+            <a:schemeClr val="lt1"/>
+          </a:fontRef>
+        </p:style>
+        <p:txBody>
+          <a:bodyPr rtlCol="0" anchor="ctr"/>
+          <a:lstStyle/>
+          <a:p>
+            <a:pPr algn="ctr"/>
+            <a:r>
+              <a:rPr kumimoji="1" lang="en-US" altLang="ja-JP" dirty="0">
+                <a:solidFill>
+                  <a:schemeClr val="tx1"/>
+                </a:solidFill>
+              </a:rPr>
+              <a:t>Tier 2</a:t>
+            </a:r>
+            <a:endParaRPr kumimoji="1" lang="ja-JP" altLang="en-US" dirty="0">
+              <a:solidFill>
+                <a:schemeClr val="tx1"/>
+              </a:solidFill>
+            </a:endParaRPr>
+          </a:p>
+        </p:txBody>
+      </p:sp>
+      <p:cxnSp>
+        <p:nvCxnSpPr>
+          <p:cNvPr id="25" name="直線矢印コネクタ 24">
+            <a:extLst>
+              <a:ext uri="{FF2B5EF4-FFF2-40B4-BE49-F238E27FC236}">
+                <a16:creationId xmlns:a16="http://schemas.microsoft.com/office/drawing/2014/main" id="{D33DE079-E249-43B4-B69D-BB9D06BF8FF2}"/>
+              </a:ext>
+            </a:extLst>
+          </p:cNvPr>
+          <p:cNvCxnSpPr>
+            <a:cxnSpLocks/>
+            <a:stCxn id="24" idx="3"/>
+          </p:cNvCxnSpPr>
+          <p:nvPr/>
+        </p:nvCxnSpPr>
+        <p:spPr>
+          <a:xfrm flipV="1">
+            <a:off x="2978332" y="5962083"/>
+            <a:ext cx="455170" cy="361406"/>
+          </a:xfrm>
+          <a:prstGeom prst="straightConnector1">
+            <a:avLst/>
+          </a:prstGeom>
+          <a:ln w="19050">
+            <a:solidFill>
+              <a:schemeClr val="tx1"/>
+            </a:solidFill>
+            <a:tailEnd type="triangle"/>
+          </a:ln>
+        </p:spPr>
+        <p:style>
+          <a:lnRef idx="1">
+            <a:schemeClr val="accent1"/>
+          </a:lnRef>
+          <a:fillRef idx="0">
+            <a:schemeClr val="accent1"/>
+          </a:fillRef>
+          <a:effectRef idx="0">
+            <a:schemeClr val="accent1"/>
+          </a:effectRef>
+          <a:fontRef idx="minor">
+            <a:schemeClr val="tx1"/>
+          </a:fontRef>
+        </p:style>
+      </p:cxnSp>
+      <p:sp>
+        <p:nvSpPr>
+          <p:cNvPr id="3" name="フローチャート: 書類 2">
+            <a:extLst>
+              <a:ext uri="{FF2B5EF4-FFF2-40B4-BE49-F238E27FC236}">
+                <a16:creationId xmlns:a16="http://schemas.microsoft.com/office/drawing/2014/main" id="{AEADC8DB-1402-4BE9-AE42-D7EC88C92134}"/>
+              </a:ext>
+            </a:extLst>
+          </p:cNvPr>
+          <p:cNvSpPr/>
+          <p:nvPr/>
+        </p:nvSpPr>
+        <p:spPr>
+          <a:xfrm>
+            <a:off x="2782389" y="5043329"/>
+            <a:ext cx="651113" cy="425649"/>
+          </a:xfrm>
+          <a:prstGeom prst="flowChartDocument">
+            <a:avLst/>
+          </a:prstGeom>
+          <a:solidFill>
+            <a:schemeClr val="bg1"/>
+          </a:solidFill>
+        </p:spPr>
+        <p:style>
+          <a:lnRef idx="2">
+            <a:schemeClr val="accent1">
+              <a:shade val="50000"/>
+            </a:schemeClr>
+          </a:lnRef>
+          <a:fillRef idx="1">
+            <a:schemeClr val="accent1"/>
+          </a:fillRef>
+          <a:effectRef idx="0">
+            <a:schemeClr val="accent1"/>
+          </a:effectRef>
+          <a:fontRef idx="minor">
+            <a:schemeClr val="lt1"/>
+          </a:fontRef>
+        </p:style>
+        <p:txBody>
+          <a:bodyPr rtlCol="0" anchor="ctr"/>
+          <a:lstStyle/>
+          <a:p>
+            <a:pPr algn="ctr"/>
+            <a:r>
+              <a:rPr kumimoji="1" lang="en-US" altLang="ja-JP" sz="900" dirty="0">
+                <a:solidFill>
+                  <a:schemeClr val="tx1"/>
+                </a:solidFill>
+              </a:rPr>
+              <a:t>Printed Material</a:t>
+            </a:r>
+            <a:endParaRPr kumimoji="1" lang="ja-JP" altLang="en-US" sz="900" dirty="0">
+              <a:solidFill>
+                <a:schemeClr val="tx1"/>
+              </a:solidFill>
+            </a:endParaRPr>
+          </a:p>
+        </p:txBody>
+      </p:sp>
+      <p:sp>
+        <p:nvSpPr>
+          <p:cNvPr id="26" name="フローチャート: 書類 25">
+            <a:extLst>
+              <a:ext uri="{FF2B5EF4-FFF2-40B4-BE49-F238E27FC236}">
+                <a16:creationId xmlns:a16="http://schemas.microsoft.com/office/drawing/2014/main" id="{D1B92BA4-2C88-42BD-A5E4-EBFE4BADC0E0}"/>
+              </a:ext>
+            </a:extLst>
+          </p:cNvPr>
+          <p:cNvSpPr/>
+          <p:nvPr/>
+        </p:nvSpPr>
+        <p:spPr>
+          <a:xfrm>
+            <a:off x="3178777" y="6208060"/>
+            <a:ext cx="651113" cy="425649"/>
+          </a:xfrm>
+          <a:prstGeom prst="flowChartDocument">
+            <a:avLst/>
+          </a:prstGeom>
+          <a:solidFill>
+            <a:schemeClr val="bg1"/>
+          </a:solidFill>
+        </p:spPr>
+        <p:style>
+          <a:lnRef idx="2">
+            <a:schemeClr val="accent1">
+              <a:shade val="50000"/>
+            </a:schemeClr>
+          </a:lnRef>
+          <a:fillRef idx="1">
+            <a:schemeClr val="accent1"/>
+          </a:fillRef>
+          <a:effectRef idx="0">
+            <a:schemeClr val="accent1"/>
+          </a:effectRef>
+          <a:fontRef idx="minor">
+            <a:schemeClr val="lt1"/>
+          </a:fontRef>
+        </p:style>
+        <p:txBody>
+          <a:bodyPr rtlCol="0" anchor="ctr"/>
+          <a:lstStyle/>
+          <a:p>
+            <a:pPr algn="ctr"/>
+            <a:r>
+              <a:rPr kumimoji="1" lang="en-US" altLang="ja-JP" sz="900" dirty="0">
+                <a:solidFill>
+                  <a:schemeClr val="tx1"/>
+                </a:solidFill>
+              </a:rPr>
+              <a:t>On-line Letter</a:t>
+            </a:r>
+            <a:endParaRPr kumimoji="1" lang="ja-JP" altLang="en-US" sz="900" dirty="0">
+              <a:solidFill>
+                <a:schemeClr val="tx1"/>
+              </a:solidFill>
+            </a:endParaRPr>
+          </a:p>
+        </p:txBody>
+      </p:sp>
+      <p:cxnSp>
+        <p:nvCxnSpPr>
+          <p:cNvPr id="13" name="直線矢印コネクタ 12">
+            <a:extLst>
+              <a:ext uri="{FF2B5EF4-FFF2-40B4-BE49-F238E27FC236}">
+                <a16:creationId xmlns:a16="http://schemas.microsoft.com/office/drawing/2014/main" id="{20233E43-51D2-4EEC-85A4-810EA6856743}"/>
+              </a:ext>
+            </a:extLst>
+          </p:cNvPr>
+          <p:cNvCxnSpPr>
+            <a:stCxn id="3" idx="3"/>
+          </p:cNvCxnSpPr>
+          <p:nvPr/>
+        </p:nvCxnSpPr>
+        <p:spPr>
+          <a:xfrm flipV="1">
+            <a:off x="3433502" y="5256153"/>
+            <a:ext cx="1138497" cy="1"/>
+          </a:xfrm>
+          <a:prstGeom prst="straightConnector1">
+            <a:avLst/>
+          </a:prstGeom>
+          <a:ln w="19050">
+            <a:solidFill>
+              <a:schemeClr val="tx1"/>
+            </a:solidFill>
+            <a:tailEnd type="triangle"/>
+          </a:ln>
+        </p:spPr>
+        <p:style>
+          <a:lnRef idx="1">
+            <a:schemeClr val="accent1"/>
+          </a:lnRef>
+          <a:fillRef idx="0">
+            <a:schemeClr val="accent1"/>
+          </a:fillRef>
+          <a:effectRef idx="0">
+            <a:schemeClr val="accent1"/>
+          </a:effectRef>
+          <a:fontRef idx="minor">
+            <a:schemeClr val="tx1"/>
+          </a:fontRef>
+        </p:style>
+      </p:cxnSp>
+      <p:cxnSp>
+        <p:nvCxnSpPr>
+          <p:cNvPr id="27" name="直線矢印コネクタ 26">
+            <a:extLst>
+              <a:ext uri="{FF2B5EF4-FFF2-40B4-BE49-F238E27FC236}">
+                <a16:creationId xmlns:a16="http://schemas.microsoft.com/office/drawing/2014/main" id="{B0C8DC04-2E90-4CF6-B9C3-4160A165820E}"/>
+              </a:ext>
+            </a:extLst>
+          </p:cNvPr>
+          <p:cNvCxnSpPr>
+            <a:cxnSpLocks/>
+            <a:stCxn id="26" idx="3"/>
+          </p:cNvCxnSpPr>
+          <p:nvPr/>
+        </p:nvCxnSpPr>
+        <p:spPr>
+          <a:xfrm flipV="1">
+            <a:off x="3829890" y="5404735"/>
+            <a:ext cx="742109" cy="1016150"/>
+          </a:xfrm>
+          <a:prstGeom prst="straightConnector1">
+            <a:avLst/>
+          </a:prstGeom>
+          <a:ln w="19050">
+            <a:solidFill>
+              <a:schemeClr val="tx1"/>
+            </a:solidFill>
+            <a:tailEnd type="triangle"/>
+          </a:ln>
+        </p:spPr>
+        <p:style>
+          <a:lnRef idx="1">
+            <a:schemeClr val="accent1"/>
+          </a:lnRef>
+          <a:fillRef idx="0">
+            <a:schemeClr val="accent1"/>
+          </a:fillRef>
+          <a:effectRef idx="0">
+            <a:schemeClr val="accent1"/>
+          </a:effectRef>
+          <a:fontRef idx="minor">
+            <a:schemeClr val="tx1"/>
+          </a:fontRef>
+        </p:style>
+      </p:cxnSp>
+      <p:sp>
+        <p:nvSpPr>
+          <p:cNvPr id="30" name="テキスト ボックス 29">
+            <a:extLst>
+              <a:ext uri="{FF2B5EF4-FFF2-40B4-BE49-F238E27FC236}">
+                <a16:creationId xmlns:a16="http://schemas.microsoft.com/office/drawing/2014/main" id="{B467BBCE-47A6-42D6-945B-3C30FB9AA122}"/>
+              </a:ext>
+            </a:extLst>
+          </p:cNvPr>
+          <p:cNvSpPr txBox="1"/>
+          <p:nvPr/>
+        </p:nvSpPr>
+        <p:spPr>
+          <a:xfrm>
+            <a:off x="1967991" y="5057431"/>
+            <a:ext cx="838691" cy="230832"/>
+          </a:xfrm>
+          <a:prstGeom prst="rect">
+            <a:avLst/>
+          </a:prstGeom>
+          <a:noFill/>
+        </p:spPr>
+        <p:txBody>
+          <a:bodyPr wrap="none" rtlCol="0">
+            <a:spAutoFit/>
+          </a:bodyPr>
+          <a:lstStyle/>
+          <a:p>
+            <a:r>
+              <a:rPr kumimoji="1" lang="en-US" altLang="ja-JP" sz="900" dirty="0"/>
+              <a:t>License Info:</a:t>
+            </a:r>
+            <a:endParaRPr kumimoji="1" lang="ja-JP" altLang="en-US" sz="900" dirty="0"/>
+          </a:p>
+        </p:txBody>
+      </p:sp>
+      <p:sp>
+        <p:nvSpPr>
+          <p:cNvPr id="31" name="テキスト ボックス 30">
+            <a:extLst>
+              <a:ext uri="{FF2B5EF4-FFF2-40B4-BE49-F238E27FC236}">
+                <a16:creationId xmlns:a16="http://schemas.microsoft.com/office/drawing/2014/main" id="{5915B00F-92A7-43D7-9CB6-A1F4835F2CE5}"/>
+              </a:ext>
+            </a:extLst>
+          </p:cNvPr>
+          <p:cNvSpPr txBox="1"/>
+          <p:nvPr/>
+        </p:nvSpPr>
+        <p:spPr>
+          <a:xfrm>
+            <a:off x="4568563" y="5108041"/>
+            <a:ext cx="1633781" cy="230832"/>
+          </a:xfrm>
+          <a:prstGeom prst="rect">
+            <a:avLst/>
+          </a:prstGeom>
+          <a:noFill/>
+        </p:spPr>
+        <p:txBody>
+          <a:bodyPr wrap="none" rtlCol="0">
+            <a:spAutoFit/>
+          </a:bodyPr>
+          <a:lstStyle/>
+          <a:p>
+            <a:r>
+              <a:rPr kumimoji="1" lang="en-US" altLang="ja-JP" sz="900" dirty="0"/>
+              <a:t>Difficulty of the conclusion…</a:t>
+            </a:r>
+            <a:endParaRPr kumimoji="1" lang="ja-JP" altLang="en-US" sz="900" dirty="0"/>
+          </a:p>
+        </p:txBody>
+      </p:sp>
+    </p:spTree>
+    <p:extLst>
+      <p:ext uri="{BB962C8B-B14F-4D97-AF65-F5344CB8AC3E}">
+        <p14:creationId xmlns:p14="http://schemas.microsoft.com/office/powerpoint/2010/main" val="2350897081"/>
+      </p:ext>
+    </p:extLst>
+  </p:cSld>
+  <p:clrMapOvr>
+    <a:masterClrMapping/>
+  </p:clrMapOvr>
+</p:sld>
+</file>
+
+<file path=ppt/slides/slide20.xml><?xml version="1.0" encoding="utf-8"?>
 <p:sld xmlns:a="http://schemas.openxmlformats.org/drawingml/2006/main" xmlns:r="http://schemas.openxmlformats.org/officeDocument/2006/relationships" xmlns:p="http://schemas.openxmlformats.org/presentationml/2006/main">
   <p:cSld>
     <p:spTree>
@@ -12909,7 +14998,7 @@
 </p:sld>
 </file>
 
-<file path=ppt/slides/slide19.xml><?xml version="1.0" encoding="utf-8"?>
+<file path=ppt/slides/slide21.xml><?xml version="1.0" encoding="utf-8"?>
 <p:sld xmlns:a="http://schemas.openxmlformats.org/drawingml/2006/main" xmlns:r="http://schemas.openxmlformats.org/officeDocument/2006/relationships" xmlns:p="http://schemas.openxmlformats.org/presentationml/2006/main">
   <p:cSld>
     <p:spTree>
@@ -13784,1046 +15873,7 @@
 </p:sld>
 </file>
 
-<file path=ppt/slides/slide2.xml><?xml version="1.0" encoding="utf-8"?>
-<p:sld xmlns:a="http://schemas.openxmlformats.org/drawingml/2006/main" xmlns:r="http://schemas.openxmlformats.org/officeDocument/2006/relationships" xmlns:p="http://schemas.openxmlformats.org/presentationml/2006/main">
-  <p:cSld>
-    <p:spTree>
-      <p:nvGrpSpPr>
-        <p:cNvPr id="1" name=""/>
-        <p:cNvGrpSpPr/>
-        <p:nvPr/>
-      </p:nvGrpSpPr>
-      <p:grpSpPr>
-        <a:xfrm>
-          <a:off x="0" y="0"/>
-          <a:ext cx="0" cy="0"/>
-          <a:chOff x="0" y="0"/>
-          <a:chExt cx="0" cy="0"/>
-        </a:xfrm>
-      </p:grpSpPr>
-      <p:sp>
-        <p:nvSpPr>
-          <p:cNvPr id="2" name="タイトル 1"/>
-          <p:cNvSpPr>
-            <a:spLocks noGrp="1"/>
-          </p:cNvSpPr>
-          <p:nvPr>
-            <p:ph type="title"/>
-          </p:nvPr>
-        </p:nvSpPr>
-        <p:spPr/>
-        <p:txBody>
-          <a:bodyPr/>
-          <a:lstStyle/>
-          <a:p>
-            <a:r>
-              <a:rPr lang="en-US" altLang="ja-JP" sz="3600" dirty="0">
-                <a:latin typeface="メイリオ" panose="020B0604030504040204" pitchFamily="50" charset="-128"/>
-                <a:ea typeface="メイリオ" panose="020B0604030504040204" pitchFamily="50" charset="-128"/>
-              </a:rPr>
-              <a:t>What is needed in “supply chain”</a:t>
-            </a:r>
-            <a:endParaRPr kumimoji="1" lang="ja-JP" altLang="en-US" sz="2585" dirty="0">
-              <a:latin typeface="メイリオ" panose="020B0604030504040204" pitchFamily="50" charset="-128"/>
-              <a:ea typeface="メイリオ" panose="020B0604030504040204" pitchFamily="50" charset="-128"/>
-              <a:cs typeface="メイリオ" panose="020B0604030504040204" pitchFamily="50" charset="-128"/>
-            </a:endParaRPr>
-          </a:p>
-        </p:txBody>
-      </p:sp>
-      <p:sp>
-        <p:nvSpPr>
-          <p:cNvPr id="5" name="テキスト プレースホルダー 4">
-            <a:extLst>
-              <a:ext uri="{FF2B5EF4-FFF2-40B4-BE49-F238E27FC236}">
-                <a16:creationId xmlns:a16="http://schemas.microsoft.com/office/drawing/2014/main" id="{9A091B9E-9B88-4373-A3FD-07E75549F7F8}"/>
-              </a:ext>
-            </a:extLst>
-          </p:cNvPr>
-          <p:cNvSpPr>
-            <a:spLocks noGrp="1"/>
-          </p:cNvSpPr>
-          <p:nvPr>
-            <p:ph type="body" idx="1"/>
-          </p:nvPr>
-        </p:nvSpPr>
-        <p:spPr>
-          <a:xfrm>
-            <a:off x="453763" y="1468518"/>
-            <a:ext cx="8229599" cy="1451411"/>
-          </a:xfrm>
-        </p:spPr>
-        <p:txBody>
-          <a:bodyPr/>
-          <a:lstStyle/>
-          <a:p>
-            <a:pPr marL="342900" indent="-342900">
-              <a:spcBef>
-                <a:spcPts val="1108"/>
-              </a:spcBef>
-            </a:pPr>
-            <a:r>
-              <a:rPr lang="en-US" altLang="ja-JP" dirty="0"/>
-              <a:t>Challenges for exchanging license information between organizations.</a:t>
-            </a:r>
-          </a:p>
-          <a:p>
-            <a:pPr lvl="1"/>
-            <a:r>
-              <a:rPr lang="en-US" altLang="ja-JP" dirty="0"/>
-              <a:t>Many items required in license information</a:t>
-            </a:r>
-          </a:p>
-          <a:p>
-            <a:pPr lvl="2"/>
-            <a:r>
-              <a:rPr lang="en-US" altLang="ja-JP" dirty="0"/>
-              <a:t>such as the name of OSS, the version of OSS, the origin of the source code etc.</a:t>
-            </a:r>
-          </a:p>
-          <a:p>
-            <a:pPr marL="599064" lvl="2" indent="0">
-              <a:buNone/>
-            </a:pPr>
-            <a:r>
-              <a:rPr lang="en-US" altLang="ja-JP" dirty="0">
-                <a:sym typeface="Wingdings" panose="05000000000000000000" pitchFamily="2" charset="2"/>
-              </a:rPr>
-              <a:t> </a:t>
-            </a:r>
-            <a:r>
-              <a:rPr lang="en-US" altLang="ja-JP" dirty="0"/>
-              <a:t>May cause the difficulty for the staff to understand all the license information.</a:t>
-            </a:r>
-          </a:p>
-          <a:p>
-            <a:pPr lvl="1"/>
-            <a:r>
-              <a:rPr lang="en-US" altLang="ja-JP" dirty="0"/>
-              <a:t>The license information format</a:t>
-            </a:r>
-          </a:p>
-          <a:p>
-            <a:pPr lvl="2"/>
-            <a:r>
-              <a:rPr lang="en-US" altLang="ja-JP" dirty="0"/>
-              <a:t>Sometimes it’s written in “Contract paper”, “Letter concluded in SW Package” or any other way in various format.</a:t>
-            </a:r>
-          </a:p>
-          <a:p>
-            <a:pPr marL="599064" lvl="2" indent="0">
-              <a:buNone/>
-            </a:pPr>
-            <a:r>
-              <a:rPr lang="en-US" altLang="ja-JP" dirty="0">
-                <a:sym typeface="Wingdings" panose="05000000000000000000" pitchFamily="2" charset="2"/>
-              </a:rPr>
-              <a:t> </a:t>
-            </a:r>
-            <a:r>
-              <a:rPr lang="en-US" altLang="ja-JP" dirty="0"/>
-              <a:t>These differences may cause the difficulty for providers to create and manage them.</a:t>
-            </a:r>
-          </a:p>
-          <a:p>
-            <a:pPr marL="316531" indent="-316531">
-              <a:spcBef>
-                <a:spcPts val="1108"/>
-              </a:spcBef>
-              <a:buFont typeface="Wingdings" panose="05000000000000000000" pitchFamily="2" charset="2"/>
-              <a:buChar char="l"/>
-            </a:pPr>
-            <a:endParaRPr lang="en-US" altLang="ja-JP" dirty="0">
-              <a:latin typeface="メイリオ" panose="020B0604030504040204" pitchFamily="50" charset="-128"/>
-              <a:ea typeface="メイリオ" panose="020B0604030504040204" pitchFamily="50" charset="-128"/>
-            </a:endParaRPr>
-          </a:p>
-          <a:p>
-            <a:pPr marL="569755" lvl="1" indent="-316531">
-              <a:spcBef>
-                <a:spcPts val="1108"/>
-              </a:spcBef>
-              <a:buFont typeface="Wingdings" panose="05000000000000000000" pitchFamily="2" charset="2"/>
-              <a:buChar char="l"/>
-            </a:pPr>
-            <a:endParaRPr lang="ja-JP" altLang="en-US" sz="1431" dirty="0">
-              <a:latin typeface="メイリオ" panose="020B0604030504040204" pitchFamily="50" charset="-128"/>
-              <a:ea typeface="メイリオ" panose="020B0604030504040204" pitchFamily="50" charset="-128"/>
-            </a:endParaRPr>
-          </a:p>
-        </p:txBody>
-      </p:sp>
-      <p:sp>
-        <p:nvSpPr>
-          <p:cNvPr id="6" name="テキスト ボックス 5">
-            <a:extLst>
-              <a:ext uri="{FF2B5EF4-FFF2-40B4-BE49-F238E27FC236}">
-                <a16:creationId xmlns:a16="http://schemas.microsoft.com/office/drawing/2014/main" id="{BA2C03EE-2E9E-4462-BDC7-EDAA080A65B8}"/>
-              </a:ext>
-            </a:extLst>
-          </p:cNvPr>
-          <p:cNvSpPr txBox="1"/>
-          <p:nvPr/>
-        </p:nvSpPr>
-        <p:spPr>
-          <a:xfrm>
-            <a:off x="4223384" y="6353633"/>
-            <a:ext cx="697937" cy="248530"/>
-          </a:xfrm>
-          <a:prstGeom prst="rect">
-            <a:avLst/>
-          </a:prstGeom>
-          <a:noFill/>
-        </p:spPr>
-        <p:txBody>
-          <a:bodyPr wrap="square" rtlCol="0">
-            <a:spAutoFit/>
-          </a:bodyPr>
-          <a:lstStyle/>
-          <a:p>
-            <a:pPr algn="ctr" defTabSz="844083"/>
-            <a:r>
-              <a:rPr kumimoji="1" lang="en-US" altLang="ja-JP" sz="1015" kern="0" dirty="0">
-                <a:solidFill>
-                  <a:srgbClr val="000000"/>
-                </a:solidFill>
-                <a:latin typeface="Arial"/>
-                <a:cs typeface="Arial"/>
-                <a:sym typeface="Arial"/>
-              </a:rPr>
-              <a:t>CC0-1.0</a:t>
-            </a:r>
-            <a:endParaRPr kumimoji="1" lang="ja-JP" altLang="en-US" sz="1108" kern="0" dirty="0">
-              <a:solidFill>
-                <a:srgbClr val="000000"/>
-              </a:solidFill>
-              <a:latin typeface="Arial"/>
-              <a:cs typeface="Arial"/>
-              <a:sym typeface="Arial"/>
-            </a:endParaRPr>
-          </a:p>
-        </p:txBody>
-      </p:sp>
-      <p:sp>
-        <p:nvSpPr>
-          <p:cNvPr id="14" name="四角形: 角を丸くする 13">
-            <a:extLst>
-              <a:ext uri="{FF2B5EF4-FFF2-40B4-BE49-F238E27FC236}">
-                <a16:creationId xmlns:a16="http://schemas.microsoft.com/office/drawing/2014/main" id="{E948B54A-1932-4E96-8FA0-4817ECE14174}"/>
-              </a:ext>
-            </a:extLst>
-          </p:cNvPr>
-          <p:cNvSpPr/>
-          <p:nvPr/>
-        </p:nvSpPr>
-        <p:spPr>
-          <a:xfrm>
-            <a:off x="1959430" y="5404735"/>
-            <a:ext cx="1018902" cy="557348"/>
-          </a:xfrm>
-          <a:prstGeom prst="roundRect">
-            <a:avLst/>
-          </a:prstGeom>
-          <a:solidFill>
-            <a:srgbClr val="00B0F0"/>
-          </a:solidFill>
-          <a:ln>
-            <a:solidFill>
-              <a:srgbClr val="00B0F0"/>
-            </a:solidFill>
-          </a:ln>
-        </p:spPr>
-        <p:style>
-          <a:lnRef idx="2">
-            <a:schemeClr val="accent1">
-              <a:shade val="50000"/>
-            </a:schemeClr>
-          </a:lnRef>
-          <a:fillRef idx="1">
-            <a:schemeClr val="accent1"/>
-          </a:fillRef>
-          <a:effectRef idx="0">
-            <a:schemeClr val="accent1"/>
-          </a:effectRef>
-          <a:fontRef idx="minor">
-            <a:schemeClr val="lt1"/>
-          </a:fontRef>
-        </p:style>
-        <p:txBody>
-          <a:bodyPr rtlCol="0" anchor="ctr"/>
-          <a:lstStyle/>
-          <a:p>
-            <a:pPr algn="ctr"/>
-            <a:r>
-              <a:rPr kumimoji="1" lang="en-US" altLang="ja-JP" dirty="0">
-                <a:solidFill>
-                  <a:schemeClr val="tx1"/>
-                </a:solidFill>
-              </a:rPr>
-              <a:t>Tier 2</a:t>
-            </a:r>
-            <a:endParaRPr kumimoji="1" lang="ja-JP" altLang="en-US" dirty="0">
-              <a:solidFill>
-                <a:schemeClr val="tx1"/>
-              </a:solidFill>
-            </a:endParaRPr>
-          </a:p>
-        </p:txBody>
-      </p:sp>
-      <p:sp>
-        <p:nvSpPr>
-          <p:cNvPr id="16" name="四角形: 角を丸くする 15">
-            <a:extLst>
-              <a:ext uri="{FF2B5EF4-FFF2-40B4-BE49-F238E27FC236}">
-                <a16:creationId xmlns:a16="http://schemas.microsoft.com/office/drawing/2014/main" id="{CF5315EB-AC76-4FDF-BAC6-2080AC856F62}"/>
-              </a:ext>
-            </a:extLst>
-          </p:cNvPr>
-          <p:cNvSpPr/>
-          <p:nvPr/>
-        </p:nvSpPr>
-        <p:spPr>
-          <a:xfrm>
-            <a:off x="4894218" y="5404735"/>
-            <a:ext cx="1018902" cy="557348"/>
-          </a:xfrm>
-          <a:prstGeom prst="roundRect">
-            <a:avLst/>
-          </a:prstGeom>
-          <a:solidFill>
-            <a:srgbClr val="FFC000"/>
-          </a:solidFill>
-          <a:ln>
-            <a:solidFill>
-              <a:srgbClr val="FFC000"/>
-            </a:solidFill>
-          </a:ln>
-        </p:spPr>
-        <p:style>
-          <a:lnRef idx="2">
-            <a:schemeClr val="accent1">
-              <a:shade val="50000"/>
-            </a:schemeClr>
-          </a:lnRef>
-          <a:fillRef idx="1">
-            <a:schemeClr val="accent1"/>
-          </a:fillRef>
-          <a:effectRef idx="0">
-            <a:schemeClr val="accent1"/>
-          </a:effectRef>
-          <a:fontRef idx="minor">
-            <a:schemeClr val="lt1"/>
-          </a:fontRef>
-        </p:style>
-        <p:txBody>
-          <a:bodyPr rtlCol="0" anchor="ctr"/>
-          <a:lstStyle/>
-          <a:p>
-            <a:pPr algn="ctr"/>
-            <a:r>
-              <a:rPr kumimoji="1" lang="en-US" altLang="ja-JP" dirty="0">
-                <a:solidFill>
-                  <a:schemeClr val="tx1"/>
-                </a:solidFill>
-              </a:rPr>
-              <a:t>OEM</a:t>
-            </a:r>
-          </a:p>
-          <a:p>
-            <a:pPr algn="ctr"/>
-            <a:r>
-              <a:rPr kumimoji="1" lang="en-US" altLang="ja-JP" sz="900" dirty="0">
-                <a:solidFill>
-                  <a:schemeClr val="tx1"/>
-                </a:solidFill>
-              </a:rPr>
-              <a:t>E.G..: Car Manufacturer</a:t>
-            </a:r>
-            <a:endParaRPr kumimoji="1" lang="ja-JP" altLang="en-US" sz="900" dirty="0">
-              <a:solidFill>
-                <a:schemeClr val="tx1"/>
-              </a:solidFill>
-            </a:endParaRPr>
-          </a:p>
-        </p:txBody>
-      </p:sp>
-      <p:sp>
-        <p:nvSpPr>
-          <p:cNvPr id="17" name="四角形: 角を丸くする 16">
-            <a:extLst>
-              <a:ext uri="{FF2B5EF4-FFF2-40B4-BE49-F238E27FC236}">
-                <a16:creationId xmlns:a16="http://schemas.microsoft.com/office/drawing/2014/main" id="{F02613B0-F94C-4584-BC92-B11B20CC7015}"/>
-              </a:ext>
-            </a:extLst>
-          </p:cNvPr>
-          <p:cNvSpPr/>
-          <p:nvPr/>
-        </p:nvSpPr>
-        <p:spPr>
-          <a:xfrm>
-            <a:off x="3426824" y="5404735"/>
-            <a:ext cx="1018902" cy="557348"/>
-          </a:xfrm>
-          <a:prstGeom prst="roundRect">
-            <a:avLst/>
-          </a:prstGeom>
-          <a:solidFill>
-            <a:srgbClr val="92D050"/>
-          </a:solidFill>
-          <a:ln>
-            <a:solidFill>
-              <a:srgbClr val="92D050"/>
-            </a:solidFill>
-          </a:ln>
-        </p:spPr>
-        <p:style>
-          <a:lnRef idx="2">
-            <a:schemeClr val="accent1">
-              <a:shade val="50000"/>
-            </a:schemeClr>
-          </a:lnRef>
-          <a:fillRef idx="1">
-            <a:schemeClr val="accent1"/>
-          </a:fillRef>
-          <a:effectRef idx="0">
-            <a:schemeClr val="accent1"/>
-          </a:effectRef>
-          <a:fontRef idx="minor">
-            <a:schemeClr val="lt1"/>
-          </a:fontRef>
-        </p:style>
-        <p:txBody>
-          <a:bodyPr rtlCol="0" anchor="ctr"/>
-          <a:lstStyle/>
-          <a:p>
-            <a:pPr algn="ctr"/>
-            <a:r>
-              <a:rPr kumimoji="1" lang="en-US" altLang="ja-JP" dirty="0">
-                <a:solidFill>
-                  <a:schemeClr val="tx1"/>
-                </a:solidFill>
-              </a:rPr>
-              <a:t>Tier 1</a:t>
-            </a:r>
-            <a:endParaRPr kumimoji="1" lang="ja-JP" altLang="en-US" dirty="0">
-              <a:solidFill>
-                <a:schemeClr val="tx1"/>
-              </a:solidFill>
-            </a:endParaRPr>
-          </a:p>
-        </p:txBody>
-      </p:sp>
-      <p:sp>
-        <p:nvSpPr>
-          <p:cNvPr id="20" name="四角形: 角を丸くする 19">
-            <a:extLst>
-              <a:ext uri="{FF2B5EF4-FFF2-40B4-BE49-F238E27FC236}">
-                <a16:creationId xmlns:a16="http://schemas.microsoft.com/office/drawing/2014/main" id="{22467B11-690D-4530-9FCE-10DA0C1FEC9C}"/>
-              </a:ext>
-            </a:extLst>
-          </p:cNvPr>
-          <p:cNvSpPr/>
-          <p:nvPr/>
-        </p:nvSpPr>
-        <p:spPr>
-          <a:xfrm>
-            <a:off x="6361612" y="5404735"/>
-            <a:ext cx="1018902" cy="557348"/>
-          </a:xfrm>
-          <a:prstGeom prst="roundRect">
-            <a:avLst/>
-          </a:prstGeom>
-          <a:solidFill>
-            <a:srgbClr val="FA6306"/>
-          </a:solidFill>
-          <a:ln>
-            <a:solidFill>
-              <a:srgbClr val="FA6306"/>
-            </a:solidFill>
-          </a:ln>
-        </p:spPr>
-        <p:style>
-          <a:lnRef idx="2">
-            <a:schemeClr val="accent1">
-              <a:shade val="50000"/>
-            </a:schemeClr>
-          </a:lnRef>
-          <a:fillRef idx="1">
-            <a:schemeClr val="accent1"/>
-          </a:fillRef>
-          <a:effectRef idx="0">
-            <a:schemeClr val="accent1"/>
-          </a:effectRef>
-          <a:fontRef idx="minor">
-            <a:schemeClr val="lt1"/>
-          </a:fontRef>
-        </p:style>
-        <p:txBody>
-          <a:bodyPr rtlCol="0" anchor="ctr"/>
-          <a:lstStyle/>
-          <a:p>
-            <a:pPr algn="ctr"/>
-            <a:r>
-              <a:rPr kumimoji="1" lang="en-US" altLang="ja-JP" dirty="0">
-                <a:solidFill>
-                  <a:schemeClr val="tx1"/>
-                </a:solidFill>
-              </a:rPr>
-              <a:t>User</a:t>
-            </a:r>
-            <a:endParaRPr kumimoji="1" lang="ja-JP" altLang="en-US" dirty="0">
-              <a:solidFill>
-                <a:schemeClr val="tx1"/>
-              </a:solidFill>
-            </a:endParaRPr>
-          </a:p>
-        </p:txBody>
-      </p:sp>
-      <p:cxnSp>
-        <p:nvCxnSpPr>
-          <p:cNvPr id="21" name="直線矢印コネクタ 20">
-            <a:extLst>
-              <a:ext uri="{FF2B5EF4-FFF2-40B4-BE49-F238E27FC236}">
-                <a16:creationId xmlns:a16="http://schemas.microsoft.com/office/drawing/2014/main" id="{8C9B6A39-595E-4E84-924C-EC21DF6ACA21}"/>
-              </a:ext>
-            </a:extLst>
-          </p:cNvPr>
-          <p:cNvCxnSpPr>
-            <a:stCxn id="14" idx="3"/>
-            <a:endCxn id="17" idx="1"/>
-          </p:cNvCxnSpPr>
-          <p:nvPr/>
-        </p:nvCxnSpPr>
-        <p:spPr>
-          <a:xfrm>
-            <a:off x="2978332" y="5683409"/>
-            <a:ext cx="448492" cy="0"/>
-          </a:xfrm>
-          <a:prstGeom prst="straightConnector1">
-            <a:avLst/>
-          </a:prstGeom>
-          <a:ln w="19050">
-            <a:solidFill>
-              <a:schemeClr val="tx1"/>
-            </a:solidFill>
-            <a:tailEnd type="triangle"/>
-          </a:ln>
-        </p:spPr>
-        <p:style>
-          <a:lnRef idx="1">
-            <a:schemeClr val="accent1"/>
-          </a:lnRef>
-          <a:fillRef idx="0">
-            <a:schemeClr val="accent1"/>
-          </a:fillRef>
-          <a:effectRef idx="0">
-            <a:schemeClr val="accent1"/>
-          </a:effectRef>
-          <a:fontRef idx="minor">
-            <a:schemeClr val="tx1"/>
-          </a:fontRef>
-        </p:style>
-      </p:cxnSp>
-      <p:cxnSp>
-        <p:nvCxnSpPr>
-          <p:cNvPr id="22" name="直線矢印コネクタ 21">
-            <a:extLst>
-              <a:ext uri="{FF2B5EF4-FFF2-40B4-BE49-F238E27FC236}">
-                <a16:creationId xmlns:a16="http://schemas.microsoft.com/office/drawing/2014/main" id="{3770FB73-AF8F-467E-9E54-542DE1CDCED6}"/>
-              </a:ext>
-            </a:extLst>
-          </p:cNvPr>
-          <p:cNvCxnSpPr>
-            <a:cxnSpLocks/>
-            <a:stCxn id="17" idx="3"/>
-            <a:endCxn id="16" idx="1"/>
-          </p:cNvCxnSpPr>
-          <p:nvPr/>
-        </p:nvCxnSpPr>
-        <p:spPr>
-          <a:xfrm>
-            <a:off x="4445726" y="5683409"/>
-            <a:ext cx="448492" cy="0"/>
-          </a:xfrm>
-          <a:prstGeom prst="straightConnector1">
-            <a:avLst/>
-          </a:prstGeom>
-          <a:ln w="19050">
-            <a:solidFill>
-              <a:schemeClr val="tx1"/>
-            </a:solidFill>
-            <a:tailEnd type="triangle"/>
-          </a:ln>
-        </p:spPr>
-        <p:style>
-          <a:lnRef idx="1">
-            <a:schemeClr val="accent1"/>
-          </a:lnRef>
-          <a:fillRef idx="0">
-            <a:schemeClr val="accent1"/>
-          </a:fillRef>
-          <a:effectRef idx="0">
-            <a:schemeClr val="accent1"/>
-          </a:effectRef>
-          <a:fontRef idx="minor">
-            <a:schemeClr val="tx1"/>
-          </a:fontRef>
-        </p:style>
-      </p:cxnSp>
-      <p:cxnSp>
-        <p:nvCxnSpPr>
-          <p:cNvPr id="23" name="直線矢印コネクタ 22">
-            <a:extLst>
-              <a:ext uri="{FF2B5EF4-FFF2-40B4-BE49-F238E27FC236}">
-                <a16:creationId xmlns:a16="http://schemas.microsoft.com/office/drawing/2014/main" id="{8803DA75-BCD4-429B-AAC9-B877FE5807DC}"/>
-              </a:ext>
-            </a:extLst>
-          </p:cNvPr>
-          <p:cNvCxnSpPr>
-            <a:cxnSpLocks/>
-            <a:stCxn id="16" idx="3"/>
-            <a:endCxn id="20" idx="1"/>
-          </p:cNvCxnSpPr>
-          <p:nvPr/>
-        </p:nvCxnSpPr>
-        <p:spPr>
-          <a:xfrm>
-            <a:off x="5913120" y="5683409"/>
-            <a:ext cx="448492" cy="0"/>
-          </a:xfrm>
-          <a:prstGeom prst="straightConnector1">
-            <a:avLst/>
-          </a:prstGeom>
-          <a:ln w="19050">
-            <a:solidFill>
-              <a:schemeClr val="tx1"/>
-            </a:solidFill>
-            <a:tailEnd type="triangle"/>
-          </a:ln>
-        </p:spPr>
-        <p:style>
-          <a:lnRef idx="1">
-            <a:schemeClr val="accent1"/>
-          </a:lnRef>
-          <a:fillRef idx="0">
-            <a:schemeClr val="accent1"/>
-          </a:fillRef>
-          <a:effectRef idx="0">
-            <a:schemeClr val="accent1"/>
-          </a:effectRef>
-          <a:fontRef idx="minor">
-            <a:schemeClr val="tx1"/>
-          </a:fontRef>
-        </p:style>
-      </p:cxnSp>
-      <p:sp>
-        <p:nvSpPr>
-          <p:cNvPr id="24" name="四角形: 角を丸くする 23">
-            <a:extLst>
-              <a:ext uri="{FF2B5EF4-FFF2-40B4-BE49-F238E27FC236}">
-                <a16:creationId xmlns:a16="http://schemas.microsoft.com/office/drawing/2014/main" id="{51EE46D1-CDFB-467D-BA95-EAD7B6506862}"/>
-              </a:ext>
-            </a:extLst>
-          </p:cNvPr>
-          <p:cNvSpPr/>
-          <p:nvPr/>
-        </p:nvSpPr>
-        <p:spPr>
-          <a:xfrm>
-            <a:off x="1959430" y="6044815"/>
-            <a:ext cx="1018902" cy="557348"/>
-          </a:xfrm>
-          <a:prstGeom prst="roundRect">
-            <a:avLst/>
-          </a:prstGeom>
-          <a:solidFill>
-            <a:srgbClr val="00B0F0"/>
-          </a:solidFill>
-          <a:ln>
-            <a:solidFill>
-              <a:srgbClr val="00B0F0"/>
-            </a:solidFill>
-          </a:ln>
-        </p:spPr>
-        <p:style>
-          <a:lnRef idx="2">
-            <a:schemeClr val="accent1">
-              <a:shade val="50000"/>
-            </a:schemeClr>
-          </a:lnRef>
-          <a:fillRef idx="1">
-            <a:schemeClr val="accent1"/>
-          </a:fillRef>
-          <a:effectRef idx="0">
-            <a:schemeClr val="accent1"/>
-          </a:effectRef>
-          <a:fontRef idx="minor">
-            <a:schemeClr val="lt1"/>
-          </a:fontRef>
-        </p:style>
-        <p:txBody>
-          <a:bodyPr rtlCol="0" anchor="ctr"/>
-          <a:lstStyle/>
-          <a:p>
-            <a:pPr algn="ctr"/>
-            <a:r>
-              <a:rPr kumimoji="1" lang="en-US" altLang="ja-JP" dirty="0">
-                <a:solidFill>
-                  <a:schemeClr val="tx1"/>
-                </a:solidFill>
-              </a:rPr>
-              <a:t>Tier 2</a:t>
-            </a:r>
-            <a:endParaRPr kumimoji="1" lang="ja-JP" altLang="en-US" dirty="0">
-              <a:solidFill>
-                <a:schemeClr val="tx1"/>
-              </a:solidFill>
-            </a:endParaRPr>
-          </a:p>
-        </p:txBody>
-      </p:sp>
-      <p:cxnSp>
-        <p:nvCxnSpPr>
-          <p:cNvPr id="25" name="直線矢印コネクタ 24">
-            <a:extLst>
-              <a:ext uri="{FF2B5EF4-FFF2-40B4-BE49-F238E27FC236}">
-                <a16:creationId xmlns:a16="http://schemas.microsoft.com/office/drawing/2014/main" id="{D33DE079-E249-43B4-B69D-BB9D06BF8FF2}"/>
-              </a:ext>
-            </a:extLst>
-          </p:cNvPr>
-          <p:cNvCxnSpPr>
-            <a:cxnSpLocks/>
-            <a:stCxn id="24" idx="3"/>
-          </p:cNvCxnSpPr>
-          <p:nvPr/>
-        </p:nvCxnSpPr>
-        <p:spPr>
-          <a:xfrm flipV="1">
-            <a:off x="2978332" y="5962083"/>
-            <a:ext cx="455170" cy="361406"/>
-          </a:xfrm>
-          <a:prstGeom prst="straightConnector1">
-            <a:avLst/>
-          </a:prstGeom>
-          <a:ln w="19050">
-            <a:solidFill>
-              <a:schemeClr val="tx1"/>
-            </a:solidFill>
-            <a:tailEnd type="triangle"/>
-          </a:ln>
-        </p:spPr>
-        <p:style>
-          <a:lnRef idx="1">
-            <a:schemeClr val="accent1"/>
-          </a:lnRef>
-          <a:fillRef idx="0">
-            <a:schemeClr val="accent1"/>
-          </a:fillRef>
-          <a:effectRef idx="0">
-            <a:schemeClr val="accent1"/>
-          </a:effectRef>
-          <a:fontRef idx="minor">
-            <a:schemeClr val="tx1"/>
-          </a:fontRef>
-        </p:style>
-      </p:cxnSp>
-      <p:sp>
-        <p:nvSpPr>
-          <p:cNvPr id="3" name="フローチャート: 書類 2">
-            <a:extLst>
-              <a:ext uri="{FF2B5EF4-FFF2-40B4-BE49-F238E27FC236}">
-                <a16:creationId xmlns:a16="http://schemas.microsoft.com/office/drawing/2014/main" id="{AEADC8DB-1402-4BE9-AE42-D7EC88C92134}"/>
-              </a:ext>
-            </a:extLst>
-          </p:cNvPr>
-          <p:cNvSpPr/>
-          <p:nvPr/>
-        </p:nvSpPr>
-        <p:spPr>
-          <a:xfrm>
-            <a:off x="2782389" y="5043329"/>
-            <a:ext cx="651113" cy="425649"/>
-          </a:xfrm>
-          <a:prstGeom prst="flowChartDocument">
-            <a:avLst/>
-          </a:prstGeom>
-          <a:solidFill>
-            <a:schemeClr val="bg1"/>
-          </a:solidFill>
-        </p:spPr>
-        <p:style>
-          <a:lnRef idx="2">
-            <a:schemeClr val="accent1">
-              <a:shade val="50000"/>
-            </a:schemeClr>
-          </a:lnRef>
-          <a:fillRef idx="1">
-            <a:schemeClr val="accent1"/>
-          </a:fillRef>
-          <a:effectRef idx="0">
-            <a:schemeClr val="accent1"/>
-          </a:effectRef>
-          <a:fontRef idx="minor">
-            <a:schemeClr val="lt1"/>
-          </a:fontRef>
-        </p:style>
-        <p:txBody>
-          <a:bodyPr rtlCol="0" anchor="ctr"/>
-          <a:lstStyle/>
-          <a:p>
-            <a:pPr algn="ctr"/>
-            <a:r>
-              <a:rPr kumimoji="1" lang="en-US" altLang="ja-JP" sz="900" dirty="0">
-                <a:solidFill>
-                  <a:schemeClr val="tx1"/>
-                </a:solidFill>
-              </a:rPr>
-              <a:t>Printed Material</a:t>
-            </a:r>
-            <a:endParaRPr kumimoji="1" lang="ja-JP" altLang="en-US" sz="900" dirty="0">
-              <a:solidFill>
-                <a:schemeClr val="tx1"/>
-              </a:solidFill>
-            </a:endParaRPr>
-          </a:p>
-        </p:txBody>
-      </p:sp>
-      <p:sp>
-        <p:nvSpPr>
-          <p:cNvPr id="26" name="フローチャート: 書類 25">
-            <a:extLst>
-              <a:ext uri="{FF2B5EF4-FFF2-40B4-BE49-F238E27FC236}">
-                <a16:creationId xmlns:a16="http://schemas.microsoft.com/office/drawing/2014/main" id="{D1B92BA4-2C88-42BD-A5E4-EBFE4BADC0E0}"/>
-              </a:ext>
-            </a:extLst>
-          </p:cNvPr>
-          <p:cNvSpPr/>
-          <p:nvPr/>
-        </p:nvSpPr>
-        <p:spPr>
-          <a:xfrm>
-            <a:off x="3178777" y="6208060"/>
-            <a:ext cx="651113" cy="425649"/>
-          </a:xfrm>
-          <a:prstGeom prst="flowChartDocument">
-            <a:avLst/>
-          </a:prstGeom>
-          <a:solidFill>
-            <a:schemeClr val="bg1"/>
-          </a:solidFill>
-        </p:spPr>
-        <p:style>
-          <a:lnRef idx="2">
-            <a:schemeClr val="accent1">
-              <a:shade val="50000"/>
-            </a:schemeClr>
-          </a:lnRef>
-          <a:fillRef idx="1">
-            <a:schemeClr val="accent1"/>
-          </a:fillRef>
-          <a:effectRef idx="0">
-            <a:schemeClr val="accent1"/>
-          </a:effectRef>
-          <a:fontRef idx="minor">
-            <a:schemeClr val="lt1"/>
-          </a:fontRef>
-        </p:style>
-        <p:txBody>
-          <a:bodyPr rtlCol="0" anchor="ctr"/>
-          <a:lstStyle/>
-          <a:p>
-            <a:pPr algn="ctr"/>
-            <a:r>
-              <a:rPr kumimoji="1" lang="en-US" altLang="ja-JP" sz="900" dirty="0">
-                <a:solidFill>
-                  <a:schemeClr val="tx1"/>
-                </a:solidFill>
-              </a:rPr>
-              <a:t>On-line Letter</a:t>
-            </a:r>
-            <a:endParaRPr kumimoji="1" lang="ja-JP" altLang="en-US" sz="900" dirty="0">
-              <a:solidFill>
-                <a:schemeClr val="tx1"/>
-              </a:solidFill>
-            </a:endParaRPr>
-          </a:p>
-        </p:txBody>
-      </p:sp>
-      <p:cxnSp>
-        <p:nvCxnSpPr>
-          <p:cNvPr id="13" name="直線矢印コネクタ 12">
-            <a:extLst>
-              <a:ext uri="{FF2B5EF4-FFF2-40B4-BE49-F238E27FC236}">
-                <a16:creationId xmlns:a16="http://schemas.microsoft.com/office/drawing/2014/main" id="{20233E43-51D2-4EEC-85A4-810EA6856743}"/>
-              </a:ext>
-            </a:extLst>
-          </p:cNvPr>
-          <p:cNvCxnSpPr>
-            <a:stCxn id="3" idx="3"/>
-          </p:cNvCxnSpPr>
-          <p:nvPr/>
-        </p:nvCxnSpPr>
-        <p:spPr>
-          <a:xfrm flipV="1">
-            <a:off x="3433502" y="5256153"/>
-            <a:ext cx="1138497" cy="1"/>
-          </a:xfrm>
-          <a:prstGeom prst="straightConnector1">
-            <a:avLst/>
-          </a:prstGeom>
-          <a:ln w="19050">
-            <a:solidFill>
-              <a:schemeClr val="tx1"/>
-            </a:solidFill>
-            <a:tailEnd type="triangle"/>
-          </a:ln>
-        </p:spPr>
-        <p:style>
-          <a:lnRef idx="1">
-            <a:schemeClr val="accent1"/>
-          </a:lnRef>
-          <a:fillRef idx="0">
-            <a:schemeClr val="accent1"/>
-          </a:fillRef>
-          <a:effectRef idx="0">
-            <a:schemeClr val="accent1"/>
-          </a:effectRef>
-          <a:fontRef idx="minor">
-            <a:schemeClr val="tx1"/>
-          </a:fontRef>
-        </p:style>
-      </p:cxnSp>
-      <p:cxnSp>
-        <p:nvCxnSpPr>
-          <p:cNvPr id="27" name="直線矢印コネクタ 26">
-            <a:extLst>
-              <a:ext uri="{FF2B5EF4-FFF2-40B4-BE49-F238E27FC236}">
-                <a16:creationId xmlns:a16="http://schemas.microsoft.com/office/drawing/2014/main" id="{B0C8DC04-2E90-4CF6-B9C3-4160A165820E}"/>
-              </a:ext>
-            </a:extLst>
-          </p:cNvPr>
-          <p:cNvCxnSpPr>
-            <a:cxnSpLocks/>
-            <a:stCxn id="26" idx="3"/>
-          </p:cNvCxnSpPr>
-          <p:nvPr/>
-        </p:nvCxnSpPr>
-        <p:spPr>
-          <a:xfrm flipV="1">
-            <a:off x="3829890" y="5404735"/>
-            <a:ext cx="742109" cy="1016150"/>
-          </a:xfrm>
-          <a:prstGeom prst="straightConnector1">
-            <a:avLst/>
-          </a:prstGeom>
-          <a:ln w="19050">
-            <a:solidFill>
-              <a:schemeClr val="tx1"/>
-            </a:solidFill>
-            <a:tailEnd type="triangle"/>
-          </a:ln>
-        </p:spPr>
-        <p:style>
-          <a:lnRef idx="1">
-            <a:schemeClr val="accent1"/>
-          </a:lnRef>
-          <a:fillRef idx="0">
-            <a:schemeClr val="accent1"/>
-          </a:fillRef>
-          <a:effectRef idx="0">
-            <a:schemeClr val="accent1"/>
-          </a:effectRef>
-          <a:fontRef idx="minor">
-            <a:schemeClr val="tx1"/>
-          </a:fontRef>
-        </p:style>
-      </p:cxnSp>
-      <p:sp>
-        <p:nvSpPr>
-          <p:cNvPr id="30" name="テキスト ボックス 29">
-            <a:extLst>
-              <a:ext uri="{FF2B5EF4-FFF2-40B4-BE49-F238E27FC236}">
-                <a16:creationId xmlns:a16="http://schemas.microsoft.com/office/drawing/2014/main" id="{B467BBCE-47A6-42D6-945B-3C30FB9AA122}"/>
-              </a:ext>
-            </a:extLst>
-          </p:cNvPr>
-          <p:cNvSpPr txBox="1"/>
-          <p:nvPr/>
-        </p:nvSpPr>
-        <p:spPr>
-          <a:xfrm>
-            <a:off x="1967991" y="5057431"/>
-            <a:ext cx="838691" cy="230832"/>
-          </a:xfrm>
-          <a:prstGeom prst="rect">
-            <a:avLst/>
-          </a:prstGeom>
-          <a:noFill/>
-        </p:spPr>
-        <p:txBody>
-          <a:bodyPr wrap="none" rtlCol="0">
-            <a:spAutoFit/>
-          </a:bodyPr>
-          <a:lstStyle/>
-          <a:p>
-            <a:r>
-              <a:rPr kumimoji="1" lang="en-US" altLang="ja-JP" sz="900" dirty="0"/>
-              <a:t>License Info:</a:t>
-            </a:r>
-            <a:endParaRPr kumimoji="1" lang="ja-JP" altLang="en-US" sz="900" dirty="0"/>
-          </a:p>
-        </p:txBody>
-      </p:sp>
-      <p:sp>
-        <p:nvSpPr>
-          <p:cNvPr id="31" name="テキスト ボックス 30">
-            <a:extLst>
-              <a:ext uri="{FF2B5EF4-FFF2-40B4-BE49-F238E27FC236}">
-                <a16:creationId xmlns:a16="http://schemas.microsoft.com/office/drawing/2014/main" id="{5915B00F-92A7-43D7-9CB6-A1F4835F2CE5}"/>
-              </a:ext>
-            </a:extLst>
-          </p:cNvPr>
-          <p:cNvSpPr txBox="1"/>
-          <p:nvPr/>
-        </p:nvSpPr>
-        <p:spPr>
-          <a:xfrm>
-            <a:off x="4568563" y="5108041"/>
-            <a:ext cx="1633781" cy="230832"/>
-          </a:xfrm>
-          <a:prstGeom prst="rect">
-            <a:avLst/>
-          </a:prstGeom>
-          <a:noFill/>
-        </p:spPr>
-        <p:txBody>
-          <a:bodyPr wrap="none" rtlCol="0">
-            <a:spAutoFit/>
-          </a:bodyPr>
-          <a:lstStyle/>
-          <a:p>
-            <a:r>
-              <a:rPr kumimoji="1" lang="en-US" altLang="ja-JP" sz="900" dirty="0"/>
-              <a:t>Difficulty of the conclusion…</a:t>
-            </a:r>
-            <a:endParaRPr kumimoji="1" lang="ja-JP" altLang="en-US" sz="900" dirty="0"/>
-          </a:p>
-        </p:txBody>
-      </p:sp>
-    </p:spTree>
-    <p:extLst>
-      <p:ext uri="{BB962C8B-B14F-4D97-AF65-F5344CB8AC3E}">
-        <p14:creationId xmlns:p14="http://schemas.microsoft.com/office/powerpoint/2010/main" val="2350897081"/>
-      </p:ext>
-    </p:extLst>
-  </p:cSld>
-  <p:clrMapOvr>
-    <a:masterClrMapping/>
-  </p:clrMapOvr>
-</p:sld>
-</file>
-
-<file path=ppt/slides/slide20.xml><?xml version="1.0" encoding="utf-8"?>
+<file path=ppt/slides/slide22.xml><?xml version="1.0" encoding="utf-8"?>
 <p:sld xmlns:a="http://schemas.openxmlformats.org/drawingml/2006/main" xmlns:r="http://schemas.openxmlformats.org/officeDocument/2006/relationships" xmlns:p="http://schemas.openxmlformats.org/presentationml/2006/main">
   <p:cSld>
     <p:spTree>

</xml_diff>